<commit_message>
Updates to the pddl models and start on the slides.
</commit_message>
<xml_diff>
--- a/exercises/cisc-813/hybrid/slides.pptx
+++ b/exercises/cisc-813/hybrid/slides.pptx
@@ -10,20 +10,19 @@
     <p:sldId id="1690" r:id="rId4"/>
     <p:sldId id="257" r:id="rId5"/>
     <p:sldId id="261" r:id="rId6"/>
-    <p:sldId id="1691" r:id="rId7"/>
-    <p:sldId id="1693" r:id="rId8"/>
-    <p:sldId id="1699" r:id="rId9"/>
-    <p:sldId id="1694" r:id="rId10"/>
-    <p:sldId id="1700" r:id="rId11"/>
-    <p:sldId id="1695" r:id="rId12"/>
-    <p:sldId id="1701" r:id="rId13"/>
-    <p:sldId id="1696" r:id="rId14"/>
-    <p:sldId id="1702" r:id="rId15"/>
-    <p:sldId id="1697" r:id="rId16"/>
-    <p:sldId id="1703" r:id="rId17"/>
-    <p:sldId id="1698" r:id="rId18"/>
-    <p:sldId id="1704" r:id="rId19"/>
-    <p:sldId id="1684" r:id="rId20"/>
+    <p:sldId id="1693" r:id="rId7"/>
+    <p:sldId id="1705" r:id="rId8"/>
+    <p:sldId id="1694" r:id="rId9"/>
+    <p:sldId id="1700" r:id="rId10"/>
+    <p:sldId id="1695" r:id="rId11"/>
+    <p:sldId id="1701" r:id="rId12"/>
+    <p:sldId id="1696" r:id="rId13"/>
+    <p:sldId id="1702" r:id="rId14"/>
+    <p:sldId id="1697" r:id="rId15"/>
+    <p:sldId id="1703" r:id="rId16"/>
+    <p:sldId id="1698" r:id="rId17"/>
+    <p:sldId id="1704" r:id="rId18"/>
+    <p:sldId id="1684" r:id="rId19"/>
   </p:sldIdLst>
   <p:sldSz cx="12192000" cy="6858000"/>
   <p:notesSz cx="6858000" cy="9144000"/>
@@ -696,7 +695,7 @@
           <a:p>
             <a:fld id="{D6D0F569-AC90-44EB-9EF4-4E5C2F5D823C}" type="datetime1">
               <a:rPr lang="en-US" smtClean="0"/>
-              <a:t>3/3/2023</a:t>
+              <a:t>3/7/2023</a:t>
             </a:fld>
             <a:endParaRPr lang="en-US" dirty="0"/>
           </a:p>
@@ -1375,7 +1374,7 @@
           <a:p>
             <a:fld id="{46BA7D41-E8B7-4A0B-B861-3EC4AE88917D}" type="datetime1">
               <a:rPr lang="en-US" smtClean="0"/>
-              <a:t>3/3/2023</a:t>
+              <a:t>3/7/2023</a:t>
             </a:fld>
             <a:endParaRPr lang="en-US" dirty="0"/>
           </a:p>
@@ -2064,7 +2063,7 @@
           <a:p>
             <a:fld id="{A7C34823-0B19-4B4E-A643-7A3B0A3D24D6}" type="datetime1">
               <a:rPr lang="en-US" smtClean="0"/>
-              <a:t>3/3/2023</a:t>
+              <a:t>3/7/2023</a:t>
             </a:fld>
             <a:endParaRPr lang="en-US" dirty="0"/>
           </a:p>
@@ -3187,7 +3186,7 @@
           <a:p>
             <a:fld id="{8C2D79EF-17C8-45D8-9866-DAF5723FC604}" type="datetime1">
               <a:rPr lang="en-US" smtClean="0"/>
-              <a:t>3/3/2023</a:t>
+              <a:t>3/7/2023</a:t>
             </a:fld>
             <a:endParaRPr lang="en-US" dirty="0"/>
           </a:p>
@@ -3942,7 +3941,7 @@
           <a:p>
             <a:fld id="{DFFC2ADC-3680-4013-A757-E4663495DB98}" type="datetime1">
               <a:rPr lang="en-US" smtClean="0"/>
-              <a:t>3/3/2023</a:t>
+              <a:t>3/7/2023</a:t>
             </a:fld>
             <a:endParaRPr lang="en-US" dirty="0"/>
           </a:p>
@@ -4689,7 +4688,7 @@
           <a:p>
             <a:fld id="{4751BA94-5DCA-4F19-960F-0FB2BD5EE85A}" type="datetime1">
               <a:rPr lang="en-US" smtClean="0"/>
-              <a:t>3/3/2023</a:t>
+              <a:t>3/7/2023</a:t>
             </a:fld>
             <a:endParaRPr lang="en-US" dirty="0"/>
           </a:p>
@@ -5583,7 +5582,7 @@
           <a:p>
             <a:fld id="{01BED947-38D9-44AC-8B89-E79758333B77}" type="datetime1">
               <a:rPr lang="en-US" smtClean="0"/>
-              <a:t>3/3/2023</a:t>
+              <a:t>3/7/2023</a:t>
             </a:fld>
             <a:endParaRPr lang="en-US" dirty="0"/>
           </a:p>
@@ -6204,7 +6203,7 @@
           <a:p>
             <a:fld id="{3781E23F-BD3C-4F23-B116-2B758120C8AC}" type="datetime1">
               <a:rPr lang="en-US" smtClean="0"/>
-              <a:t>3/3/2023</a:t>
+              <a:t>3/7/2023</a:t>
             </a:fld>
             <a:endParaRPr lang="en-US" dirty="0"/>
           </a:p>
@@ -6796,7 +6795,7 @@
           <a:p>
             <a:fld id="{473CFAA9-6D59-4D98-869E-ACBDB83B2CA4}" type="datetime1">
               <a:rPr lang="en-US" smtClean="0"/>
-              <a:t>3/3/2023</a:t>
+              <a:t>3/7/2023</a:t>
             </a:fld>
             <a:endParaRPr lang="en-US"/>
           </a:p>
@@ -7588,7 +7587,7 @@
           <a:p>
             <a:fld id="{DC410804-27E3-430A-BB42-B831260DE39A}" type="datetime1">
               <a:rPr lang="en-US" smtClean="0"/>
-              <a:t>3/3/2023</a:t>
+              <a:t>3/7/2023</a:t>
             </a:fld>
             <a:endParaRPr lang="en-US" dirty="0"/>
           </a:p>
@@ -8359,7 +8358,7 @@
           <a:p>
             <a:fld id="{60E22DE3-3D1A-4D53-B9A6-6C7463B8C992}" type="datetime1">
               <a:rPr lang="en-US" smtClean="0"/>
-              <a:t>3/3/2023</a:t>
+              <a:t>3/7/2023</a:t>
             </a:fld>
             <a:endParaRPr lang="en-US" dirty="0"/>
           </a:p>
@@ -8670,7 +8669,7 @@
             <a:fld id="{5ECD8B30-1B71-45A1-8314-D59C86F581E1}" type="datetime1">
               <a:rPr lang="en-US" smtClean="0"/>
               <a:pPr/>
-              <a:t>3/3/2023</a:t>
+              <a:t>3/7/2023</a:t>
             </a:fld>
             <a:endParaRPr lang="en-US" b="1" dirty="0"/>
           </a:p>
@@ -9196,6 +9195,39 @@
       </p:grpSpPr>
       <p:sp>
         <p:nvSpPr>
+          <p:cNvPr id="4" name="Title 3">
+            <a:extLst>
+              <a:ext uri="{FF2B5EF4-FFF2-40B4-BE49-F238E27FC236}">
+                <a16:creationId xmlns:a16="http://schemas.microsoft.com/office/drawing/2014/main" id="{80EAC0C6-7B8A-1444-CF6E-AFD7613F9128}"/>
+              </a:ext>
+            </a:extLst>
+          </p:cNvPr>
+          <p:cNvSpPr>
+            <a:spLocks noGrp="1"/>
+          </p:cNvSpPr>
+          <p:nvPr>
+            <p:ph type="title"/>
+          </p:nvPr>
+        </p:nvSpPr>
+        <p:spPr/>
+        <p:txBody>
+          <a:bodyPr/>
+          <a:lstStyle/>
+          <a:p>
+            <a:r>
+              <a:rPr lang="en-CA" dirty="0"/>
+              <a:t>2. </a:t>
+            </a:r>
+            <a:r>
+              <a:rPr lang="en-US" dirty="0"/>
+              <a:t>Round and round we go</a:t>
+            </a:r>
+            <a:endParaRPr lang="en-CA" dirty="0"/>
+          </a:p>
+        </p:txBody>
+      </p:sp>
+      <p:sp>
+        <p:nvSpPr>
           <p:cNvPr id="5" name="Content Placeholder 4">
             <a:extLst>
               <a:ext uri="{FF2B5EF4-FFF2-40B4-BE49-F238E27FC236}">
@@ -9215,50 +9247,56 @@
           <a:bodyPr/>
           <a:lstStyle/>
           <a:p>
+            <a:r>
+              <a:rPr lang="en-CA" dirty="0"/>
+              <a:t>Introduce a </a:t>
+            </a:r>
+            <a:r>
+              <a:rPr lang="en-CA" b="1" dirty="0">
+                <a:solidFill>
+                  <a:schemeClr val="accent1"/>
+                </a:solidFill>
+              </a:rPr>
+              <a:t>loop</a:t>
+            </a:r>
+            <a:r>
+              <a:rPr lang="en-CA" dirty="0"/>
+              <a:t> event, along with counters, so we can make sure the shuttles can go round and round and …</a:t>
+            </a:r>
+          </a:p>
+          <a:p>
+            <a:endParaRPr lang="en-CA" dirty="0"/>
+          </a:p>
+          <a:p>
+            <a:endParaRPr lang="en-CA" dirty="0"/>
+          </a:p>
+          <a:p>
+            <a:pPr marL="0" indent="0" algn="ctr">
+              <a:buNone/>
+            </a:pPr>
+            <a:r>
+              <a:rPr lang="en-CA" sz="2800" dirty="0"/>
+              <a:t>http://editor.planning.domains/planning-course/hybrid/loop</a:t>
+            </a:r>
+          </a:p>
+          <a:p>
             <a:pPr marL="0" indent="0">
               <a:buNone/>
             </a:pPr>
             <a:endParaRPr lang="en-CA" dirty="0"/>
-          </a:p>
-          <a:p>
-            <a:endParaRPr lang="en-CA" dirty="0"/>
-          </a:p>
-          <a:p>
-            <a:endParaRPr lang="en-CA" dirty="0"/>
-          </a:p>
-          <a:p>
-            <a:pPr marL="0" indent="0" algn="ctr">
-              <a:buNone/>
-            </a:pPr>
-            <a:r>
-              <a:rPr lang="en-CA" sz="2800" dirty="0"/>
-              <a:t>http://editor.planning.domains/planning-course/adl/moved-mv</a:t>
-            </a:r>
           </a:p>
         </p:txBody>
       </p:sp>
     </p:spTree>
     <p:extLst>
       <p:ext uri="{BB962C8B-B14F-4D97-AF65-F5344CB8AC3E}">
-        <p14:creationId xmlns:p14="http://schemas.microsoft.com/office/powerpoint/2010/main" val="4031490244"/>
+        <p14:creationId xmlns:p14="http://schemas.microsoft.com/office/powerpoint/2010/main" val="1445019752"/>
       </p:ext>
     </p:extLst>
   </p:cSld>
   <p:clrMapOvr>
     <a:masterClrMapping/>
   </p:clrMapOvr>
-  <mc:AlternateContent xmlns:mc="http://schemas.openxmlformats.org/markup-compatibility/2006" xmlns:p14="http://schemas.microsoft.com/office/powerpoint/2010/main">
-    <mc:Choice Requires="p14">
-      <p:transition spd="med" p14:dur="700">
-        <p:fade/>
-      </p:transition>
-    </mc:Choice>
-    <mc:Fallback xmlns="">
-      <p:transition spd="med">
-        <p:fade/>
-      </p:transition>
-    </mc:Fallback>
-  </mc:AlternateContent>
 </p:sld>
 </file>
 
@@ -9281,39 +9319,6 @@
       </p:grpSpPr>
       <p:sp>
         <p:nvSpPr>
-          <p:cNvPr id="4" name="Title 3">
-            <a:extLst>
-              <a:ext uri="{FF2B5EF4-FFF2-40B4-BE49-F238E27FC236}">
-                <a16:creationId xmlns:a16="http://schemas.microsoft.com/office/drawing/2014/main" id="{80EAC0C6-7B8A-1444-CF6E-AFD7613F9128}"/>
-              </a:ext>
-            </a:extLst>
-          </p:cNvPr>
-          <p:cNvSpPr>
-            <a:spLocks noGrp="1"/>
-          </p:cNvSpPr>
-          <p:nvPr>
-            <p:ph type="title"/>
-          </p:nvPr>
-        </p:nvSpPr>
-        <p:spPr/>
-        <p:txBody>
-          <a:bodyPr/>
-          <a:lstStyle/>
-          <a:p>
-            <a:r>
-              <a:rPr lang="en-CA" dirty="0"/>
-              <a:t>2. </a:t>
-            </a:r>
-            <a:r>
-              <a:rPr lang="en-US" dirty="0"/>
-              <a:t>Getting everyone to their destination</a:t>
-            </a:r>
-            <a:endParaRPr lang="en-CA" dirty="0"/>
-          </a:p>
-        </p:txBody>
-      </p:sp>
-      <p:sp>
-        <p:nvSpPr>
           <p:cNvPr id="5" name="Content Placeholder 4">
             <a:extLst>
               <a:ext uri="{FF2B5EF4-FFF2-40B4-BE49-F238E27FC236}">
@@ -9333,90 +9338,11 @@
           <a:bodyPr/>
           <a:lstStyle/>
           <a:p>
-            <a:r>
-              <a:rPr lang="en-CA" dirty="0"/>
-              <a:t>Load and drive passengers and get them all there</a:t>
-            </a:r>
-          </a:p>
-          <a:p>
-            <a:endParaRPr lang="en-CA" dirty="0"/>
-          </a:p>
-          <a:p>
-            <a:endParaRPr lang="en-CA" dirty="0"/>
-          </a:p>
-          <a:p>
-            <a:pPr marL="0" indent="0" algn="ctr">
-              <a:buNone/>
-            </a:pPr>
-            <a:r>
-              <a:rPr lang="en-CA" sz="2800" dirty="0"/>
-              <a:t>http://editor.planning.domains/planning-course/adl/passengers</a:t>
-            </a:r>
-          </a:p>
-          <a:p>
             <a:pPr marL="0" indent="0">
               <a:buNone/>
             </a:pPr>
             <a:endParaRPr lang="en-CA" dirty="0"/>
           </a:p>
-        </p:txBody>
-      </p:sp>
-    </p:spTree>
-    <p:extLst>
-      <p:ext uri="{BB962C8B-B14F-4D97-AF65-F5344CB8AC3E}">
-        <p14:creationId xmlns:p14="http://schemas.microsoft.com/office/powerpoint/2010/main" val="1445019752"/>
-      </p:ext>
-    </p:extLst>
-  </p:cSld>
-  <p:clrMapOvr>
-    <a:masterClrMapping/>
-  </p:clrMapOvr>
-</p:sld>
-</file>
-
-<file path=ppt/slides/slide12.xml><?xml version="1.0" encoding="utf-8"?>
-<p:sld xmlns:a="http://schemas.openxmlformats.org/drawingml/2006/main" xmlns:r="http://schemas.openxmlformats.org/officeDocument/2006/relationships" xmlns:p="http://schemas.openxmlformats.org/presentationml/2006/main" showMasterSp="0">
-  <p:cSld>
-    <p:spTree>
-      <p:nvGrpSpPr>
-        <p:cNvPr id="1" name=""/>
-        <p:cNvGrpSpPr/>
-        <p:nvPr/>
-      </p:nvGrpSpPr>
-      <p:grpSpPr>
-        <a:xfrm>
-          <a:off x="0" y="0"/>
-          <a:ext cx="0" cy="0"/>
-          <a:chOff x="0" y="0"/>
-          <a:chExt cx="0" cy="0"/>
-        </a:xfrm>
-      </p:grpSpPr>
-      <p:sp>
-        <p:nvSpPr>
-          <p:cNvPr id="5" name="Content Placeholder 4">
-            <a:extLst>
-              <a:ext uri="{FF2B5EF4-FFF2-40B4-BE49-F238E27FC236}">
-                <a16:creationId xmlns:a16="http://schemas.microsoft.com/office/drawing/2014/main" id="{916B2140-6178-6477-FAC2-4FC081B9C2C5}"/>
-              </a:ext>
-            </a:extLst>
-          </p:cNvPr>
-          <p:cNvSpPr>
-            <a:spLocks noGrp="1"/>
-          </p:cNvSpPr>
-          <p:nvPr>
-            <p:ph idx="1"/>
-          </p:nvPr>
-        </p:nvSpPr>
-        <p:spPr/>
-        <p:txBody>
-          <a:bodyPr/>
-          <a:lstStyle/>
-          <a:p>
-            <a:pPr marL="0" indent="0">
-              <a:buNone/>
-            </a:pPr>
-            <a:endParaRPr lang="en-CA" dirty="0"/>
-          </a:p>
           <a:p>
             <a:endParaRPr lang="en-CA" dirty="0"/>
           </a:p>
@@ -9429,7 +9355,7 @@
             </a:pPr>
             <a:r>
               <a:rPr lang="en-CA" sz="2800" dirty="0"/>
-              <a:t>http://editor.planning.domains/planning-course/adl/passenged</a:t>
+              <a:t>http://editor.planning.domains/planning-course/hybrid/loopy</a:t>
             </a:r>
           </a:p>
         </p:txBody>
@@ -9459,6 +9385,108 @@
 </p:sld>
 </file>
 
+<file path=ppt/slides/slide12.xml><?xml version="1.0" encoding="utf-8"?>
+<p:sld xmlns:a="http://schemas.openxmlformats.org/drawingml/2006/main" xmlns:r="http://schemas.openxmlformats.org/officeDocument/2006/relationships" xmlns:p="http://schemas.openxmlformats.org/presentationml/2006/main" showMasterSp="0">
+  <p:cSld>
+    <p:spTree>
+      <p:nvGrpSpPr>
+        <p:cNvPr id="1" name=""/>
+        <p:cNvGrpSpPr/>
+        <p:nvPr/>
+      </p:nvGrpSpPr>
+      <p:grpSpPr>
+        <a:xfrm>
+          <a:off x="0" y="0"/>
+          <a:ext cx="0" cy="0"/>
+          <a:chOff x="0" y="0"/>
+          <a:chExt cx="0" cy="0"/>
+        </a:xfrm>
+      </p:grpSpPr>
+      <p:sp>
+        <p:nvSpPr>
+          <p:cNvPr id="4" name="Title 3">
+            <a:extLst>
+              <a:ext uri="{FF2B5EF4-FFF2-40B4-BE49-F238E27FC236}">
+                <a16:creationId xmlns:a16="http://schemas.microsoft.com/office/drawing/2014/main" id="{80EAC0C6-7B8A-1444-CF6E-AFD7613F9128}"/>
+              </a:ext>
+            </a:extLst>
+          </p:cNvPr>
+          <p:cNvSpPr>
+            <a:spLocks noGrp="1"/>
+          </p:cNvSpPr>
+          <p:nvPr>
+            <p:ph type="title"/>
+          </p:nvPr>
+        </p:nvSpPr>
+        <p:spPr/>
+        <p:txBody>
+          <a:bodyPr/>
+          <a:lstStyle/>
+          <a:p>
+            <a:r>
+              <a:rPr lang="en-CA" dirty="0"/>
+              <a:t>3. Start, stop, crash!</a:t>
+            </a:r>
+          </a:p>
+        </p:txBody>
+      </p:sp>
+      <p:sp>
+        <p:nvSpPr>
+          <p:cNvPr id="5" name="Content Placeholder 4">
+            <a:extLst>
+              <a:ext uri="{FF2B5EF4-FFF2-40B4-BE49-F238E27FC236}">
+                <a16:creationId xmlns:a16="http://schemas.microsoft.com/office/drawing/2014/main" id="{916B2140-6178-6477-FAC2-4FC081B9C2C5}"/>
+              </a:ext>
+            </a:extLst>
+          </p:cNvPr>
+          <p:cNvSpPr>
+            <a:spLocks noGrp="1"/>
+          </p:cNvSpPr>
+          <p:nvPr>
+            <p:ph idx="1"/>
+          </p:nvPr>
+        </p:nvSpPr>
+        <p:spPr/>
+        <p:txBody>
+          <a:bodyPr/>
+          <a:lstStyle/>
+          <a:p>
+            <a:r>
+              <a:rPr lang="en-CA" dirty="0"/>
+              <a:t>Put the shuttles on the circuit!</a:t>
+            </a:r>
+          </a:p>
+          <a:p>
+            <a:endParaRPr lang="en-CA" dirty="0"/>
+          </a:p>
+          <a:p>
+            <a:endParaRPr lang="en-CA" dirty="0"/>
+          </a:p>
+          <a:p>
+            <a:pPr marL="0" indent="0" algn="ctr">
+              <a:buNone/>
+            </a:pPr>
+            <a:r>
+              <a:rPr lang="en-CA" sz="2800" dirty="0"/>
+              <a:t>http://editor.planning.domains/planning-course/hybrid/crash</a:t>
+            </a:r>
+            <a:endParaRPr lang="en-CA" dirty="0"/>
+          </a:p>
+        </p:txBody>
+      </p:sp>
+    </p:spTree>
+    <p:extLst>
+      <p:ext uri="{BB962C8B-B14F-4D97-AF65-F5344CB8AC3E}">
+        <p14:creationId xmlns:p14="http://schemas.microsoft.com/office/powerpoint/2010/main" val="2049898440"/>
+      </p:ext>
+    </p:extLst>
+  </p:cSld>
+  <p:clrMapOvr>
+    <a:masterClrMapping/>
+  </p:clrMapOvr>
+</p:sld>
+</file>
+
 <file path=ppt/slides/slide13.xml><?xml version="1.0" encoding="utf-8"?>
 <p:sld xmlns:a="http://schemas.openxmlformats.org/drawingml/2006/main" xmlns:r="http://schemas.openxmlformats.org/officeDocument/2006/relationships" xmlns:p="http://schemas.openxmlformats.org/presentationml/2006/main" showMasterSp="0">
   <p:cSld>
@@ -9478,39 +9506,6 @@
       </p:grpSpPr>
       <p:sp>
         <p:nvSpPr>
-          <p:cNvPr id="4" name="Title 3">
-            <a:extLst>
-              <a:ext uri="{FF2B5EF4-FFF2-40B4-BE49-F238E27FC236}">
-                <a16:creationId xmlns:a16="http://schemas.microsoft.com/office/drawing/2014/main" id="{80EAC0C6-7B8A-1444-CF6E-AFD7613F9128}"/>
-              </a:ext>
-            </a:extLst>
-          </p:cNvPr>
-          <p:cNvSpPr>
-            <a:spLocks noGrp="1"/>
-          </p:cNvSpPr>
-          <p:nvPr>
-            <p:ph type="title"/>
-          </p:nvPr>
-        </p:nvSpPr>
-        <p:spPr/>
-        <p:txBody>
-          <a:bodyPr/>
-          <a:lstStyle/>
-          <a:p>
-            <a:r>
-              <a:rPr lang="en-CA" dirty="0"/>
-              <a:t>3. </a:t>
-            </a:r>
-            <a:r>
-              <a:rPr lang="en-US" dirty="0"/>
-              <a:t>Moving an autonomous car around</a:t>
-            </a:r>
-            <a:endParaRPr lang="en-CA" dirty="0"/>
-          </a:p>
-        </p:txBody>
-      </p:sp>
-      <p:sp>
-        <p:nvSpPr>
           <p:cNvPr id="5" name="Content Placeholder 4">
             <a:extLst>
               <a:ext uri="{FF2B5EF4-FFF2-40B4-BE49-F238E27FC236}">
@@ -9530,80 +9525,6 @@
           <a:bodyPr/>
           <a:lstStyle/>
           <a:p>
-            <a:r>
-              <a:rPr lang="en-CA" dirty="0"/>
-              <a:t>Put the shuttles on the circuit!</a:t>
-            </a:r>
-          </a:p>
-          <a:p>
-            <a:endParaRPr lang="en-CA" dirty="0"/>
-          </a:p>
-          <a:p>
-            <a:endParaRPr lang="en-CA" dirty="0"/>
-          </a:p>
-          <a:p>
-            <a:pPr marL="0" indent="0" algn="ctr">
-              <a:buNone/>
-            </a:pPr>
-            <a:r>
-              <a:rPr lang="en-CA" sz="2800" dirty="0"/>
-              <a:t>http://editor.planning.domains/planning-course/adl/circuit</a:t>
-            </a:r>
-            <a:endParaRPr lang="en-CA" dirty="0"/>
-          </a:p>
-        </p:txBody>
-      </p:sp>
-    </p:spTree>
-    <p:extLst>
-      <p:ext uri="{BB962C8B-B14F-4D97-AF65-F5344CB8AC3E}">
-        <p14:creationId xmlns:p14="http://schemas.microsoft.com/office/powerpoint/2010/main" val="2049898440"/>
-      </p:ext>
-    </p:extLst>
-  </p:cSld>
-  <p:clrMapOvr>
-    <a:masterClrMapping/>
-  </p:clrMapOvr>
-</p:sld>
-</file>
-
-<file path=ppt/slides/slide14.xml><?xml version="1.0" encoding="utf-8"?>
-<p:sld xmlns:a="http://schemas.openxmlformats.org/drawingml/2006/main" xmlns:r="http://schemas.openxmlformats.org/officeDocument/2006/relationships" xmlns:p="http://schemas.openxmlformats.org/presentationml/2006/main" showMasterSp="0">
-  <p:cSld>
-    <p:spTree>
-      <p:nvGrpSpPr>
-        <p:cNvPr id="1" name=""/>
-        <p:cNvGrpSpPr/>
-        <p:nvPr/>
-      </p:nvGrpSpPr>
-      <p:grpSpPr>
-        <a:xfrm>
-          <a:off x="0" y="0"/>
-          <a:ext cx="0" cy="0"/>
-          <a:chOff x="0" y="0"/>
-          <a:chExt cx="0" cy="0"/>
-        </a:xfrm>
-      </p:grpSpPr>
-      <p:sp>
-        <p:nvSpPr>
-          <p:cNvPr id="5" name="Content Placeholder 4">
-            <a:extLst>
-              <a:ext uri="{FF2B5EF4-FFF2-40B4-BE49-F238E27FC236}">
-                <a16:creationId xmlns:a16="http://schemas.microsoft.com/office/drawing/2014/main" id="{916B2140-6178-6477-FAC2-4FC081B9C2C5}"/>
-              </a:ext>
-            </a:extLst>
-          </p:cNvPr>
-          <p:cNvSpPr>
-            <a:spLocks noGrp="1"/>
-          </p:cNvSpPr>
-          <p:nvPr>
-            <p:ph idx="1"/>
-          </p:nvPr>
-        </p:nvSpPr>
-        <p:spPr/>
-        <p:txBody>
-          <a:bodyPr/>
-          <a:lstStyle/>
-          <a:p>
             <a:pPr marL="0" indent="0">
               <a:buNone/>
             </a:pPr>
@@ -9621,7 +9542,7 @@
             </a:pPr>
             <a:r>
               <a:rPr lang="en-CA" sz="2800" dirty="0"/>
-              <a:t>http://editor.planning.domains/planning-course/adl/circed</a:t>
+              <a:t>http://editor.planning.domains/planning-course/hybrid/kablooey</a:t>
             </a:r>
           </a:p>
         </p:txBody>
@@ -9651,6 +9572,113 @@
 </p:sld>
 </file>
 
+<file path=ppt/slides/slide14.xml><?xml version="1.0" encoding="utf-8"?>
+<p:sld xmlns:a="http://schemas.openxmlformats.org/drawingml/2006/main" xmlns:r="http://schemas.openxmlformats.org/officeDocument/2006/relationships" xmlns:p="http://schemas.openxmlformats.org/presentationml/2006/main" showMasterSp="0">
+  <p:cSld>
+    <p:spTree>
+      <p:nvGrpSpPr>
+        <p:cNvPr id="1" name=""/>
+        <p:cNvGrpSpPr/>
+        <p:nvPr/>
+      </p:nvGrpSpPr>
+      <p:grpSpPr>
+        <a:xfrm>
+          <a:off x="0" y="0"/>
+          <a:ext cx="0" cy="0"/>
+          <a:chOff x="0" y="0"/>
+          <a:chExt cx="0" cy="0"/>
+        </a:xfrm>
+      </p:grpSpPr>
+      <p:sp>
+        <p:nvSpPr>
+          <p:cNvPr id="4" name="Title 3">
+            <a:extLst>
+              <a:ext uri="{FF2B5EF4-FFF2-40B4-BE49-F238E27FC236}">
+                <a16:creationId xmlns:a16="http://schemas.microsoft.com/office/drawing/2014/main" id="{80EAC0C6-7B8A-1444-CF6E-AFD7613F9128}"/>
+              </a:ext>
+            </a:extLst>
+          </p:cNvPr>
+          <p:cNvSpPr>
+            <a:spLocks noGrp="1"/>
+          </p:cNvSpPr>
+          <p:nvPr>
+            <p:ph type="title"/>
+          </p:nvPr>
+        </p:nvSpPr>
+        <p:spPr/>
+        <p:txBody>
+          <a:bodyPr/>
+          <a:lstStyle/>
+          <a:p>
+            <a:r>
+              <a:rPr lang="en-CA" dirty="0"/>
+              <a:t>4. </a:t>
+            </a:r>
+            <a:r>
+              <a:rPr lang="en-US" dirty="0"/>
+              <a:t>Rules of the road.</a:t>
+            </a:r>
+            <a:endParaRPr lang="en-CA" dirty="0"/>
+          </a:p>
+        </p:txBody>
+      </p:sp>
+      <p:sp>
+        <p:nvSpPr>
+          <p:cNvPr id="5" name="Content Placeholder 4">
+            <a:extLst>
+              <a:ext uri="{FF2B5EF4-FFF2-40B4-BE49-F238E27FC236}">
+                <a16:creationId xmlns:a16="http://schemas.microsoft.com/office/drawing/2014/main" id="{916B2140-6178-6477-FAC2-4FC081B9C2C5}"/>
+              </a:ext>
+            </a:extLst>
+          </p:cNvPr>
+          <p:cNvSpPr>
+            <a:spLocks noGrp="1"/>
+          </p:cNvSpPr>
+          <p:nvPr>
+            <p:ph idx="1"/>
+          </p:nvPr>
+        </p:nvSpPr>
+        <p:spPr/>
+        <p:txBody>
+          <a:bodyPr/>
+          <a:lstStyle/>
+          <a:p>
+            <a:r>
+              <a:rPr lang="en-CA" dirty="0"/>
+              <a:t>Everyone aboard! Either that, or get outa here…</a:t>
+            </a:r>
+          </a:p>
+          <a:p>
+            <a:endParaRPr lang="en-CA" dirty="0"/>
+          </a:p>
+          <a:p>
+            <a:endParaRPr lang="en-CA" dirty="0"/>
+          </a:p>
+          <a:p>
+            <a:pPr marL="0" indent="0" algn="ctr">
+              <a:buNone/>
+            </a:pPr>
+            <a:r>
+              <a:rPr lang="en-CA" sz="2800" dirty="0"/>
+              <a:t>http://editor.planning.domains/planning-course/hybrid/bythebook</a:t>
+            </a:r>
+            <a:endParaRPr lang="en-CA" dirty="0"/>
+          </a:p>
+        </p:txBody>
+      </p:sp>
+    </p:spTree>
+    <p:extLst>
+      <p:ext uri="{BB962C8B-B14F-4D97-AF65-F5344CB8AC3E}">
+        <p14:creationId xmlns:p14="http://schemas.microsoft.com/office/powerpoint/2010/main" val="2967719754"/>
+      </p:ext>
+    </p:extLst>
+  </p:cSld>
+  <p:clrMapOvr>
+    <a:masterClrMapping/>
+  </p:clrMapOvr>
+</p:sld>
+</file>
+
 <file path=ppt/slides/slide15.xml><?xml version="1.0" encoding="utf-8"?>
 <p:sld xmlns:a="http://schemas.openxmlformats.org/drawingml/2006/main" xmlns:r="http://schemas.openxmlformats.org/officeDocument/2006/relationships" xmlns:p="http://schemas.openxmlformats.org/presentationml/2006/main" showMasterSp="0">
   <p:cSld>
@@ -9670,39 +9698,6 @@
       </p:grpSpPr>
       <p:sp>
         <p:nvSpPr>
-          <p:cNvPr id="4" name="Title 3">
-            <a:extLst>
-              <a:ext uri="{FF2B5EF4-FFF2-40B4-BE49-F238E27FC236}">
-                <a16:creationId xmlns:a16="http://schemas.microsoft.com/office/drawing/2014/main" id="{80EAC0C6-7B8A-1444-CF6E-AFD7613F9128}"/>
-              </a:ext>
-            </a:extLst>
-          </p:cNvPr>
-          <p:cNvSpPr>
-            <a:spLocks noGrp="1"/>
-          </p:cNvSpPr>
-          <p:nvPr>
-            <p:ph type="title"/>
-          </p:nvPr>
-        </p:nvSpPr>
-        <p:spPr/>
-        <p:txBody>
-          <a:bodyPr/>
-          <a:lstStyle/>
-          <a:p>
-            <a:r>
-              <a:rPr lang="en-CA" dirty="0"/>
-              <a:t>4. </a:t>
-            </a:r>
-            <a:r>
-              <a:rPr lang="en-US" dirty="0"/>
-              <a:t>Picking up / dropping off passengers</a:t>
-            </a:r>
-            <a:endParaRPr lang="en-CA" dirty="0"/>
-          </a:p>
-        </p:txBody>
-      </p:sp>
-      <p:sp>
-        <p:nvSpPr>
           <p:cNvPr id="5" name="Content Placeholder 4">
             <a:extLst>
               <a:ext uri="{FF2B5EF4-FFF2-40B4-BE49-F238E27FC236}">
@@ -9722,80 +9717,6 @@
           <a:bodyPr/>
           <a:lstStyle/>
           <a:p>
-            <a:r>
-              <a:rPr lang="en-CA" dirty="0"/>
-              <a:t>Everyone aboard! Either that, or get outa here…</a:t>
-            </a:r>
-          </a:p>
-          <a:p>
-            <a:endParaRPr lang="en-CA" dirty="0"/>
-          </a:p>
-          <a:p>
-            <a:endParaRPr lang="en-CA" dirty="0"/>
-          </a:p>
-          <a:p>
-            <a:pPr marL="0" indent="0" algn="ctr">
-              <a:buNone/>
-            </a:pPr>
-            <a:r>
-              <a:rPr lang="en-CA" sz="2800" dirty="0"/>
-              <a:t>http://editor.planning.domains/planning-course/adl/all-aboard</a:t>
-            </a:r>
-            <a:endParaRPr lang="en-CA" dirty="0"/>
-          </a:p>
-        </p:txBody>
-      </p:sp>
-    </p:spTree>
-    <p:extLst>
-      <p:ext uri="{BB962C8B-B14F-4D97-AF65-F5344CB8AC3E}">
-        <p14:creationId xmlns:p14="http://schemas.microsoft.com/office/powerpoint/2010/main" val="2967719754"/>
-      </p:ext>
-    </p:extLst>
-  </p:cSld>
-  <p:clrMapOvr>
-    <a:masterClrMapping/>
-  </p:clrMapOvr>
-</p:sld>
-</file>
-
-<file path=ppt/slides/slide16.xml><?xml version="1.0" encoding="utf-8"?>
-<p:sld xmlns:a="http://schemas.openxmlformats.org/drawingml/2006/main" xmlns:r="http://schemas.openxmlformats.org/officeDocument/2006/relationships" xmlns:p="http://schemas.openxmlformats.org/presentationml/2006/main" showMasterSp="0">
-  <p:cSld>
-    <p:spTree>
-      <p:nvGrpSpPr>
-        <p:cNvPr id="1" name=""/>
-        <p:cNvGrpSpPr/>
-        <p:nvPr/>
-      </p:nvGrpSpPr>
-      <p:grpSpPr>
-        <a:xfrm>
-          <a:off x="0" y="0"/>
-          <a:ext cx="0" cy="0"/>
-          <a:chOff x="0" y="0"/>
-          <a:chExt cx="0" cy="0"/>
-        </a:xfrm>
-      </p:grpSpPr>
-      <p:sp>
-        <p:nvSpPr>
-          <p:cNvPr id="5" name="Content Placeholder 4">
-            <a:extLst>
-              <a:ext uri="{FF2B5EF4-FFF2-40B4-BE49-F238E27FC236}">
-                <a16:creationId xmlns:a16="http://schemas.microsoft.com/office/drawing/2014/main" id="{916B2140-6178-6477-FAC2-4FC081B9C2C5}"/>
-              </a:ext>
-            </a:extLst>
-          </p:cNvPr>
-          <p:cNvSpPr>
-            <a:spLocks noGrp="1"/>
-          </p:cNvSpPr>
-          <p:nvPr>
-            <p:ph idx="1"/>
-          </p:nvPr>
-        </p:nvSpPr>
-        <p:spPr/>
-        <p:txBody>
-          <a:bodyPr/>
-          <a:lstStyle/>
-          <a:p>
             <a:pPr marL="0" indent="0">
               <a:buNone/>
             </a:pPr>
@@ -9813,7 +9734,7 @@
             </a:pPr>
             <a:r>
               <a:rPr lang="en-CA" sz="2800" dirty="0"/>
-              <a:t>http://editor.planning.domains/planning-course/adl/boarded</a:t>
+              <a:t>http://editor.planning.domains/planning-course/hybrid/goonred</a:t>
             </a:r>
           </a:p>
         </p:txBody>
@@ -9843,6 +9764,116 @@
 </p:sld>
 </file>
 
+<file path=ppt/slides/slide16.xml><?xml version="1.0" encoding="utf-8"?>
+<p:sld xmlns:a="http://schemas.openxmlformats.org/drawingml/2006/main" xmlns:r="http://schemas.openxmlformats.org/officeDocument/2006/relationships" xmlns:p="http://schemas.openxmlformats.org/presentationml/2006/main" showMasterSp="0">
+  <p:cSld>
+    <p:spTree>
+      <p:nvGrpSpPr>
+        <p:cNvPr id="1" name=""/>
+        <p:cNvGrpSpPr/>
+        <p:nvPr/>
+      </p:nvGrpSpPr>
+      <p:grpSpPr>
+        <a:xfrm>
+          <a:off x="0" y="0"/>
+          <a:ext cx="0" cy="0"/>
+          <a:chOff x="0" y="0"/>
+          <a:chExt cx="0" cy="0"/>
+        </a:xfrm>
+      </p:grpSpPr>
+      <p:sp>
+        <p:nvSpPr>
+          <p:cNvPr id="4" name="Title 3">
+            <a:extLst>
+              <a:ext uri="{FF2B5EF4-FFF2-40B4-BE49-F238E27FC236}">
+                <a16:creationId xmlns:a16="http://schemas.microsoft.com/office/drawing/2014/main" id="{80EAC0C6-7B8A-1444-CF6E-AFD7613F9128}"/>
+              </a:ext>
+            </a:extLst>
+          </p:cNvPr>
+          <p:cNvSpPr>
+            <a:spLocks noGrp="1"/>
+          </p:cNvSpPr>
+          <p:nvPr>
+            <p:ph type="title"/>
+          </p:nvPr>
+        </p:nvSpPr>
+        <p:spPr/>
+        <p:txBody>
+          <a:bodyPr/>
+          <a:lstStyle/>
+          <a:p>
+            <a:r>
+              <a:rPr lang="en-CA" dirty="0"/>
+              <a:t>5. Bring ‘</a:t>
+            </a:r>
+            <a:r>
+              <a:rPr lang="en-CA" dirty="0" err="1"/>
+              <a:t>em</a:t>
+            </a:r>
+            <a:r>
+              <a:rPr lang="en-CA" dirty="0"/>
+              <a:t> all home</a:t>
+            </a:r>
+          </a:p>
+        </p:txBody>
+      </p:sp>
+      <p:sp>
+        <p:nvSpPr>
+          <p:cNvPr id="5" name="Content Placeholder 4">
+            <a:extLst>
+              <a:ext uri="{FF2B5EF4-FFF2-40B4-BE49-F238E27FC236}">
+                <a16:creationId xmlns:a16="http://schemas.microsoft.com/office/drawing/2014/main" id="{916B2140-6178-6477-FAC2-4FC081B9C2C5}"/>
+              </a:ext>
+            </a:extLst>
+          </p:cNvPr>
+          <p:cNvSpPr>
+            <a:spLocks noGrp="1"/>
+          </p:cNvSpPr>
+          <p:nvPr>
+            <p:ph idx="1"/>
+          </p:nvPr>
+        </p:nvSpPr>
+        <p:spPr/>
+        <p:txBody>
+          <a:bodyPr/>
+          <a:lstStyle/>
+          <a:p>
+            <a:r>
+              <a:rPr lang="en-CA" dirty="0"/>
+              <a:t>Let’s just avoid all those Tesla shuttles…</a:t>
+            </a:r>
+          </a:p>
+          <a:p>
+            <a:endParaRPr lang="en-CA" dirty="0"/>
+          </a:p>
+          <a:p>
+            <a:endParaRPr lang="en-CA" dirty="0"/>
+          </a:p>
+          <a:p>
+            <a:pPr marL="0" indent="0" algn="ctr">
+              <a:buNone/>
+            </a:pPr>
+            <a:r>
+              <a:rPr lang="en-CA" sz="2800" dirty="0"/>
+              <a:t>http://editor.planning.domains/planning-course/hybrid/peeps</a:t>
+            </a:r>
+            <a:endParaRPr lang="en-CA" dirty="0"/>
+          </a:p>
+        </p:txBody>
+      </p:sp>
+    </p:spTree>
+    <p:extLst>
+      <p:ext uri="{BB962C8B-B14F-4D97-AF65-F5344CB8AC3E}">
+        <p14:creationId xmlns:p14="http://schemas.microsoft.com/office/powerpoint/2010/main" val="2852421980"/>
+      </p:ext>
+    </p:extLst>
+  </p:cSld>
+  <p:clrMapOvr>
+    <a:masterClrMapping/>
+  </p:clrMapOvr>
+</p:sld>
+</file>
+
 <file path=ppt/slides/slide17.xml><?xml version="1.0" encoding="utf-8"?>
 <p:sld xmlns:a="http://schemas.openxmlformats.org/drawingml/2006/main" xmlns:r="http://schemas.openxmlformats.org/officeDocument/2006/relationships" xmlns:p="http://schemas.openxmlformats.org/presentationml/2006/main" showMasterSp="0">
   <p:cSld>
@@ -9862,39 +9893,6 @@
       </p:grpSpPr>
       <p:sp>
         <p:nvSpPr>
-          <p:cNvPr id="4" name="Title 3">
-            <a:extLst>
-              <a:ext uri="{FF2B5EF4-FFF2-40B4-BE49-F238E27FC236}">
-                <a16:creationId xmlns:a16="http://schemas.microsoft.com/office/drawing/2014/main" id="{80EAC0C6-7B8A-1444-CF6E-AFD7613F9128}"/>
-              </a:ext>
-            </a:extLst>
-          </p:cNvPr>
-          <p:cNvSpPr>
-            <a:spLocks noGrp="1"/>
-          </p:cNvSpPr>
-          <p:nvPr>
-            <p:ph type="title"/>
-          </p:nvPr>
-        </p:nvSpPr>
-        <p:spPr/>
-        <p:txBody>
-          <a:bodyPr/>
-          <a:lstStyle/>
-          <a:p>
-            <a:r>
-              <a:rPr lang="en-CA" dirty="0"/>
-              <a:t>5. </a:t>
-            </a:r>
-            <a:r>
-              <a:rPr lang="en-US" dirty="0"/>
-              <a:t>Safe manual moves</a:t>
-            </a:r>
-            <a:endParaRPr lang="en-CA" dirty="0"/>
-          </a:p>
-        </p:txBody>
-      </p:sp>
-      <p:sp>
-        <p:nvSpPr>
           <p:cNvPr id="5" name="Content Placeholder 4">
             <a:extLst>
               <a:ext uri="{FF2B5EF4-FFF2-40B4-BE49-F238E27FC236}">
@@ -9914,80 +9912,6 @@
           <a:bodyPr/>
           <a:lstStyle/>
           <a:p>
-            <a:r>
-              <a:rPr lang="en-CA" dirty="0"/>
-              <a:t>Let’s just avoid all those Tesla shuttles…</a:t>
-            </a:r>
-          </a:p>
-          <a:p>
-            <a:endParaRPr lang="en-CA" dirty="0"/>
-          </a:p>
-          <a:p>
-            <a:endParaRPr lang="en-CA" dirty="0"/>
-          </a:p>
-          <a:p>
-            <a:pPr marL="0" indent="0" algn="ctr">
-              <a:buNone/>
-            </a:pPr>
-            <a:r>
-              <a:rPr lang="en-CA" sz="2800" dirty="0"/>
-              <a:t>http://editor.planning.domains/planning-course/adl/safe</a:t>
-            </a:r>
-            <a:endParaRPr lang="en-CA" dirty="0"/>
-          </a:p>
-        </p:txBody>
-      </p:sp>
-    </p:spTree>
-    <p:extLst>
-      <p:ext uri="{BB962C8B-B14F-4D97-AF65-F5344CB8AC3E}">
-        <p14:creationId xmlns:p14="http://schemas.microsoft.com/office/powerpoint/2010/main" val="2852421980"/>
-      </p:ext>
-    </p:extLst>
-  </p:cSld>
-  <p:clrMapOvr>
-    <a:masterClrMapping/>
-  </p:clrMapOvr>
-</p:sld>
-</file>
-
-<file path=ppt/slides/slide18.xml><?xml version="1.0" encoding="utf-8"?>
-<p:sld xmlns:a="http://schemas.openxmlformats.org/drawingml/2006/main" xmlns:r="http://schemas.openxmlformats.org/officeDocument/2006/relationships" xmlns:p="http://schemas.openxmlformats.org/presentationml/2006/main" showMasterSp="0">
-  <p:cSld>
-    <p:spTree>
-      <p:nvGrpSpPr>
-        <p:cNvPr id="1" name=""/>
-        <p:cNvGrpSpPr/>
-        <p:nvPr/>
-      </p:nvGrpSpPr>
-      <p:grpSpPr>
-        <a:xfrm>
-          <a:off x="0" y="0"/>
-          <a:ext cx="0" cy="0"/>
-          <a:chOff x="0" y="0"/>
-          <a:chExt cx="0" cy="0"/>
-        </a:xfrm>
-      </p:grpSpPr>
-      <p:sp>
-        <p:nvSpPr>
-          <p:cNvPr id="5" name="Content Placeholder 4">
-            <a:extLst>
-              <a:ext uri="{FF2B5EF4-FFF2-40B4-BE49-F238E27FC236}">
-                <a16:creationId xmlns:a16="http://schemas.microsoft.com/office/drawing/2014/main" id="{916B2140-6178-6477-FAC2-4FC081B9C2C5}"/>
-              </a:ext>
-            </a:extLst>
-          </p:cNvPr>
-          <p:cNvSpPr>
-            <a:spLocks noGrp="1"/>
-          </p:cNvSpPr>
-          <p:nvPr>
-            <p:ph idx="1"/>
-          </p:nvPr>
-        </p:nvSpPr>
-        <p:spPr/>
-        <p:txBody>
-          <a:bodyPr/>
-          <a:lstStyle/>
-          <a:p>
             <a:pPr marL="0" indent="0">
               <a:buNone/>
             </a:pPr>
@@ -10005,7 +9929,7 @@
             </a:pPr>
             <a:r>
               <a:rPr lang="en-CA" sz="2800" dirty="0"/>
-              <a:t>http://editor.planning.domains/planning-course/adl/safetied</a:t>
+              <a:t>http://editor.planning.domains/planning-course/hybrid/dirbyh</a:t>
             </a:r>
           </a:p>
         </p:txBody>
@@ -10035,7 +9959,7 @@
 </p:sld>
 </file>
 
-<file path=ppt/slides/slide19.xml><?xml version="1.0" encoding="utf-8"?>
+<file path=ppt/slides/slide18.xml><?xml version="1.0" encoding="utf-8"?>
 <p:sld xmlns:a="http://schemas.openxmlformats.org/drawingml/2006/main" xmlns:r="http://schemas.openxmlformats.org/officeDocument/2006/relationships" xmlns:p="http://schemas.openxmlformats.org/presentationml/2006/main" showMasterSp="0">
   <p:cSld>
     <p:spTree>
@@ -10139,10 +10063,9 @@
           </a:p>
           <a:p>
             <a:r>
-              <a:rPr lang="en-US" i="1" dirty="0" err="1"/>
-              <a:t>enhsp</a:t>
-            </a:r>
-            <a:endParaRPr lang="en-US" i="1" dirty="0"/>
+              <a:rPr lang="en-US" i="1" dirty="0"/>
+              <a:t>enhsp-2020</a:t>
+            </a:r>
           </a:p>
         </p:txBody>
       </p:sp>
@@ -10336,7 +10259,7 @@
             </a:pPr>
             <a:r>
               <a:rPr lang="en-US" dirty="0"/>
-              <a:t>Moving a manual car around</a:t>
+              <a:t>Go, shuttle, go!</a:t>
             </a:r>
             <a:br>
               <a:rPr lang="en-US" dirty="0"/>
@@ -10350,7 +10273,7 @@
             </a:pPr>
             <a:r>
               <a:rPr lang="en-US" dirty="0"/>
-              <a:t>Getting everyone to their destination</a:t>
+              <a:t>Round and round we go.</a:t>
             </a:r>
             <a:br>
               <a:rPr lang="en-US" dirty="0"/>
@@ -10364,7 +10287,7 @@
             </a:pPr>
             <a:r>
               <a:rPr lang="en-US" dirty="0"/>
-              <a:t>Moving an autonomous car around</a:t>
+              <a:t>Start, stop, crash!</a:t>
             </a:r>
             <a:br>
               <a:rPr lang="en-US" dirty="0"/>
@@ -10378,7 +10301,7 @@
             </a:pPr>
             <a:r>
               <a:rPr lang="en-US" dirty="0"/>
-              <a:t>Picking up / dropping off passengers</a:t>
+              <a:t>Rules of the road.</a:t>
             </a:r>
             <a:br>
               <a:rPr lang="en-US" dirty="0"/>
@@ -10392,7 +10315,15 @@
             </a:pPr>
             <a:r>
               <a:rPr lang="en-US" dirty="0"/>
-              <a:t>Safe manual moves</a:t>
+              <a:t>Bring ‘</a:t>
+            </a:r>
+            <a:r>
+              <a:rPr lang="en-US" dirty="0" err="1"/>
+              <a:t>em</a:t>
+            </a:r>
+            <a:r>
+              <a:rPr lang="en-US" dirty="0"/>
+              <a:t> all home.</a:t>
             </a:r>
           </a:p>
         </p:txBody>
@@ -10466,7 +10397,9 @@
           </a:prstGeom>
         </p:spPr>
         <p:txBody>
-          <a:bodyPr/>
+          <a:bodyPr>
+            <a:normAutofit fontScale="92500" lnSpcReduction="10000"/>
+          </a:bodyPr>
           <a:lstStyle/>
           <a:p>
             <a:pPr marL="0" indent="0">
@@ -10494,11 +10427,11 @@
             </a:r>
             <a:r>
               <a:rPr b="0" dirty="0"/>
-              <a:t>movement of </a:t>
+              <a:t>movement of</a:t>
             </a:r>
             <a:r>
               <a:rPr lang="en-US" b="0" dirty="0"/>
-              <a:t>cars, shuttles, and people</a:t>
+              <a:t> shuttles on a circuit, and eventually people</a:t>
             </a:r>
             <a:br>
               <a:rPr lang="en-US" b="0" dirty="0"/>
@@ -10538,7 +10471,7 @@
                   <a:schemeClr val="accent3"/>
                 </a:solidFill>
               </a:rPr>
-              <a:t>location</a:t>
+              <a:t>circuit</a:t>
             </a:r>
             <a:r>
               <a:rPr lang="en-CA" b="0" dirty="0"/>
@@ -10550,7 +10483,7 @@
                   <a:schemeClr val="accent3"/>
                 </a:solidFill>
               </a:rPr>
-              <a:t>car</a:t>
+              <a:t>shuttle</a:t>
             </a:r>
             <a:r>
               <a:rPr lang="en-CA" b="0" dirty="0"/>
@@ -10564,30 +10497,6 @@
               </a:rPr>
               <a:t>person</a:t>
             </a:r>
-            <a:r>
-              <a:rPr lang="en-CA" b="0" dirty="0"/>
-              <a:t>, </a:t>
-            </a:r>
-            <a:r>
-              <a:rPr lang="en-US" b="0" dirty="0">
-                <a:solidFill>
-                  <a:schemeClr val="accent3"/>
-                </a:solidFill>
-              </a:rPr>
-              <a:t>mv</a:t>
-            </a:r>
-            <a:r>
-              <a:rPr lang="en-CA" b="0" dirty="0"/>
-              <a:t>, </a:t>
-            </a:r>
-            <a:r>
-              <a:rPr lang="en-US" b="0" dirty="0">
-                <a:solidFill>
-                  <a:schemeClr val="accent3"/>
-                </a:solidFill>
-              </a:rPr>
-              <a:t>av</a:t>
-            </a:r>
             <a:endParaRPr lang="fr-FR" b="0" dirty="0">
               <a:solidFill>
                 <a:schemeClr val="accent3"/>
@@ -10615,7 +10524,7 @@
                   <a:schemeClr val="accent2"/>
                 </a:solidFill>
               </a:rPr>
-              <a:t>at</a:t>
+              <a:t>at-intersection</a:t>
             </a:r>
             <a:r>
               <a:rPr lang="fr-FR" b="0" dirty="0"/>
@@ -10627,7 +10536,7 @@
                   <a:schemeClr val="accent2"/>
                 </a:solidFill>
               </a:rPr>
-              <a:t>in</a:t>
+              <a:t>on</a:t>
             </a:r>
             <a:r>
               <a:rPr lang="fr-FR" b="0" dirty="0"/>
@@ -10639,7 +10548,31 @@
                   <a:schemeClr val="accent2"/>
                 </a:solidFill>
               </a:rPr>
-              <a:t>link</a:t>
+              <a:t>driving</a:t>
+            </a:r>
+            <a:r>
+              <a:rPr lang="fr-FR" b="0" dirty="0"/>
+              <a:t>, </a:t>
+            </a:r>
+            <a:r>
+              <a:rPr lang="fr-FR" b="0" dirty="0" err="1">
+                <a:solidFill>
+                  <a:schemeClr val="accent2"/>
+                </a:solidFill>
+              </a:rPr>
+              <a:t>served</a:t>
+            </a:r>
+            <a:r>
+              <a:rPr lang="fr-FR" b="0" dirty="0"/>
+              <a:t>, </a:t>
+            </a:r>
+            <a:r>
+              <a:rPr lang="fr-FR" b="0" dirty="0" err="1">
+                <a:solidFill>
+                  <a:schemeClr val="accent2"/>
+                </a:solidFill>
+              </a:rPr>
+              <a:t>crashed</a:t>
             </a:r>
             <a:r>
               <a:rPr lang="fr-FR" b="0" dirty="0"/>
@@ -10651,31 +10584,7 @@
                   <a:schemeClr val="accent2"/>
                 </a:solidFill>
               </a:rPr>
-              <a:t>destination</a:t>
-            </a:r>
-            <a:r>
-              <a:rPr lang="fr-FR" b="0" dirty="0"/>
-              <a:t>, </a:t>
-            </a:r>
-            <a:r>
-              <a:rPr lang="fr-FR" b="0" dirty="0">
-                <a:solidFill>
-                  <a:schemeClr val="accent2"/>
-                </a:solidFill>
-              </a:rPr>
-              <a:t>hub</a:t>
-            </a:r>
-            <a:r>
-              <a:rPr lang="fr-FR" b="0" dirty="0"/>
-              <a:t>, </a:t>
-            </a:r>
-            <a:r>
-              <a:rPr lang="fr-FR" b="0" dirty="0" err="1">
-                <a:solidFill>
-                  <a:schemeClr val="accent2"/>
-                </a:solidFill>
-              </a:rPr>
-              <a:t>path</a:t>
+              <a:t>…</a:t>
             </a:r>
             <a:endParaRPr lang="fr-FR" dirty="0">
               <a:solidFill>
@@ -10699,12 +10608,36 @@
               <a:t>: </a:t>
             </a:r>
             <a:r>
-              <a:rPr b="0" dirty="0">
+              <a:rPr lang="en-US" b="0" dirty="0">
                 <a:solidFill>
                   <a:schemeClr val="accent4"/>
                 </a:solidFill>
               </a:rPr>
-              <a:t>move</a:t>
+              <a:t>start</a:t>
+            </a:r>
+            <a:r>
+              <a:rPr b="0" dirty="0"/>
+              <a:t>, </a:t>
+            </a:r>
+            <a:r>
+              <a:rPr lang="en-US" b="0" dirty="0">
+                <a:solidFill>
+                  <a:schemeClr val="accent4"/>
+                </a:solidFill>
+              </a:rPr>
+              <a:t>stop</a:t>
+            </a:r>
+            <a:r>
+              <a:rPr lang="en-CA" b="0" dirty="0"/>
+              <a:t>, </a:t>
+            </a:r>
+            <a:r>
+              <a:rPr lang="en-US" b="0" dirty="0">
+                <a:solidFill>
+                  <a:schemeClr val="accent4"/>
+                </a:solidFill>
+              </a:rPr>
+              <a:t>board</a:t>
             </a:r>
             <a:r>
               <a:rPr b="0" dirty="0"/>
@@ -10716,35 +10649,146 @@
                   <a:schemeClr val="accent4"/>
                 </a:solidFill>
               </a:rPr>
-              <a:t>getin</a:t>
+              <a:t>unboard</a:t>
             </a:r>
             <a:r>
               <a:rPr lang="en-CA" b="0" dirty="0"/>
               <a:t>, </a:t>
             </a:r>
             <a:r>
-              <a:rPr lang="en-US" b="0" dirty="0" err="1">
+              <a:rPr lang="en-CA" b="0" dirty="0">
                 <a:solidFill>
                   <a:schemeClr val="accent4"/>
                 </a:solidFill>
               </a:rPr>
-              <a:t>getout</a:t>
-            </a:r>
-            <a:r>
-              <a:rPr b="0" dirty="0"/>
+              <a:t>serve</a:t>
+            </a:r>
+            <a:r>
+              <a:rPr lang="en-CA" b="0" dirty="0"/>
               <a:t>, </a:t>
             </a:r>
             <a:r>
-              <a:rPr lang="en-US" b="0" dirty="0">
+              <a:rPr lang="en-CA" dirty="0">
                 <a:solidFill>
                   <a:schemeClr val="accent4"/>
                 </a:solidFill>
               </a:rPr>
-              <a:t>step</a:t>
-            </a:r>
-            <a:endParaRPr b="0" dirty="0">
+              <a:t>…</a:t>
+            </a:r>
+          </a:p>
+          <a:p>
+            <a:pPr>
+              <a:defRPr b="1"/>
+            </a:pPr>
+            <a:r>
+              <a:rPr lang="en-US" dirty="0"/>
+              <a:t>Events</a:t>
+            </a:r>
+            <a:r>
+              <a:rPr lang="en-US" b="0" dirty="0"/>
+              <a:t>: </a:t>
+            </a:r>
+            <a:r>
+              <a:rPr lang="en-US" b="0" dirty="0">
+                <a:solidFill>
+                  <a:schemeClr val="accent1"/>
+                </a:solidFill>
+              </a:rPr>
+              <a:t>loop</a:t>
+            </a:r>
+            <a:r>
+              <a:rPr lang="en-US" b="0" dirty="0"/>
+              <a:t>, </a:t>
+            </a:r>
+            <a:r>
+              <a:rPr lang="en-US" b="0" dirty="0">
+                <a:solidFill>
+                  <a:schemeClr val="accent1"/>
+                </a:solidFill>
+              </a:rPr>
+              <a:t>crash</a:t>
+            </a:r>
+            <a:r>
+              <a:rPr lang="en-US" b="0" dirty="0"/>
+              <a:t>, </a:t>
+            </a:r>
+            <a:r>
+              <a:rPr lang="en-US" b="0" dirty="0">
+                <a:solidFill>
+                  <a:schemeClr val="accent1"/>
+                </a:solidFill>
+              </a:rPr>
+              <a:t>light-change</a:t>
+            </a:r>
+            <a:r>
+              <a:rPr lang="en-US" b="0" dirty="0"/>
+              <a:t>, …</a:t>
+            </a:r>
+            <a:endParaRPr lang="en-US" dirty="0">
               <a:solidFill>
                 <a:schemeClr val="accent4"/>
+              </a:solidFill>
+            </a:endParaRPr>
+          </a:p>
+          <a:p>
+            <a:pPr>
+              <a:defRPr b="1"/>
+            </a:pPr>
+            <a:r>
+              <a:rPr lang="en-US" dirty="0"/>
+              <a:t>Processes</a:t>
+            </a:r>
+            <a:r>
+              <a:rPr lang="en-US" b="0" dirty="0"/>
+              <a:t>: </a:t>
+            </a:r>
+            <a:r>
+              <a:rPr lang="en-US" b="0" dirty="0">
+                <a:solidFill>
+                  <a:schemeClr val="accent6">
+                    <a:lumMod val="60000"/>
+                    <a:lumOff val="40000"/>
+                  </a:schemeClr>
+                </a:solidFill>
+              </a:rPr>
+              <a:t>light-timer</a:t>
+            </a:r>
+            <a:r>
+              <a:rPr lang="en-US" b="0" dirty="0"/>
+              <a:t>, </a:t>
+            </a:r>
+            <a:r>
+              <a:rPr lang="en-US" b="0" dirty="0">
+                <a:solidFill>
+                  <a:schemeClr val="accent6">
+                    <a:lumMod val="60000"/>
+                    <a:lumOff val="40000"/>
+                  </a:schemeClr>
+                </a:solidFill>
+              </a:rPr>
+              <a:t>idle-timer</a:t>
+            </a:r>
+            <a:r>
+              <a:rPr lang="en-US" b="0" dirty="0"/>
+              <a:t>, </a:t>
+            </a:r>
+            <a:r>
+              <a:rPr lang="en-US" b="0" dirty="0">
+                <a:solidFill>
+                  <a:schemeClr val="accent6">
+                    <a:lumMod val="60000"/>
+                    <a:lumOff val="40000"/>
+                  </a:schemeClr>
+                </a:solidFill>
+              </a:rPr>
+              <a:t>drive</a:t>
+            </a:r>
+            <a:endParaRPr lang="en-US" dirty="0">
+              <a:solidFill>
+                <a:schemeClr val="accent6">
+                  <a:lumMod val="60000"/>
+                  <a:lumOff val="40000"/>
+                </a:schemeClr>
               </a:solidFill>
             </a:endParaRPr>
           </a:p>
@@ -10765,15 +10809,7 @@
             </a:r>
             <a:r>
               <a:rPr lang="en-US" b="0" dirty="0"/>
-              <a:t>Get pe</a:t>
-            </a:r>
-            <a:r>
-              <a:rPr b="0" dirty="0"/>
-              <a:t>o</a:t>
-            </a:r>
-            <a:r>
-              <a:rPr lang="en-US" b="0" dirty="0"/>
-              <a:t>ple where they need to be</a:t>
+              <a:t>Everything located where it should be</a:t>
             </a:r>
             <a:endParaRPr b="0" dirty="0"/>
           </a:p>
@@ -10789,111 +10825,6 @@
 </file>
 
 <file path=ppt/slides/slide6.xml><?xml version="1.0" encoding="utf-8"?>
-<p:sld xmlns:a="http://schemas.openxmlformats.org/drawingml/2006/main" xmlns:r="http://schemas.openxmlformats.org/officeDocument/2006/relationships" xmlns:p="http://schemas.openxmlformats.org/presentationml/2006/main">
-  <p:cSld>
-    <p:spTree>
-      <p:nvGrpSpPr>
-        <p:cNvPr id="1" name=""/>
-        <p:cNvGrpSpPr/>
-        <p:nvPr/>
-      </p:nvGrpSpPr>
-      <p:grpSpPr>
-        <a:xfrm>
-          <a:off x="0" y="0"/>
-          <a:ext cx="0" cy="0"/>
-          <a:chOff x="0" y="0"/>
-          <a:chExt cx="0" cy="0"/>
-        </a:xfrm>
-      </p:grpSpPr>
-      <p:sp>
-        <p:nvSpPr>
-          <p:cNvPr id="3" name="Title 2">
-            <a:extLst>
-              <a:ext uri="{FF2B5EF4-FFF2-40B4-BE49-F238E27FC236}">
-                <a16:creationId xmlns:a16="http://schemas.microsoft.com/office/drawing/2014/main" id="{4773ACD6-E562-016B-2D7E-8F280D382706}"/>
-              </a:ext>
-            </a:extLst>
-          </p:cNvPr>
-          <p:cNvSpPr>
-            <a:spLocks noGrp="1"/>
-          </p:cNvSpPr>
-          <p:nvPr>
-            <p:ph type="title"/>
-          </p:nvPr>
-        </p:nvSpPr>
-        <p:spPr/>
-        <p:txBody>
-          <a:bodyPr/>
-          <a:lstStyle/>
-          <a:p>
-            <a:r>
-              <a:rPr lang="en-US" dirty="0"/>
-              <a:t>Types</a:t>
-            </a:r>
-            <a:endParaRPr lang="en-CA" dirty="0"/>
-          </a:p>
-        </p:txBody>
-      </p:sp>
-      <p:pic>
-        <p:nvPicPr>
-          <p:cNvPr id="5" name="Picture 4">
-            <a:extLst>
-              <a:ext uri="{FF2B5EF4-FFF2-40B4-BE49-F238E27FC236}">
-                <a16:creationId xmlns:a16="http://schemas.microsoft.com/office/drawing/2014/main" id="{85014569-79F5-F3D0-CCBD-782FA65A1D40}"/>
-              </a:ext>
-            </a:extLst>
-          </p:cNvPr>
-          <p:cNvPicPr>
-            <a:picLocks noChangeAspect="1"/>
-          </p:cNvPicPr>
-          <p:nvPr/>
-        </p:nvPicPr>
-        <p:blipFill>
-          <a:blip r:embed="rId2"/>
-          <a:stretch>
-            <a:fillRect/>
-          </a:stretch>
-        </p:blipFill>
-        <p:spPr>
-          <a:xfrm>
-            <a:off x="4076418" y="856891"/>
-            <a:ext cx="4039164" cy="5144218"/>
-          </a:xfrm>
-          <a:prstGeom prst="round2DiagRect">
-            <a:avLst>
-              <a:gd name="adj1" fmla="val 16667"/>
-              <a:gd name="adj2" fmla="val 0"/>
-            </a:avLst>
-          </a:prstGeom>
-          <a:ln w="88900" cap="sq">
-            <a:solidFill>
-              <a:srgbClr val="FFFFFF"/>
-            </a:solidFill>
-            <a:miter lim="800000"/>
-          </a:ln>
-          <a:effectLst>
-            <a:outerShdw blurRad="254000" algn="tl" rotWithShape="0">
-              <a:srgbClr val="000000">
-                <a:alpha val="43000"/>
-              </a:srgbClr>
-            </a:outerShdw>
-          </a:effectLst>
-        </p:spPr>
-      </p:pic>
-    </p:spTree>
-    <p:extLst>
-      <p:ext uri="{BB962C8B-B14F-4D97-AF65-F5344CB8AC3E}">
-        <p14:creationId xmlns:p14="http://schemas.microsoft.com/office/powerpoint/2010/main" val="1622156670"/>
-      </p:ext>
-    </p:extLst>
-  </p:cSld>
-  <p:clrMapOvr>
-    <a:masterClrMapping/>
-  </p:clrMapOvr>
-</p:sld>
-</file>
-
-<file path=ppt/slides/slide7.xml><?xml version="1.0" encoding="utf-8"?>
 <p:sld xmlns:a="http://schemas.openxmlformats.org/drawingml/2006/main" xmlns:r="http://schemas.openxmlformats.org/officeDocument/2006/relationships" xmlns:p="http://schemas.openxmlformats.org/presentationml/2006/main">
   <p:cSld>
     <p:spTree>
@@ -11736,7 +11667,7 @@
 </p:sld>
 </file>
 
-<file path=ppt/slides/slide8.xml><?xml version="1.0" encoding="utf-8"?>
+<file path=ppt/slides/slide7.xml><?xml version="1.0" encoding="utf-8"?>
 <p:sld xmlns:a="http://schemas.openxmlformats.org/drawingml/2006/main" xmlns:r="http://schemas.openxmlformats.org/officeDocument/2006/relationships" xmlns:p="http://schemas.openxmlformats.org/presentationml/2006/main">
   <p:cSld>
     <p:spTree>
@@ -11753,444 +11684,29 @@
           <a:chExt cx="0" cy="0"/>
         </a:xfrm>
       </p:grpSpPr>
-      <p:pic>
-        <p:nvPicPr>
-          <p:cNvPr id="3" name="Picture 2">
-            <a:extLst>
-              <a:ext uri="{FF2B5EF4-FFF2-40B4-BE49-F238E27FC236}">
-                <a16:creationId xmlns:a16="http://schemas.microsoft.com/office/drawing/2014/main" id="{A2ADEC37-4BEA-0596-45CE-0E2C9F1AB969}"/>
-              </a:ext>
-            </a:extLst>
-          </p:cNvPr>
-          <p:cNvPicPr>
-            <a:picLocks noChangeAspect="1"/>
-          </p:cNvPicPr>
-          <p:nvPr/>
-        </p:nvPicPr>
-        <p:blipFill>
-          <a:blip r:embed="rId2"/>
-          <a:stretch>
-            <a:fillRect/>
-          </a:stretch>
-        </p:blipFill>
-        <p:spPr>
-          <a:xfrm>
-            <a:off x="743209" y="661460"/>
-            <a:ext cx="3901778" cy="3566469"/>
-          </a:xfrm>
-          <a:prstGeom prst="rect">
-            <a:avLst/>
-          </a:prstGeom>
-        </p:spPr>
-      </p:pic>
-      <p:pic>
-        <p:nvPicPr>
-          <p:cNvPr id="9" name="Picture 8">
-            <a:extLst>
-              <a:ext uri="{FF2B5EF4-FFF2-40B4-BE49-F238E27FC236}">
-                <a16:creationId xmlns:a16="http://schemas.microsoft.com/office/drawing/2014/main" id="{D2DD10FC-B45D-F3EF-CBA1-2E3B24352145}"/>
-              </a:ext>
-            </a:extLst>
-          </p:cNvPr>
-          <p:cNvPicPr>
-            <a:picLocks noChangeAspect="1"/>
-          </p:cNvPicPr>
-          <p:nvPr/>
-        </p:nvPicPr>
-        <p:blipFill>
-          <a:blip r:embed="rId3"/>
-          <a:stretch>
-            <a:fillRect/>
-          </a:stretch>
-        </p:blipFill>
-        <p:spPr>
-          <a:xfrm>
-            <a:off x="3633204" y="3880781"/>
-            <a:ext cx="7962349" cy="2447101"/>
-          </a:xfrm>
-          <a:prstGeom prst="rect">
-            <a:avLst/>
-          </a:prstGeom>
-        </p:spPr>
-      </p:pic>
-      <p:sp>
-        <p:nvSpPr>
-          <p:cNvPr id="16" name="TextBox 15">
-            <a:extLst>
-              <a:ext uri="{FF2B5EF4-FFF2-40B4-BE49-F238E27FC236}">
-                <a16:creationId xmlns:a16="http://schemas.microsoft.com/office/drawing/2014/main" id="{A9A95851-E3DC-69C2-9C79-DCB81D89DA81}"/>
-              </a:ext>
-            </a:extLst>
-          </p:cNvPr>
-          <p:cNvSpPr txBox="1"/>
-          <p:nvPr/>
-        </p:nvSpPr>
-        <p:spPr>
-          <a:xfrm>
-            <a:off x="8073582" y="1417143"/>
-            <a:ext cx="636713" cy="584775"/>
-          </a:xfrm>
-          <a:prstGeom prst="rect">
-            <a:avLst/>
-          </a:prstGeom>
-          <a:noFill/>
-        </p:spPr>
-        <p:txBody>
-          <a:bodyPr wrap="none" rtlCol="0">
-            <a:spAutoFit/>
-          </a:bodyPr>
-          <a:lstStyle/>
-          <a:p>
-            <a:r>
-              <a:rPr lang="en-US" sz="3200" b="1" dirty="0">
-                <a:latin typeface="Consolas" panose="020B0609020204030204" pitchFamily="49" charset="0"/>
-                <a:cs typeface="Aharoni" panose="020B0604020202020204" pitchFamily="2" charset="-79"/>
-              </a:rPr>
-              <a:t>l1</a:t>
-            </a:r>
-            <a:endParaRPr lang="en-CA" sz="3200" b="1" dirty="0">
-              <a:latin typeface="Consolas" panose="020B0609020204030204" pitchFamily="49" charset="0"/>
-              <a:cs typeface="Aharoni" panose="020B0604020202020204" pitchFamily="2" charset="-79"/>
-            </a:endParaRPr>
-          </a:p>
-        </p:txBody>
-      </p:sp>
-      <p:sp>
-        <p:nvSpPr>
-          <p:cNvPr id="17" name="TextBox 16">
-            <a:extLst>
-              <a:ext uri="{FF2B5EF4-FFF2-40B4-BE49-F238E27FC236}">
-                <a16:creationId xmlns:a16="http://schemas.microsoft.com/office/drawing/2014/main" id="{2309F7EF-93D8-9FF9-3BD4-2342BA742864}"/>
-              </a:ext>
-            </a:extLst>
-          </p:cNvPr>
-          <p:cNvSpPr txBox="1"/>
-          <p:nvPr/>
-        </p:nvSpPr>
-        <p:spPr>
-          <a:xfrm>
-            <a:off x="9628702" y="2465214"/>
-            <a:ext cx="636713" cy="584775"/>
-          </a:xfrm>
-          <a:prstGeom prst="rect">
-            <a:avLst/>
-          </a:prstGeom>
-          <a:noFill/>
-        </p:spPr>
-        <p:txBody>
-          <a:bodyPr wrap="none" rtlCol="0">
-            <a:spAutoFit/>
-          </a:bodyPr>
-          <a:lstStyle/>
-          <a:p>
-            <a:r>
-              <a:rPr lang="en-US" sz="3200" b="1" dirty="0">
-                <a:latin typeface="Consolas" panose="020B0609020204030204" pitchFamily="49" charset="0"/>
-                <a:cs typeface="Aharoni" panose="020B0604020202020204" pitchFamily="2" charset="-79"/>
-              </a:rPr>
-              <a:t>l5</a:t>
-            </a:r>
-            <a:endParaRPr lang="en-CA" sz="3200" b="1" dirty="0">
-              <a:latin typeface="Consolas" panose="020B0609020204030204" pitchFamily="49" charset="0"/>
-              <a:cs typeface="Aharoni" panose="020B0604020202020204" pitchFamily="2" charset="-79"/>
-            </a:endParaRPr>
-          </a:p>
-        </p:txBody>
-      </p:sp>
-      <p:sp>
-        <p:nvSpPr>
-          <p:cNvPr id="18" name="TextBox 17">
-            <a:extLst>
-              <a:ext uri="{FF2B5EF4-FFF2-40B4-BE49-F238E27FC236}">
-                <a16:creationId xmlns:a16="http://schemas.microsoft.com/office/drawing/2014/main" id="{EDD9B844-65B3-081E-C346-A7C01BB31B24}"/>
-              </a:ext>
-            </a:extLst>
-          </p:cNvPr>
-          <p:cNvSpPr txBox="1"/>
-          <p:nvPr/>
-        </p:nvSpPr>
-        <p:spPr>
-          <a:xfrm>
-            <a:off x="9628703" y="369073"/>
-            <a:ext cx="636713" cy="584775"/>
-          </a:xfrm>
-          <a:prstGeom prst="rect">
-            <a:avLst/>
-          </a:prstGeom>
-          <a:noFill/>
-        </p:spPr>
-        <p:txBody>
-          <a:bodyPr wrap="none" rtlCol="0">
-            <a:spAutoFit/>
-          </a:bodyPr>
-          <a:lstStyle/>
-          <a:p>
-            <a:r>
-              <a:rPr lang="en-US" sz="3200" b="1" dirty="0">
-                <a:latin typeface="Consolas" panose="020B0609020204030204" pitchFamily="49" charset="0"/>
-                <a:cs typeface="Aharoni" panose="020B0604020202020204" pitchFamily="2" charset="-79"/>
-              </a:rPr>
-              <a:t>l4</a:t>
-            </a:r>
-            <a:endParaRPr lang="en-CA" sz="3200" b="1" dirty="0">
-              <a:latin typeface="Consolas" panose="020B0609020204030204" pitchFamily="49" charset="0"/>
-              <a:cs typeface="Aharoni" panose="020B0604020202020204" pitchFamily="2" charset="-79"/>
-            </a:endParaRPr>
-          </a:p>
-        </p:txBody>
-      </p:sp>
-      <p:sp>
-        <p:nvSpPr>
-          <p:cNvPr id="19" name="TextBox 18">
-            <a:extLst>
-              <a:ext uri="{FF2B5EF4-FFF2-40B4-BE49-F238E27FC236}">
-                <a16:creationId xmlns:a16="http://schemas.microsoft.com/office/drawing/2014/main" id="{54B703F8-38E8-D6F7-17E0-FA29BE06A330}"/>
-              </a:ext>
-            </a:extLst>
-          </p:cNvPr>
-          <p:cNvSpPr txBox="1"/>
-          <p:nvPr/>
-        </p:nvSpPr>
-        <p:spPr>
-          <a:xfrm>
-            <a:off x="6200107" y="369073"/>
-            <a:ext cx="636713" cy="584775"/>
-          </a:xfrm>
-          <a:prstGeom prst="rect">
-            <a:avLst/>
-          </a:prstGeom>
-          <a:noFill/>
-        </p:spPr>
-        <p:txBody>
-          <a:bodyPr wrap="none" rtlCol="0">
-            <a:spAutoFit/>
-          </a:bodyPr>
-          <a:lstStyle/>
-          <a:p>
-            <a:r>
-              <a:rPr lang="en-US" sz="3200" b="1" dirty="0">
-                <a:latin typeface="Consolas" panose="020B0609020204030204" pitchFamily="49" charset="0"/>
-                <a:cs typeface="Aharoni" panose="020B0604020202020204" pitchFamily="2" charset="-79"/>
-              </a:rPr>
-              <a:t>l2</a:t>
-            </a:r>
-            <a:endParaRPr lang="en-CA" sz="3200" b="1" dirty="0">
-              <a:latin typeface="Consolas" panose="020B0609020204030204" pitchFamily="49" charset="0"/>
-              <a:cs typeface="Aharoni" panose="020B0604020202020204" pitchFamily="2" charset="-79"/>
-            </a:endParaRPr>
-          </a:p>
-        </p:txBody>
-      </p:sp>
-      <p:sp>
-        <p:nvSpPr>
-          <p:cNvPr id="20" name="TextBox 19">
-            <a:extLst>
-              <a:ext uri="{FF2B5EF4-FFF2-40B4-BE49-F238E27FC236}">
-                <a16:creationId xmlns:a16="http://schemas.microsoft.com/office/drawing/2014/main" id="{99959982-186A-A64A-FA5A-FBAA73E47B46}"/>
-              </a:ext>
-            </a:extLst>
-          </p:cNvPr>
-          <p:cNvSpPr txBox="1"/>
-          <p:nvPr/>
-        </p:nvSpPr>
-        <p:spPr>
-          <a:xfrm>
-            <a:off x="6200107" y="2465215"/>
-            <a:ext cx="636713" cy="584775"/>
-          </a:xfrm>
-          <a:prstGeom prst="rect">
-            <a:avLst/>
-          </a:prstGeom>
-          <a:noFill/>
-        </p:spPr>
-        <p:txBody>
-          <a:bodyPr wrap="none" rtlCol="0">
-            <a:spAutoFit/>
-          </a:bodyPr>
-          <a:lstStyle/>
-          <a:p>
-            <a:r>
-              <a:rPr lang="en-US" sz="3200" b="1" dirty="0">
-                <a:latin typeface="Consolas" panose="020B0609020204030204" pitchFamily="49" charset="0"/>
-                <a:cs typeface="Aharoni" panose="020B0604020202020204" pitchFamily="2" charset="-79"/>
-              </a:rPr>
-              <a:t>l3</a:t>
-            </a:r>
-            <a:endParaRPr lang="en-CA" sz="3200" b="1" dirty="0">
-              <a:latin typeface="Consolas" panose="020B0609020204030204" pitchFamily="49" charset="0"/>
-              <a:cs typeface="Aharoni" panose="020B0604020202020204" pitchFamily="2" charset="-79"/>
-            </a:endParaRPr>
-          </a:p>
-        </p:txBody>
-      </p:sp>
       <p:cxnSp>
         <p:nvCxnSpPr>
-          <p:cNvPr id="21" name="Connector: Curved 20">
-            <a:extLst>
-              <a:ext uri="{FF2B5EF4-FFF2-40B4-BE49-F238E27FC236}">
-                <a16:creationId xmlns:a16="http://schemas.microsoft.com/office/drawing/2014/main" id="{5912E179-7D66-82EC-8B0E-B6533BB17FAB}"/>
+          <p:cNvPr id="10" name="Connector: Curved 9">
+            <a:extLst>
+              <a:ext uri="{FF2B5EF4-FFF2-40B4-BE49-F238E27FC236}">
+                <a16:creationId xmlns:a16="http://schemas.microsoft.com/office/drawing/2014/main" id="{CBCE71C7-32D6-E752-98C0-7C75681D5AA0}"/>
               </a:ext>
             </a:extLst>
           </p:cNvPr>
           <p:cNvCxnSpPr>
             <a:cxnSpLocks/>
-            <a:stCxn id="16" idx="0"/>
-            <a:endCxn id="19" idx="3"/>
           </p:cNvCxnSpPr>
           <p:nvPr/>
         </p:nvCxnSpPr>
         <p:spPr>
-          <a:xfrm rot="16200000" flipV="1">
-            <a:off x="7236539" y="261742"/>
-            <a:ext cx="755682" cy="1555119"/>
+          <a:xfrm rot="10800000" flipH="1" flipV="1">
+            <a:off x="5777642" y="3428999"/>
+            <a:ext cx="318357" cy="292387"/>
           </a:xfrm>
-          <a:prstGeom prst="curvedConnector2">
-            <a:avLst/>
-          </a:prstGeom>
-          <a:ln w="57150">
-            <a:solidFill>
-              <a:schemeClr val="tx2">
-                <a:lumMod val="90000"/>
-              </a:schemeClr>
-            </a:solidFill>
-            <a:tailEnd type="triangle"/>
-          </a:ln>
-        </p:spPr>
-        <p:style>
-          <a:lnRef idx="1">
-            <a:schemeClr val="accent1"/>
-          </a:lnRef>
-          <a:fillRef idx="0">
-            <a:schemeClr val="accent1"/>
-          </a:fillRef>
-          <a:effectRef idx="0">
-            <a:schemeClr val="accent1"/>
-          </a:effectRef>
-          <a:fontRef idx="minor">
-            <a:schemeClr val="tx1"/>
-          </a:fontRef>
-        </p:style>
-      </p:cxnSp>
-      <p:cxnSp>
-        <p:nvCxnSpPr>
-          <p:cNvPr id="22" name="Connector: Curved 21">
-            <a:extLst>
-              <a:ext uri="{FF2B5EF4-FFF2-40B4-BE49-F238E27FC236}">
-                <a16:creationId xmlns:a16="http://schemas.microsoft.com/office/drawing/2014/main" id="{13C997F2-BE73-F814-A143-34586499EF47}"/>
-              </a:ext>
-            </a:extLst>
-          </p:cNvPr>
-          <p:cNvCxnSpPr>
-            <a:cxnSpLocks/>
-            <a:stCxn id="19" idx="2"/>
-            <a:endCxn id="20" idx="0"/>
-          </p:cNvCxnSpPr>
-          <p:nvPr/>
-        </p:nvCxnSpPr>
-        <p:spPr>
-          <a:xfrm rot="5400000">
-            <a:off x="5762781" y="1709531"/>
-            <a:ext cx="1511367" cy="12700"/>
-          </a:xfrm>
-          <a:prstGeom prst="curvedConnector3">
-            <a:avLst/>
-          </a:prstGeom>
-          <a:ln w="57150">
-            <a:solidFill>
-              <a:schemeClr val="tx2">
-                <a:lumMod val="90000"/>
-              </a:schemeClr>
-            </a:solidFill>
-            <a:tailEnd type="triangle"/>
-          </a:ln>
-        </p:spPr>
-        <p:style>
-          <a:lnRef idx="1">
-            <a:schemeClr val="accent1"/>
-          </a:lnRef>
-          <a:fillRef idx="0">
-            <a:schemeClr val="accent1"/>
-          </a:fillRef>
-          <a:effectRef idx="0">
-            <a:schemeClr val="accent1"/>
-          </a:effectRef>
-          <a:fontRef idx="minor">
-            <a:schemeClr val="tx1"/>
-          </a:fontRef>
-        </p:style>
-      </p:cxnSp>
-      <p:cxnSp>
-        <p:nvCxnSpPr>
-          <p:cNvPr id="23" name="Connector: Curved 22">
-            <a:extLst>
-              <a:ext uri="{FF2B5EF4-FFF2-40B4-BE49-F238E27FC236}">
-                <a16:creationId xmlns:a16="http://schemas.microsoft.com/office/drawing/2014/main" id="{BA595EEC-4F5B-A1D3-B664-14D28FACE5BB}"/>
-              </a:ext>
-            </a:extLst>
-          </p:cNvPr>
-          <p:cNvCxnSpPr>
-            <a:cxnSpLocks/>
-            <a:stCxn id="17" idx="1"/>
-            <a:endCxn id="16" idx="2"/>
-          </p:cNvCxnSpPr>
-          <p:nvPr/>
-        </p:nvCxnSpPr>
-        <p:spPr>
-          <a:xfrm rot="10800000">
-            <a:off x="8391940" y="2001918"/>
-            <a:ext cx="1236763" cy="755684"/>
-          </a:xfrm>
-          <a:prstGeom prst="curvedConnector2">
-            <a:avLst/>
-          </a:prstGeom>
-          <a:ln w="57150">
-            <a:solidFill>
-              <a:schemeClr val="tx2">
-                <a:lumMod val="90000"/>
-              </a:schemeClr>
-            </a:solidFill>
-            <a:tailEnd type="triangle"/>
-          </a:ln>
-        </p:spPr>
-        <p:style>
-          <a:lnRef idx="1">
-            <a:schemeClr val="accent1"/>
-          </a:lnRef>
-          <a:fillRef idx="0">
-            <a:schemeClr val="accent1"/>
-          </a:fillRef>
-          <a:effectRef idx="0">
-            <a:schemeClr val="accent1"/>
-          </a:effectRef>
-          <a:fontRef idx="minor">
-            <a:schemeClr val="tx1"/>
-          </a:fontRef>
-        </p:style>
-      </p:cxnSp>
-      <p:cxnSp>
-        <p:nvCxnSpPr>
-          <p:cNvPr id="24" name="Connector: Curved 23">
-            <a:extLst>
-              <a:ext uri="{FF2B5EF4-FFF2-40B4-BE49-F238E27FC236}">
-                <a16:creationId xmlns:a16="http://schemas.microsoft.com/office/drawing/2014/main" id="{C8ABD545-A558-1693-D488-EF13A42FEC04}"/>
-              </a:ext>
-            </a:extLst>
-          </p:cNvPr>
-          <p:cNvCxnSpPr>
-            <a:cxnSpLocks/>
-            <a:stCxn id="18" idx="2"/>
-            <a:endCxn id="17" idx="0"/>
-          </p:cNvCxnSpPr>
-          <p:nvPr/>
-        </p:nvCxnSpPr>
-        <p:spPr>
-          <a:xfrm rot="5400000">
-            <a:off x="9191377" y="1709531"/>
-            <a:ext cx="1511366" cy="1"/>
-          </a:xfrm>
-          <a:prstGeom prst="curvedConnector3">
+          <a:prstGeom prst="curvedConnector4">
             <a:avLst>
-              <a:gd name="adj1" fmla="val 50000"/>
+              <a:gd name="adj1" fmla="val -405981"/>
+              <a:gd name="adj2" fmla="val 527005"/>
             </a:avLst>
           </a:prstGeom>
           <a:ln w="57150">
@@ -12219,75 +11735,28 @@
       </p:cxnSp>
       <p:cxnSp>
         <p:nvCxnSpPr>
-          <p:cNvPr id="25" name="Connector: Curved 24">
-            <a:extLst>
-              <a:ext uri="{FF2B5EF4-FFF2-40B4-BE49-F238E27FC236}">
-                <a16:creationId xmlns:a16="http://schemas.microsoft.com/office/drawing/2014/main" id="{73026A59-BA48-4499-0880-3C5F2BB80E2C}"/>
+          <p:cNvPr id="14" name="Connector: Curved 13">
+            <a:extLst>
+              <a:ext uri="{FF2B5EF4-FFF2-40B4-BE49-F238E27FC236}">
+                <a16:creationId xmlns:a16="http://schemas.microsoft.com/office/drawing/2014/main" id="{A5F862B4-E228-4A23-88C0-F7F0F193E1F0}"/>
               </a:ext>
             </a:extLst>
           </p:cNvPr>
           <p:cNvCxnSpPr>
             <a:cxnSpLocks/>
-            <a:stCxn id="16" idx="0"/>
-            <a:endCxn id="18" idx="1"/>
           </p:cNvCxnSpPr>
           <p:nvPr/>
         </p:nvCxnSpPr>
         <p:spPr>
-          <a:xfrm rot="5400000" flipH="1" flipV="1">
-            <a:off x="8632480" y="420920"/>
-            <a:ext cx="755682" cy="1236764"/>
+          <a:xfrm rot="16200000" flipH="1">
+            <a:off x="6108984" y="3123628"/>
+            <a:ext cx="292388" cy="318356"/>
           </a:xfrm>
-          <a:prstGeom prst="curvedConnector2">
-            <a:avLst/>
-          </a:prstGeom>
-          <a:ln w="57150">
-            <a:solidFill>
-              <a:schemeClr val="tx2">
-                <a:lumMod val="90000"/>
-              </a:schemeClr>
-            </a:solidFill>
-            <a:tailEnd type="triangle"/>
-          </a:ln>
-        </p:spPr>
-        <p:style>
-          <a:lnRef idx="1">
-            <a:schemeClr val="accent1"/>
-          </a:lnRef>
-          <a:fillRef idx="0">
-            <a:schemeClr val="accent1"/>
-          </a:fillRef>
-          <a:effectRef idx="0">
-            <a:schemeClr val="accent1"/>
-          </a:effectRef>
-          <a:fontRef idx="minor">
-            <a:schemeClr val="tx1"/>
-          </a:fontRef>
-        </p:style>
-      </p:cxnSp>
-      <p:cxnSp>
-        <p:nvCxnSpPr>
-          <p:cNvPr id="26" name="Connector: Curved 25">
-            <a:extLst>
-              <a:ext uri="{FF2B5EF4-FFF2-40B4-BE49-F238E27FC236}">
-                <a16:creationId xmlns:a16="http://schemas.microsoft.com/office/drawing/2014/main" id="{2D15D6D7-ECDA-05A5-2AC4-05D68DE1DC86}"/>
-              </a:ext>
-            </a:extLst>
-          </p:cNvPr>
-          <p:cNvCxnSpPr>
-            <a:cxnSpLocks/>
-            <a:stCxn id="20" idx="3"/>
-            <a:endCxn id="16" idx="2"/>
-          </p:cNvCxnSpPr>
-          <p:nvPr/>
-        </p:nvCxnSpPr>
-        <p:spPr>
-          <a:xfrm flipV="1">
-            <a:off x="6836820" y="2001918"/>
-            <a:ext cx="1555119" cy="755685"/>
-          </a:xfrm>
-          <a:prstGeom prst="curvedConnector2">
-            <a:avLst/>
+          <a:prstGeom prst="curvedConnector4">
+            <a:avLst>
+              <a:gd name="adj1" fmla="val -402947"/>
+              <a:gd name="adj2" fmla="val 483888"/>
+            </a:avLst>
           </a:prstGeom>
           <a:ln w="57150">
             <a:solidFill>
@@ -12315,10 +11784,10 @@
       </p:cxnSp>
       <p:pic>
         <p:nvPicPr>
-          <p:cNvPr id="2" name="Graphic 1">
-            <a:extLst>
-              <a:ext uri="{FF2B5EF4-FFF2-40B4-BE49-F238E27FC236}">
-                <a16:creationId xmlns:a16="http://schemas.microsoft.com/office/drawing/2014/main" id="{8BBAC792-9267-69F1-EC90-DADE3971BFF9}"/>
+          <p:cNvPr id="9" name="Graphic 8">
+            <a:extLst>
+              <a:ext uri="{FF2B5EF4-FFF2-40B4-BE49-F238E27FC236}">
+                <a16:creationId xmlns:a16="http://schemas.microsoft.com/office/drawing/2014/main" id="{286439E9-D16F-3552-36B4-307E7AF4455A}"/>
               </a:ext>
             </a:extLst>
           </p:cNvPr>
@@ -12328,13 +11797,13 @@
           <p:nvPr/>
         </p:nvPicPr>
         <p:blipFill>
-          <a:blip r:embed="rId4">
+          <a:blip r:embed="rId2">
             <a:extLst>
               <a:ext uri="{28A0092B-C50C-407E-A947-70E740481C1C}">
                 <a14:useLocalDpi xmlns:a14="http://schemas.microsoft.com/office/drawing/2010/main" val="0"/>
               </a:ext>
               <a:ext uri="{96DAC541-7B7A-43D3-8B79-37D633B846F1}">
-                <asvg:svgBlip xmlns:asvg="http://schemas.microsoft.com/office/drawing/2016/SVG/main" r:embed="rId5"/>
+                <asvg:svgBlip xmlns:asvg="http://schemas.microsoft.com/office/drawing/2016/SVG/main" r:embed="rId3"/>
               </a:ext>
             </a:extLst>
           </a:blip>
@@ -12344,7 +11813,7 @@
         </p:blipFill>
         <p:spPr>
           <a:xfrm>
-            <a:off x="7490924" y="1226507"/>
+            <a:off x="5038640" y="4769459"/>
             <a:ext cx="593092" cy="593092"/>
           </a:xfrm>
           <a:prstGeom prst="rect">
@@ -12354,10 +11823,10 @@
       </p:pic>
       <p:pic>
         <p:nvPicPr>
-          <p:cNvPr id="4" name="Graphic 3">
-            <a:extLst>
-              <a:ext uri="{FF2B5EF4-FFF2-40B4-BE49-F238E27FC236}">
-                <a16:creationId xmlns:a16="http://schemas.microsoft.com/office/drawing/2014/main" id="{D9925013-D648-09F9-890F-47E68455784D}"/>
+          <p:cNvPr id="16" name="Graphic 15">
+            <a:extLst>
+              <a:ext uri="{FF2B5EF4-FFF2-40B4-BE49-F238E27FC236}">
+                <a16:creationId xmlns:a16="http://schemas.microsoft.com/office/drawing/2014/main" id="{4A5D7947-EDFB-C212-2F80-6D7DC6ED85AC}"/>
               </a:ext>
             </a:extLst>
           </p:cNvPr>
@@ -12367,13 +11836,13 @@
           <p:nvPr/>
         </p:nvPicPr>
         <p:blipFill>
-          <a:blip r:embed="rId4">
+          <a:blip r:embed="rId2">
             <a:extLst>
               <a:ext uri="{28A0092B-C50C-407E-A947-70E740481C1C}">
                 <a14:useLocalDpi xmlns:a14="http://schemas.microsoft.com/office/drawing/2010/main" val="0"/>
               </a:ext>
               <a:ext uri="{96DAC541-7B7A-43D3-8B79-37D633B846F1}">
-                <asvg:svgBlip xmlns:asvg="http://schemas.microsoft.com/office/drawing/2016/SVG/main" r:embed="rId5"/>
+                <asvg:svgBlip xmlns:asvg="http://schemas.microsoft.com/office/drawing/2016/SVG/main" r:embed="rId3"/>
               </a:ext>
             </a:extLst>
           </a:blip>
@@ -12383,7 +11852,7 @@
         </p:blipFill>
         <p:spPr>
           <a:xfrm>
-            <a:off x="10247526" y="314936"/>
+            <a:off x="7476682" y="1981733"/>
             <a:ext cx="593092" cy="593092"/>
           </a:xfrm>
           <a:prstGeom prst="rect">
@@ -12393,10 +11862,10 @@
       </p:pic>
       <p:pic>
         <p:nvPicPr>
-          <p:cNvPr id="5" name="Graphic 4">
-            <a:extLst>
-              <a:ext uri="{FF2B5EF4-FFF2-40B4-BE49-F238E27FC236}">
-                <a16:creationId xmlns:a16="http://schemas.microsoft.com/office/drawing/2014/main" id="{35BA96B7-CE72-495B-18A3-6B48B9C5187F}"/>
+          <p:cNvPr id="18" name="Graphic 17">
+            <a:extLst>
+              <a:ext uri="{FF2B5EF4-FFF2-40B4-BE49-F238E27FC236}">
+                <a16:creationId xmlns:a16="http://schemas.microsoft.com/office/drawing/2014/main" id="{B7FA8230-4EE7-F1D2-3A3B-3724F13E50D2}"/>
               </a:ext>
             </a:extLst>
           </p:cNvPr>
@@ -12406,13 +11875,13 @@
           <p:nvPr/>
         </p:nvPicPr>
         <p:blipFill>
-          <a:blip r:embed="rId6">
+          <a:blip r:embed="rId4">
             <a:extLst>
               <a:ext uri="{28A0092B-C50C-407E-A947-70E740481C1C}">
                 <a14:useLocalDpi xmlns:a14="http://schemas.microsoft.com/office/drawing/2010/main" val="0"/>
               </a:ext>
               <a:ext uri="{96DAC541-7B7A-43D3-8B79-37D633B846F1}">
-                <asvg:svgBlip xmlns:asvg="http://schemas.microsoft.com/office/drawing/2016/SVG/main" r:embed="rId7"/>
+                <asvg:svgBlip xmlns:asvg="http://schemas.microsoft.com/office/drawing/2016/SVG/main" r:embed="rId5"/>
               </a:ext>
             </a:extLst>
           </a:blip>
@@ -12422,7 +11891,7 @@
         </p:blipFill>
         <p:spPr>
           <a:xfrm>
-            <a:off x="5931621" y="172986"/>
+            <a:off x="4533230" y="3195716"/>
             <a:ext cx="379476" cy="379476"/>
           </a:xfrm>
           <a:prstGeom prst="rect">
@@ -12432,10 +11901,10 @@
       </p:pic>
       <p:pic>
         <p:nvPicPr>
-          <p:cNvPr id="6" name="Graphic 5">
-            <a:extLst>
-              <a:ext uri="{FF2B5EF4-FFF2-40B4-BE49-F238E27FC236}">
-                <a16:creationId xmlns:a16="http://schemas.microsoft.com/office/drawing/2014/main" id="{DB16FB5E-4351-9532-3079-BA40DC64B7BD}"/>
+          <p:cNvPr id="19" name="Graphic 18">
+            <a:extLst>
+              <a:ext uri="{FF2B5EF4-FFF2-40B4-BE49-F238E27FC236}">
+                <a16:creationId xmlns:a16="http://schemas.microsoft.com/office/drawing/2014/main" id="{519157AC-7A45-21A6-5C13-7F3A9FA06132}"/>
               </a:ext>
             </a:extLst>
           </p:cNvPr>
@@ -12445,13 +11914,13 @@
           <p:nvPr/>
         </p:nvPicPr>
         <p:blipFill>
-          <a:blip r:embed="rId6">
+          <a:blip r:embed="rId4">
             <a:extLst>
               <a:ext uri="{28A0092B-C50C-407E-A947-70E740481C1C}">
                 <a14:useLocalDpi xmlns:a14="http://schemas.microsoft.com/office/drawing/2010/main" val="0"/>
               </a:ext>
               <a:ext uri="{96DAC541-7B7A-43D3-8B79-37D633B846F1}">
-                <asvg:svgBlip xmlns:asvg="http://schemas.microsoft.com/office/drawing/2016/SVG/main" r:embed="rId7"/>
+                <asvg:svgBlip xmlns:asvg="http://schemas.microsoft.com/office/drawing/2016/SVG/main" r:embed="rId5"/>
               </a:ext>
             </a:extLst>
           </a:blip>
@@ -12461,7 +11930,7 @@
         </p:blipFill>
         <p:spPr>
           <a:xfrm>
-            <a:off x="6219728" y="47828"/>
+            <a:off x="6885251" y="2757135"/>
             <a:ext cx="379476" cy="379476"/>
           </a:xfrm>
           <a:prstGeom prst="rect">
@@ -12471,10 +11940,10 @@
       </p:pic>
       <p:pic>
         <p:nvPicPr>
-          <p:cNvPr id="7" name="Graphic 6">
-            <a:extLst>
-              <a:ext uri="{FF2B5EF4-FFF2-40B4-BE49-F238E27FC236}">
-                <a16:creationId xmlns:a16="http://schemas.microsoft.com/office/drawing/2014/main" id="{CA8A7182-EEF6-C218-AB5F-08976F66885B}"/>
+          <p:cNvPr id="20" name="Graphic 19">
+            <a:extLst>
+              <a:ext uri="{FF2B5EF4-FFF2-40B4-BE49-F238E27FC236}">
+                <a16:creationId xmlns:a16="http://schemas.microsoft.com/office/drawing/2014/main" id="{1733C52A-0358-20EA-6BA7-40B0F88A2118}"/>
               </a:ext>
             </a:extLst>
           </p:cNvPr>
@@ -12484,13 +11953,13 @@
           <p:nvPr/>
         </p:nvPicPr>
         <p:blipFill>
-          <a:blip r:embed="rId6">
+          <a:blip r:embed="rId4">
             <a:extLst>
               <a:ext uri="{28A0092B-C50C-407E-A947-70E740481C1C}">
                 <a14:useLocalDpi xmlns:a14="http://schemas.microsoft.com/office/drawing/2010/main" val="0"/>
               </a:ext>
               <a:ext uri="{96DAC541-7B7A-43D3-8B79-37D633B846F1}">
-                <asvg:svgBlip xmlns:asvg="http://schemas.microsoft.com/office/drawing/2016/SVG/main" r:embed="rId7"/>
+                <asvg:svgBlip xmlns:asvg="http://schemas.microsoft.com/office/drawing/2016/SVG/main" r:embed="rId5"/>
               </a:ext>
             </a:extLst>
           </a:blip>
@@ -12500,7 +11969,7 @@
         </p:blipFill>
         <p:spPr>
           <a:xfrm>
-            <a:off x="9471207" y="101300"/>
+            <a:off x="6500847" y="1466956"/>
             <a:ext cx="379476" cy="379476"/>
           </a:xfrm>
           <a:prstGeom prst="rect">
@@ -12510,10 +11979,10 @@
       </p:pic>
       <p:pic>
         <p:nvPicPr>
-          <p:cNvPr id="8" name="Graphic 7">
-            <a:extLst>
-              <a:ext uri="{FF2B5EF4-FFF2-40B4-BE49-F238E27FC236}">
-                <a16:creationId xmlns:a16="http://schemas.microsoft.com/office/drawing/2014/main" id="{847DB214-50A2-33BF-D5FD-2EDE254E6E09}"/>
+          <p:cNvPr id="21" name="Graphic 20">
+            <a:extLst>
+              <a:ext uri="{FF2B5EF4-FFF2-40B4-BE49-F238E27FC236}">
+                <a16:creationId xmlns:a16="http://schemas.microsoft.com/office/drawing/2014/main" id="{9F926BF8-F7C0-5DD6-A6CC-CCB4A7318B93}"/>
               </a:ext>
             </a:extLst>
           </p:cNvPr>
@@ -12523,13 +11992,13 @@
           <p:nvPr/>
         </p:nvPicPr>
         <p:blipFill>
-          <a:blip r:embed="rId6">
+          <a:blip r:embed="rId4">
             <a:extLst>
               <a:ext uri="{28A0092B-C50C-407E-A947-70E740481C1C}">
                 <a14:useLocalDpi xmlns:a14="http://schemas.microsoft.com/office/drawing/2010/main" val="0"/>
               </a:ext>
               <a:ext uri="{96DAC541-7B7A-43D3-8B79-37D633B846F1}">
-                <asvg:svgBlip xmlns:asvg="http://schemas.microsoft.com/office/drawing/2016/SVG/main" r:embed="rId7"/>
+                <asvg:svgBlip xmlns:asvg="http://schemas.microsoft.com/office/drawing/2016/SVG/main" r:embed="rId5"/>
               </a:ext>
             </a:extLst>
           </a:blip>
@@ -12539,7 +12008,7 @@
         </p:blipFill>
         <p:spPr>
           <a:xfrm>
-            <a:off x="10057788" y="2884866"/>
+            <a:off x="5906261" y="4389983"/>
             <a:ext cx="379476" cy="379476"/>
           </a:xfrm>
           <a:prstGeom prst="rect">
@@ -12549,10 +12018,10 @@
       </p:pic>
       <p:pic>
         <p:nvPicPr>
-          <p:cNvPr id="10" name="Graphic 9">
-            <a:extLst>
-              <a:ext uri="{FF2B5EF4-FFF2-40B4-BE49-F238E27FC236}">
-                <a16:creationId xmlns:a16="http://schemas.microsoft.com/office/drawing/2014/main" id="{05C03865-B1EF-6469-53C1-BFBF80725646}"/>
+          <p:cNvPr id="22" name="Graphic 21">
+            <a:extLst>
+              <a:ext uri="{FF2B5EF4-FFF2-40B4-BE49-F238E27FC236}">
+                <a16:creationId xmlns:a16="http://schemas.microsoft.com/office/drawing/2014/main" id="{AB454400-4A4D-758D-D44E-5C9D00DA144F}"/>
               </a:ext>
             </a:extLst>
           </p:cNvPr>
@@ -12562,13 +12031,13 @@
           <p:nvPr/>
         </p:nvPicPr>
         <p:blipFill>
-          <a:blip r:embed="rId6">
+          <a:blip r:embed="rId4">
             <a:extLst>
               <a:ext uri="{28A0092B-C50C-407E-A947-70E740481C1C}">
                 <a14:useLocalDpi xmlns:a14="http://schemas.microsoft.com/office/drawing/2010/main" val="0"/>
               </a:ext>
               <a:ext uri="{96DAC541-7B7A-43D3-8B79-37D633B846F1}">
-                <asvg:svgBlip xmlns:asvg="http://schemas.microsoft.com/office/drawing/2016/SVG/main" r:embed="rId7"/>
+                <asvg:svgBlip xmlns:asvg="http://schemas.microsoft.com/office/drawing/2016/SVG/main" r:embed="rId5"/>
               </a:ext>
             </a:extLst>
           </a:blip>
@@ -12578,7 +12047,7 @@
         </p:blipFill>
         <p:spPr>
           <a:xfrm>
-            <a:off x="6028258" y="2939716"/>
+            <a:off x="4153754" y="4283175"/>
             <a:ext cx="379476" cy="379476"/>
           </a:xfrm>
           <a:prstGeom prst="rect">
@@ -12588,10 +12057,10 @@
       </p:pic>
       <p:pic>
         <p:nvPicPr>
-          <p:cNvPr id="11" name="Graphic 10">
-            <a:extLst>
-              <a:ext uri="{FF2B5EF4-FFF2-40B4-BE49-F238E27FC236}">
-                <a16:creationId xmlns:a16="http://schemas.microsoft.com/office/drawing/2014/main" id="{EBF02DFA-5526-D5DC-E376-A9B2C86ED3EC}"/>
+          <p:cNvPr id="39" name="Graphic 38" descr="Traffic light with solid fill">
+            <a:extLst>
+              <a:ext uri="{FF2B5EF4-FFF2-40B4-BE49-F238E27FC236}">
+                <a16:creationId xmlns:a16="http://schemas.microsoft.com/office/drawing/2014/main" id="{E6DE5A60-8F69-E94C-E26F-DB24DDBD2275}"/>
               </a:ext>
             </a:extLst>
           </p:cNvPr>
@@ -12601,13 +12070,13 @@
           <p:nvPr/>
         </p:nvPicPr>
         <p:blipFill>
-          <a:blip r:embed="rId8">
+          <a:blip r:embed="rId6">
             <a:extLst>
               <a:ext uri="{28A0092B-C50C-407E-A947-70E740481C1C}">
                 <a14:useLocalDpi xmlns:a14="http://schemas.microsoft.com/office/drawing/2010/main" val="0"/>
               </a:ext>
               <a:ext uri="{96DAC541-7B7A-43D3-8B79-37D633B846F1}">
-                <asvg:svgBlip xmlns:asvg="http://schemas.microsoft.com/office/drawing/2016/SVG/main" r:embed="rId9"/>
+                <asvg:svgBlip xmlns:asvg="http://schemas.microsoft.com/office/drawing/2016/SVG/main" r:embed="rId7"/>
               </a:ext>
             </a:extLst>
           </a:blip>
@@ -12617,8 +12086,8 @@
         </p:blipFill>
         <p:spPr>
           <a:xfrm>
-            <a:off x="7547015" y="1750528"/>
-            <a:ext cx="653845" cy="653845"/>
+            <a:off x="5721204" y="3054204"/>
+            <a:ext cx="749589" cy="749589"/>
           </a:xfrm>
           <a:prstGeom prst="rect">
             <a:avLst/>
@@ -12628,20 +12097,20 @@
     </p:spTree>
     <p:extLst>
       <p:ext uri="{BB962C8B-B14F-4D97-AF65-F5344CB8AC3E}">
-        <p14:creationId xmlns:p14="http://schemas.microsoft.com/office/powerpoint/2010/main" val="3619197414"/>
+        <p14:creationId xmlns:p14="http://schemas.microsoft.com/office/powerpoint/2010/main" val="2666513796"/>
       </p:ext>
     </p:extLst>
   </p:cSld>
   <p:clrMapOvr>
     <a:masterClrMapping/>
   </p:clrMapOvr>
-  <mc:AlternateContent xmlns:mc="http://schemas.openxmlformats.org/markup-compatibility/2006" xmlns:p159="http://schemas.microsoft.com/office/powerpoint/2015/09/main">
-    <mc:Choice Requires="p159">
+  <mc:AlternateContent xmlns:mc="http://schemas.openxmlformats.org/markup-compatibility/2006">
+    <mc:Choice xmlns:p159="http://schemas.microsoft.com/office/powerpoint/2015/09/main" Requires="p159">
       <p:transition xmlns:p14="http://schemas.microsoft.com/office/powerpoint/2010/main" spd="slow" p14:dur="2000">
         <p159:morph option="byObject"/>
       </p:transition>
     </mc:Choice>
-    <mc:Fallback xmlns="">
+    <mc:Fallback>
       <p:transition spd="slow">
         <p:fade/>
       </p:transition>
@@ -12659,6 +12128,9 @@
                     <p:cTn id="3" fill="hold">
                       <p:stCondLst>
                         <p:cond delay="indefinite"/>
+                        <p:cond evt="onBegin" delay="0">
+                          <p:tn val="2"/>
+                        </p:cond>
                       </p:stCondLst>
                       <p:childTnLst>
                         <p:par>
@@ -12668,7 +12140,7 @@
                             </p:stCondLst>
                             <p:childTnLst>
                               <p:par>
-                                <p:cTn id="5" presetID="10" presetClass="entr" presetSubtype="0" fill="hold" nodeType="clickEffect">
+                                <p:cTn id="5" presetID="21" presetClass="entr" presetSubtype="1" fill="hold" nodeType="afterEffect">
                                   <p:stCondLst>
                                     <p:cond delay="0"/>
                                   </p:stCondLst>
@@ -12681,7 +12153,7 @@
                                           </p:stCondLst>
                                         </p:cTn>
                                         <p:tgtEl>
-                                          <p:spTgt spid="3"/>
+                                          <p:spTgt spid="10"/>
                                         </p:tgtEl>
                                         <p:attrNameLst>
                                           <p:attrName>style.visibility</p:attrName>
@@ -12691,50 +12163,32 @@
                                         <p:strVal val="visible"/>
                                       </p:to>
                                     </p:set>
-                                    <p:animEffect transition="in" filter="fade">
+                                    <p:animEffect transition="in" filter="wheel(1)">
                                       <p:cBhvr>
-                                        <p:cTn id="7" dur="500"/>
+                                        <p:cTn id="7" dur="2000"/>
                                         <p:tgtEl>
-                                          <p:spTgt spid="3"/>
+                                          <p:spTgt spid="10"/>
                                         </p:tgtEl>
                                       </p:cBhvr>
                                     </p:animEffect>
                                   </p:childTnLst>
                                 </p:cTn>
                               </p:par>
-                            </p:childTnLst>
-                          </p:cTn>
-                        </p:par>
-                      </p:childTnLst>
-                    </p:cTn>
-                  </p:par>
-                  <p:par>
-                    <p:cTn id="8" fill="hold">
-                      <p:stCondLst>
-                        <p:cond delay="indefinite"/>
-                      </p:stCondLst>
-                      <p:childTnLst>
-                        <p:par>
-                          <p:cTn id="9" fill="hold">
-                            <p:stCondLst>
-                              <p:cond delay="0"/>
-                            </p:stCondLst>
-                            <p:childTnLst>
                               <p:par>
-                                <p:cTn id="10" presetID="10" presetClass="entr" presetSubtype="0" fill="hold" nodeType="clickEffect">
+                                <p:cTn id="8" presetID="21" presetClass="entr" presetSubtype="1" fill="hold" nodeType="withEffect">
                                   <p:stCondLst>
                                     <p:cond delay="0"/>
                                   </p:stCondLst>
                                   <p:childTnLst>
                                     <p:set>
                                       <p:cBhvr>
-                                        <p:cTn id="11" dur="1" fill="hold">
+                                        <p:cTn id="9" dur="1" fill="hold">
                                           <p:stCondLst>
                                             <p:cond delay="0"/>
                                           </p:stCondLst>
                                         </p:cTn>
                                         <p:tgtEl>
-                                          <p:spTgt spid="9"/>
+                                          <p:spTgt spid="14"/>
                                         </p:tgtEl>
                                         <p:attrNameLst>
                                           <p:attrName>style.visibility</p:attrName>
@@ -12744,11 +12198,11 @@
                                         <p:strVal val="visible"/>
                                       </p:to>
                                     </p:set>
-                                    <p:animEffect transition="in" filter="fade">
+                                    <p:animEffect transition="in" filter="wheel(1)">
                                       <p:cBhvr>
-                                        <p:cTn id="12" dur="500"/>
+                                        <p:cTn id="10" dur="2000"/>
                                         <p:tgtEl>
-                                          <p:spTgt spid="9"/>
+                                          <p:spTgt spid="14"/>
                                         </p:tgtEl>
                                       </p:cBhvr>
                                     </p:animEffect>
@@ -12786,6 +12240,161 @@
 </p:sld>
 </file>
 
+<file path=ppt/slides/slide8.xml><?xml version="1.0" encoding="utf-8"?>
+<p:sld xmlns:a="http://schemas.openxmlformats.org/drawingml/2006/main" xmlns:r="http://schemas.openxmlformats.org/officeDocument/2006/relationships" xmlns:p="http://schemas.openxmlformats.org/presentationml/2006/main" showMasterSp="0">
+  <p:cSld>
+    <p:spTree>
+      <p:nvGrpSpPr>
+        <p:cNvPr id="1" name=""/>
+        <p:cNvGrpSpPr/>
+        <p:nvPr/>
+      </p:nvGrpSpPr>
+      <p:grpSpPr>
+        <a:xfrm>
+          <a:off x="0" y="0"/>
+          <a:ext cx="0" cy="0"/>
+          <a:chOff x="0" y="0"/>
+          <a:chExt cx="0" cy="0"/>
+        </a:xfrm>
+      </p:grpSpPr>
+      <p:sp>
+        <p:nvSpPr>
+          <p:cNvPr id="4" name="Title 3">
+            <a:extLst>
+              <a:ext uri="{FF2B5EF4-FFF2-40B4-BE49-F238E27FC236}">
+                <a16:creationId xmlns:a16="http://schemas.microsoft.com/office/drawing/2014/main" id="{80EAC0C6-7B8A-1444-CF6E-AFD7613F9128}"/>
+              </a:ext>
+            </a:extLst>
+          </p:cNvPr>
+          <p:cNvSpPr>
+            <a:spLocks noGrp="1"/>
+          </p:cNvSpPr>
+          <p:nvPr>
+            <p:ph type="title"/>
+          </p:nvPr>
+        </p:nvSpPr>
+        <p:spPr/>
+        <p:txBody>
+          <a:bodyPr/>
+          <a:lstStyle/>
+          <a:p>
+            <a:r>
+              <a:rPr lang="en-CA" dirty="0"/>
+              <a:t>1. Go, shuttle, go!</a:t>
+            </a:r>
+          </a:p>
+        </p:txBody>
+      </p:sp>
+      <p:sp>
+        <p:nvSpPr>
+          <p:cNvPr id="5" name="Content Placeholder 4">
+            <a:extLst>
+              <a:ext uri="{FF2B5EF4-FFF2-40B4-BE49-F238E27FC236}">
+                <a16:creationId xmlns:a16="http://schemas.microsoft.com/office/drawing/2014/main" id="{916B2140-6178-6477-FAC2-4FC081B9C2C5}"/>
+              </a:ext>
+            </a:extLst>
+          </p:cNvPr>
+          <p:cNvSpPr>
+            <a:spLocks noGrp="1"/>
+          </p:cNvSpPr>
+          <p:nvPr>
+            <p:ph idx="1"/>
+          </p:nvPr>
+        </p:nvSpPr>
+        <p:spPr>
+          <a:xfrm>
+            <a:off x="838199" y="1825625"/>
+            <a:ext cx="10645877" cy="4351338"/>
+          </a:xfrm>
+        </p:spPr>
+        <p:txBody>
+          <a:bodyPr/>
+          <a:lstStyle/>
+          <a:p>
+            <a:pPr marL="0" indent="0">
+              <a:buNone/>
+            </a:pPr>
+            <a:r>
+              <a:rPr lang="en-CA" dirty="0"/>
+              <a:t>Warm-up: let’s have shuttles drive when their (infinite) circuit is going.</a:t>
+            </a:r>
+            <a:br>
+              <a:rPr lang="en-CA" dirty="0"/>
+            </a:br>
+            <a:endParaRPr lang="en-CA" dirty="0"/>
+          </a:p>
+          <a:p>
+            <a:r>
+              <a:rPr lang="en-CA" b="1" dirty="0">
+                <a:solidFill>
+                  <a:schemeClr val="accent4"/>
+                </a:solidFill>
+              </a:rPr>
+              <a:t>light-change</a:t>
+            </a:r>
+            <a:r>
+              <a:rPr lang="en-CA" dirty="0"/>
+              <a:t>: Action to switch which circuit is going</a:t>
+            </a:r>
+          </a:p>
+          <a:p>
+            <a:r>
+              <a:rPr lang="en-CA" b="1" dirty="0">
+                <a:solidFill>
+                  <a:schemeClr val="accent6">
+                    <a:lumMod val="60000"/>
+                    <a:lumOff val="40000"/>
+                  </a:schemeClr>
+                </a:solidFill>
+              </a:rPr>
+              <a:t>drive</a:t>
+            </a:r>
+            <a:r>
+              <a:rPr lang="en-CA" dirty="0"/>
+              <a:t>: Process to move the “going” shuttles along</a:t>
+            </a:r>
+          </a:p>
+          <a:p>
+            <a:r>
+              <a:rPr lang="en-CA" b="1" dirty="0">
+                <a:solidFill>
+                  <a:schemeClr val="accent4"/>
+                </a:solidFill>
+              </a:rPr>
+              <a:t>finish</a:t>
+            </a:r>
+            <a:r>
+              <a:rPr lang="en-CA" dirty="0"/>
+              <a:t>: Action that captures what we want to have happen</a:t>
+            </a:r>
+          </a:p>
+          <a:p>
+            <a:endParaRPr lang="en-CA" dirty="0"/>
+          </a:p>
+          <a:p>
+            <a:pPr marL="0" indent="0" algn="ctr">
+              <a:buNone/>
+            </a:pPr>
+            <a:r>
+              <a:rPr lang="en-CA" dirty="0"/>
+              <a:t>http://editor.planning.domains/planning-course/hybrid/gogogo</a:t>
+            </a:r>
+          </a:p>
+        </p:txBody>
+      </p:sp>
+    </p:spTree>
+    <p:extLst>
+      <p:ext uri="{BB962C8B-B14F-4D97-AF65-F5344CB8AC3E}">
+        <p14:creationId xmlns:p14="http://schemas.microsoft.com/office/powerpoint/2010/main" val="1315833981"/>
+      </p:ext>
+    </p:extLst>
+  </p:cSld>
+  <p:clrMapOvr>
+    <a:masterClrMapping/>
+  </p:clrMapOvr>
+</p:sld>
+</file>
+
 <file path=ppt/slides/slide9.xml><?xml version="1.0" encoding="utf-8"?>
 <p:sld xmlns:a="http://schemas.openxmlformats.org/drawingml/2006/main" xmlns:r="http://schemas.openxmlformats.org/officeDocument/2006/relationships" xmlns:p="http://schemas.openxmlformats.org/presentationml/2006/main" showMasterSp="0">
   <p:cSld>
@@ -12805,39 +12414,6 @@
       </p:grpSpPr>
       <p:sp>
         <p:nvSpPr>
-          <p:cNvPr id="4" name="Title 3">
-            <a:extLst>
-              <a:ext uri="{FF2B5EF4-FFF2-40B4-BE49-F238E27FC236}">
-                <a16:creationId xmlns:a16="http://schemas.microsoft.com/office/drawing/2014/main" id="{80EAC0C6-7B8A-1444-CF6E-AFD7613F9128}"/>
-              </a:ext>
-            </a:extLst>
-          </p:cNvPr>
-          <p:cNvSpPr>
-            <a:spLocks noGrp="1"/>
-          </p:cNvSpPr>
-          <p:nvPr>
-            <p:ph type="title"/>
-          </p:nvPr>
-        </p:nvSpPr>
-        <p:spPr/>
-        <p:txBody>
-          <a:bodyPr/>
-          <a:lstStyle/>
-          <a:p>
-            <a:r>
-              <a:rPr lang="en-CA" dirty="0"/>
-              <a:t>1. </a:t>
-            </a:r>
-            <a:r>
-              <a:rPr lang="en-US" dirty="0"/>
-              <a:t>Moving a manual car around</a:t>
-            </a:r>
-            <a:endParaRPr lang="en-CA" dirty="0"/>
-          </a:p>
-        </p:txBody>
-      </p:sp>
-      <p:sp>
-        <p:nvSpPr>
           <p:cNvPr id="5" name="Content Placeholder 4">
             <a:extLst>
               <a:ext uri="{FF2B5EF4-FFF2-40B4-BE49-F238E27FC236}">
@@ -12857,10 +12433,10 @@
           <a:bodyPr/>
           <a:lstStyle/>
           <a:p>
-            <a:r>
-              <a:rPr lang="en-CA" dirty="0"/>
-              <a:t>Just a warm-up. Let’s get this car to where it wants to go…</a:t>
-            </a:r>
+            <a:pPr marL="0" indent="0">
+              <a:buNone/>
+            </a:pPr>
+            <a:endParaRPr lang="en-CA" dirty="0"/>
           </a:p>
           <a:p>
             <a:endParaRPr lang="en-CA" dirty="0"/>
@@ -12874,7 +12450,7 @@
             </a:pPr>
             <a:r>
               <a:rPr lang="en-CA" sz="2800" dirty="0"/>
-              <a:t>http://editor.planning.domains/planning-course/adl/moving-mv</a:t>
+              <a:t>http://editor.planning.domains/planning-course/hybrid/going</a:t>
             </a:r>
           </a:p>
         </p:txBody>
@@ -12882,13 +12458,25 @@
     </p:spTree>
     <p:extLst>
       <p:ext uri="{BB962C8B-B14F-4D97-AF65-F5344CB8AC3E}">
-        <p14:creationId xmlns:p14="http://schemas.microsoft.com/office/powerpoint/2010/main" val="1315833981"/>
+        <p14:creationId xmlns:p14="http://schemas.microsoft.com/office/powerpoint/2010/main" val="4031490244"/>
       </p:ext>
     </p:extLst>
   </p:cSld>
   <p:clrMapOvr>
     <a:masterClrMapping/>
   </p:clrMapOvr>
+  <mc:AlternateContent xmlns:mc="http://schemas.openxmlformats.org/markup-compatibility/2006" xmlns:p14="http://schemas.microsoft.com/office/powerpoint/2010/main">
+    <mc:Choice Requires="p14">
+      <p:transition spd="med" p14:dur="700">
+        <p:fade/>
+      </p:transition>
+    </mc:Choice>
+    <mc:Fallback xmlns="">
+      <p:transition spd="med">
+        <p:fade/>
+      </p:transition>
+    </mc:Fallback>
+  </mc:AlternateContent>
 </p:sld>
 </file>
 

</xml_diff>

<commit_message>
Finished the hybrid tutorial slides.
</commit_message>
<xml_diff>
--- a/exercises/cisc-813/hybrid/slides.pptx
+++ b/exercises/cisc-813/hybrid/slides.pptx
@@ -12,17 +12,18 @@
     <p:sldId id="261" r:id="rId6"/>
     <p:sldId id="1693" r:id="rId7"/>
     <p:sldId id="1705" r:id="rId8"/>
-    <p:sldId id="1694" r:id="rId9"/>
-    <p:sldId id="1700" r:id="rId10"/>
-    <p:sldId id="1695" r:id="rId11"/>
-    <p:sldId id="1701" r:id="rId12"/>
-    <p:sldId id="1696" r:id="rId13"/>
-    <p:sldId id="1702" r:id="rId14"/>
-    <p:sldId id="1697" r:id="rId15"/>
-    <p:sldId id="1703" r:id="rId16"/>
-    <p:sldId id="1698" r:id="rId17"/>
-    <p:sldId id="1704" r:id="rId18"/>
-    <p:sldId id="1684" r:id="rId19"/>
+    <p:sldId id="1706" r:id="rId9"/>
+    <p:sldId id="1694" r:id="rId10"/>
+    <p:sldId id="1700" r:id="rId11"/>
+    <p:sldId id="1695" r:id="rId12"/>
+    <p:sldId id="1701" r:id="rId13"/>
+    <p:sldId id="1696" r:id="rId14"/>
+    <p:sldId id="1702" r:id="rId15"/>
+    <p:sldId id="1697" r:id="rId16"/>
+    <p:sldId id="1703" r:id="rId17"/>
+    <p:sldId id="1698" r:id="rId18"/>
+    <p:sldId id="1704" r:id="rId19"/>
+    <p:sldId id="1684" r:id="rId20"/>
   </p:sldIdLst>
   <p:sldSz cx="12192000" cy="6858000"/>
   <p:notesSz cx="6858000" cy="9144000"/>
@@ -9195,6 +9196,91 @@
       </p:grpSpPr>
       <p:sp>
         <p:nvSpPr>
+          <p:cNvPr id="5" name="Content Placeholder 4">
+            <a:extLst>
+              <a:ext uri="{FF2B5EF4-FFF2-40B4-BE49-F238E27FC236}">
+                <a16:creationId xmlns:a16="http://schemas.microsoft.com/office/drawing/2014/main" id="{916B2140-6178-6477-FAC2-4FC081B9C2C5}"/>
+              </a:ext>
+            </a:extLst>
+          </p:cNvPr>
+          <p:cNvSpPr>
+            <a:spLocks noGrp="1"/>
+          </p:cNvSpPr>
+          <p:nvPr>
+            <p:ph idx="1"/>
+          </p:nvPr>
+        </p:nvSpPr>
+        <p:spPr/>
+        <p:txBody>
+          <a:bodyPr/>
+          <a:lstStyle/>
+          <a:p>
+            <a:pPr marL="0" indent="0">
+              <a:buNone/>
+            </a:pPr>
+            <a:endParaRPr lang="en-CA" dirty="0"/>
+          </a:p>
+          <a:p>
+            <a:endParaRPr lang="en-CA" dirty="0"/>
+          </a:p>
+          <a:p>
+            <a:endParaRPr lang="en-CA" dirty="0"/>
+          </a:p>
+          <a:p>
+            <a:pPr marL="0" indent="0" algn="ctr">
+              <a:buNone/>
+            </a:pPr>
+            <a:r>
+              <a:rPr lang="en-CA" sz="2800" dirty="0"/>
+              <a:t>http://editor.planning.domains/planning-course/hybrid/going</a:t>
+            </a:r>
+          </a:p>
+        </p:txBody>
+      </p:sp>
+    </p:spTree>
+    <p:extLst>
+      <p:ext uri="{BB962C8B-B14F-4D97-AF65-F5344CB8AC3E}">
+        <p14:creationId xmlns:p14="http://schemas.microsoft.com/office/powerpoint/2010/main" val="4031490244"/>
+      </p:ext>
+    </p:extLst>
+  </p:cSld>
+  <p:clrMapOvr>
+    <a:masterClrMapping/>
+  </p:clrMapOvr>
+  <mc:AlternateContent xmlns:mc="http://schemas.openxmlformats.org/markup-compatibility/2006" xmlns:p14="http://schemas.microsoft.com/office/powerpoint/2010/main">
+    <mc:Choice Requires="p14">
+      <p:transition spd="med" p14:dur="700">
+        <p:fade/>
+      </p:transition>
+    </mc:Choice>
+    <mc:Fallback xmlns="">
+      <p:transition spd="med">
+        <p:fade/>
+      </p:transition>
+    </mc:Fallback>
+  </mc:AlternateContent>
+</p:sld>
+</file>
+
+<file path=ppt/slides/slide11.xml><?xml version="1.0" encoding="utf-8"?>
+<p:sld xmlns:a="http://schemas.openxmlformats.org/drawingml/2006/main" xmlns:r="http://schemas.openxmlformats.org/officeDocument/2006/relationships" xmlns:p="http://schemas.openxmlformats.org/presentationml/2006/main" showMasterSp="0">
+  <p:cSld>
+    <p:spTree>
+      <p:nvGrpSpPr>
+        <p:cNvPr id="1" name=""/>
+        <p:cNvGrpSpPr/>
+        <p:nvPr/>
+      </p:nvGrpSpPr>
+      <p:grpSpPr>
+        <a:xfrm>
+          <a:off x="0" y="0"/>
+          <a:ext cx="0" cy="0"/>
+          <a:chOff x="0" y="0"/>
+          <a:chExt cx="0" cy="0"/>
+        </a:xfrm>
+      </p:grpSpPr>
+      <p:sp>
+        <p:nvSpPr>
           <p:cNvPr id="4" name="Title 3">
             <a:extLst>
               <a:ext uri="{FF2B5EF4-FFF2-40B4-BE49-F238E27FC236}">
@@ -9261,7 +9347,19 @@
             </a:r>
             <a:r>
               <a:rPr lang="en-CA" dirty="0"/>
-              <a:t> event, along with counters, so we can make sure the shuttles can go round and round and …</a:t>
+              <a:t> event, along with counters, so we can make sure the </a:t>
+            </a:r>
+            <a:r>
+              <a:rPr lang="en-CA" dirty="0">
+                <a:solidFill>
+                  <a:schemeClr val="accent3"/>
+                </a:solidFill>
+              </a:rPr>
+              <a:t>shuttles</a:t>
+            </a:r>
+            <a:r>
+              <a:rPr lang="en-CA" dirty="0"/>
+              <a:t> can go round and round and …</a:t>
             </a:r>
           </a:p>
           <a:p>
@@ -9300,7 +9398,7 @@
 </p:sld>
 </file>
 
-<file path=ppt/slides/slide11.xml><?xml version="1.0" encoding="utf-8"?>
+<file path=ppt/slides/slide12.xml><?xml version="1.0" encoding="utf-8"?>
 <p:sld xmlns:a="http://schemas.openxmlformats.org/drawingml/2006/main" xmlns:r="http://schemas.openxmlformats.org/officeDocument/2006/relationships" xmlns:p="http://schemas.openxmlformats.org/presentationml/2006/main" showMasterSp="0">
   <p:cSld>
     <p:spTree>
@@ -9385,7 +9483,7 @@
 </p:sld>
 </file>
 
-<file path=ppt/slides/slide12.xml><?xml version="1.0" encoding="utf-8"?>
+<file path=ppt/slides/slide13.xml><?xml version="1.0" encoding="utf-8"?>
 <p:sld xmlns:a="http://schemas.openxmlformats.org/drawingml/2006/main" xmlns:r="http://schemas.openxmlformats.org/officeDocument/2006/relationships" xmlns:p="http://schemas.openxmlformats.org/presentationml/2006/main" showMasterSp="0">
   <p:cSld>
     <p:spTree>
@@ -9453,7 +9551,91 @@
           <a:p>
             <a:r>
               <a:rPr lang="en-CA" dirty="0"/>
-              <a:t>Put the shuttles on the circuit!</a:t>
+              <a:t>Add a crash </a:t>
+            </a:r>
+            <a:r>
+              <a:rPr lang="en-CA" b="1" dirty="0">
+                <a:solidFill>
+                  <a:schemeClr val="accent1"/>
+                </a:solidFill>
+              </a:rPr>
+              <a:t>event</a:t>
+            </a:r>
+            <a:r>
+              <a:rPr lang="en-CA" dirty="0"/>
+              <a:t> that will smash the two </a:t>
+            </a:r>
+            <a:r>
+              <a:rPr lang="en-CA" dirty="0">
+                <a:solidFill>
+                  <a:schemeClr val="accent3"/>
+                </a:solidFill>
+              </a:rPr>
+              <a:t>shuttles</a:t>
+            </a:r>
+            <a:r>
+              <a:rPr lang="en-CA" dirty="0"/>
+              <a:t> together.</a:t>
+            </a:r>
+          </a:p>
+          <a:p>
+            <a:r>
+              <a:rPr lang="en-CA" dirty="0"/>
+              <a:t>To make sure it works, let’s set the goal to include </a:t>
+            </a:r>
+            <a:r>
+              <a:rPr lang="en-CA" dirty="0">
+                <a:solidFill>
+                  <a:schemeClr val="accent2"/>
+                </a:solidFill>
+              </a:rPr>
+              <a:t>crash</a:t>
+            </a:r>
+            <a:r>
+              <a:rPr lang="en-CA" dirty="0"/>
+              <a:t>ing</a:t>
+            </a:r>
+          </a:p>
+          <a:p>
+            <a:r>
+              <a:rPr lang="en-CA" dirty="0"/>
+              <a:t>To let the planner control things, have </a:t>
+            </a:r>
+            <a:r>
+              <a:rPr lang="en-CA" b="1" dirty="0">
+                <a:solidFill>
+                  <a:schemeClr val="accent4"/>
+                </a:solidFill>
+              </a:rPr>
+              <a:t>start-driving</a:t>
+            </a:r>
+            <a:r>
+              <a:rPr lang="en-CA" dirty="0"/>
+              <a:t> and </a:t>
+            </a:r>
+            <a:r>
+              <a:rPr lang="en-CA" b="1" dirty="0">
+                <a:solidFill>
+                  <a:schemeClr val="accent4"/>
+                </a:solidFill>
+              </a:rPr>
+              <a:t>stop-driving</a:t>
+            </a:r>
+            <a:r>
+              <a:rPr lang="en-CA" dirty="0"/>
+              <a:t> actions that just change the </a:t>
+            </a:r>
+            <a:r>
+              <a:rPr lang="en-CA" dirty="0">
+                <a:solidFill>
+                  <a:schemeClr val="accent2"/>
+                </a:solidFill>
+              </a:rPr>
+              <a:t>driving</a:t>
+            </a:r>
+            <a:r>
+              <a:rPr lang="en-CA" dirty="0"/>
+              <a:t> status</a:t>
             </a:r>
           </a:p>
           <a:p>
@@ -9487,7 +9669,7 @@
 </p:sld>
 </file>
 
-<file path=ppt/slides/slide13.xml><?xml version="1.0" encoding="utf-8"?>
+<file path=ppt/slides/slide14.xml><?xml version="1.0" encoding="utf-8"?>
 <p:sld xmlns:a="http://schemas.openxmlformats.org/drawingml/2006/main" xmlns:r="http://schemas.openxmlformats.org/officeDocument/2006/relationships" xmlns:p="http://schemas.openxmlformats.org/presentationml/2006/main" showMasterSp="0">
   <p:cSld>
     <p:spTree>
@@ -9572,7 +9754,7 @@
 </p:sld>
 </file>
 
-<file path=ppt/slides/slide14.xml><?xml version="1.0" encoding="utf-8"?>
+<file path=ppt/slides/slide15.xml><?xml version="1.0" encoding="utf-8"?>
 <p:sld xmlns:a="http://schemas.openxmlformats.org/drawingml/2006/main" xmlns:r="http://schemas.openxmlformats.org/officeDocument/2006/relationships" xmlns:p="http://schemas.openxmlformats.org/presentationml/2006/main" showMasterSp="0">
   <p:cSld>
     <p:spTree>
@@ -9643,9 +9825,93 @@
           <a:bodyPr/>
           <a:lstStyle/>
           <a:p>
+            <a:pPr marL="0" indent="0">
+              <a:buNone/>
+            </a:pPr>
             <a:r>
               <a:rPr lang="en-CA" dirty="0"/>
-              <a:t>Everyone aboard! Either that, or get outa here…</a:t>
+              <a:t>Let’s go back to letting the cars loose</a:t>
+            </a:r>
+          </a:p>
+          <a:p>
+            <a:r>
+              <a:rPr lang="en-CA" dirty="0"/>
+              <a:t>Remove the </a:t>
+            </a:r>
+            <a:r>
+              <a:rPr lang="en-CA" dirty="0">
+                <a:solidFill>
+                  <a:schemeClr val="accent4"/>
+                </a:solidFill>
+              </a:rPr>
+              <a:t>start</a:t>
+            </a:r>
+            <a:r>
+              <a:rPr lang="en-CA" dirty="0"/>
+              <a:t>/</a:t>
+            </a:r>
+            <a:r>
+              <a:rPr lang="en-CA" dirty="0">
+                <a:solidFill>
+                  <a:schemeClr val="accent4"/>
+                </a:solidFill>
+              </a:rPr>
+              <a:t>stop</a:t>
+            </a:r>
+            <a:r>
+              <a:rPr lang="en-CA" dirty="0"/>
+              <a:t> actions</a:t>
+            </a:r>
+          </a:p>
+          <a:p>
+            <a:r>
+              <a:rPr lang="en-CA" dirty="0"/>
+              <a:t>Add a </a:t>
+            </a:r>
+            <a:r>
+              <a:rPr lang="en-CA" b="1" dirty="0">
+                <a:solidFill>
+                  <a:schemeClr val="accent1"/>
+                </a:solidFill>
+              </a:rPr>
+              <a:t>light-change</a:t>
+            </a:r>
+            <a:r>
+              <a:rPr lang="en-CA" dirty="0"/>
+              <a:t> event that alternates which </a:t>
+            </a:r>
+            <a:r>
+              <a:rPr lang="en-CA" dirty="0">
+                <a:solidFill>
+                  <a:schemeClr val="accent3"/>
+                </a:solidFill>
+              </a:rPr>
+              <a:t>circuit</a:t>
+            </a:r>
+            <a:r>
+              <a:rPr lang="en-CA" dirty="0"/>
+              <a:t> is going.</a:t>
+            </a:r>
+          </a:p>
+          <a:p>
+            <a:r>
+              <a:rPr lang="en-CA" dirty="0"/>
+              <a:t>Include a </a:t>
+            </a:r>
+            <a:r>
+              <a:rPr lang="en-CA" b="1" dirty="0">
+                <a:solidFill>
+                  <a:schemeClr val="accent6">
+                    <a:lumMod val="60000"/>
+                    <a:lumOff val="40000"/>
+                  </a:schemeClr>
+                </a:solidFill>
+              </a:rPr>
+              <a:t>light-timer</a:t>
+            </a:r>
+            <a:r>
+              <a:rPr lang="en-CA" dirty="0"/>
+              <a:t> process that counts down the red light.</a:t>
             </a:r>
           </a:p>
           <a:p>
@@ -9679,7 +9945,7 @@
 </p:sld>
 </file>
 
-<file path=ppt/slides/slide15.xml><?xml version="1.0" encoding="utf-8"?>
+<file path=ppt/slides/slide16.xml><?xml version="1.0" encoding="utf-8"?>
 <p:sld xmlns:a="http://schemas.openxmlformats.org/drawingml/2006/main" xmlns:r="http://schemas.openxmlformats.org/officeDocument/2006/relationships" xmlns:p="http://schemas.openxmlformats.org/presentationml/2006/main" showMasterSp="0">
   <p:cSld>
     <p:spTree>
@@ -9764,7 +10030,7 @@
 </p:sld>
 </file>
 
-<file path=ppt/slides/slide16.xml><?xml version="1.0" encoding="utf-8"?>
+<file path=ppt/slides/slide17.xml><?xml version="1.0" encoding="utf-8"?>
 <p:sld xmlns:a="http://schemas.openxmlformats.org/drawingml/2006/main" xmlns:r="http://schemas.openxmlformats.org/officeDocument/2006/relationships" xmlns:p="http://schemas.openxmlformats.org/presentationml/2006/main" showMasterSp="0">
   <p:cSld>
     <p:spTree>
@@ -9833,20 +10099,213 @@
             <p:ph idx="1"/>
           </p:nvPr>
         </p:nvSpPr>
-        <p:spPr/>
+        <p:spPr>
+          <a:xfrm>
+            <a:off x="838200" y="1825625"/>
+            <a:ext cx="10515600" cy="4761988"/>
+          </a:xfrm>
+        </p:spPr>
         <p:txBody>
-          <a:bodyPr/>
+          <a:bodyPr>
+            <a:normAutofit/>
+          </a:bodyPr>
           <a:lstStyle/>
           <a:p>
+            <a:pPr marL="0" indent="0">
+              <a:buNone/>
+            </a:pPr>
             <a:r>
               <a:rPr lang="en-CA" dirty="0"/>
-              <a:t>Let’s just avoid all those Tesla shuttles…</a:t>
-            </a:r>
-          </a:p>
-          <a:p>
-            <a:endParaRPr lang="en-CA" dirty="0"/>
-          </a:p>
-          <a:p>
+              <a:t>Time to go get them peeps!</a:t>
+            </a:r>
+          </a:p>
+          <a:p>
+            <a:r>
+              <a:rPr lang="en-CA" dirty="0"/>
+              <a:t>Allow the </a:t>
+            </a:r>
+            <a:r>
+              <a:rPr lang="en-CA" dirty="0">
+                <a:solidFill>
+                  <a:schemeClr val="accent3"/>
+                </a:solidFill>
+              </a:rPr>
+              <a:t>shuttle</a:t>
+            </a:r>
+            <a:r>
+              <a:rPr lang="en-CA" dirty="0"/>
+              <a:t> to </a:t>
+            </a:r>
+            <a:r>
+              <a:rPr lang="en-CA" b="1" dirty="0">
+                <a:solidFill>
+                  <a:schemeClr val="accent4"/>
+                </a:solidFill>
+              </a:rPr>
+              <a:t>stop</a:t>
+            </a:r>
+            <a:r>
+              <a:rPr lang="en-CA" dirty="0"/>
+              <a:t>, but then stay stopped until the </a:t>
+            </a:r>
+            <a:r>
+              <a:rPr lang="en-CA" b="1" dirty="0">
+                <a:solidFill>
+                  <a:schemeClr val="accent6">
+                    <a:lumMod val="60000"/>
+                    <a:lumOff val="40000"/>
+                  </a:schemeClr>
+                </a:solidFill>
+              </a:rPr>
+              <a:t>idle-timer</a:t>
+            </a:r>
+            <a:r>
+              <a:rPr lang="en-CA" dirty="0"/>
+              <a:t> process completes</a:t>
+            </a:r>
+          </a:p>
+          <a:p>
+            <a:r>
+              <a:rPr lang="en-CA" dirty="0"/>
+              <a:t>Let</a:t>
+            </a:r>
+            <a:r>
+              <a:rPr lang="en-CA" dirty="0">
+                <a:solidFill>
+                  <a:schemeClr val="accent3"/>
+                </a:solidFill>
+              </a:rPr>
+              <a:t> people</a:t>
+            </a:r>
+            <a:r>
+              <a:rPr lang="en-CA" dirty="0"/>
+              <a:t> </a:t>
+            </a:r>
+            <a:r>
+              <a:rPr lang="en-CA" b="1" dirty="0">
+                <a:solidFill>
+                  <a:schemeClr val="accent4"/>
+                </a:solidFill>
+              </a:rPr>
+              <a:t>board</a:t>
+            </a:r>
+            <a:r>
+              <a:rPr lang="en-CA" dirty="0"/>
+              <a:t> or </a:t>
+            </a:r>
+            <a:r>
+              <a:rPr lang="en-CA" b="1" dirty="0" err="1">
+                <a:solidFill>
+                  <a:schemeClr val="accent4"/>
+                </a:solidFill>
+              </a:rPr>
+              <a:t>unboard</a:t>
+            </a:r>
+            <a:r>
+              <a:rPr lang="en-CA" dirty="0"/>
+              <a:t> depending on if they are close enough to an idling </a:t>
+            </a:r>
+            <a:r>
+              <a:rPr lang="en-CA" dirty="0">
+                <a:solidFill>
+                  <a:schemeClr val="accent3"/>
+                </a:solidFill>
+              </a:rPr>
+              <a:t>shuttle</a:t>
+            </a:r>
+          </a:p>
+          <a:p>
+            <a:r>
+              <a:rPr lang="en-CA" dirty="0"/>
+              <a:t>Actions to </a:t>
+            </a:r>
+            <a:r>
+              <a:rPr lang="en-CA" b="1" dirty="0">
+                <a:solidFill>
+                  <a:schemeClr val="accent4"/>
+                </a:solidFill>
+              </a:rPr>
+              <a:t>serve</a:t>
+            </a:r>
+            <a:r>
+              <a:rPr lang="en-CA" dirty="0"/>
+              <a:t> a </a:t>
+            </a:r>
+            <a:r>
+              <a:rPr lang="en-CA" dirty="0">
+                <a:solidFill>
+                  <a:schemeClr val="accent3"/>
+                </a:solidFill>
+              </a:rPr>
+              <a:t>person</a:t>
+            </a:r>
+            <a:r>
+              <a:rPr lang="en-CA" dirty="0"/>
+              <a:t> or have them </a:t>
+            </a:r>
+            <a:r>
+              <a:rPr lang="en-CA" b="1" dirty="0">
+                <a:solidFill>
+                  <a:schemeClr val="accent4"/>
+                </a:solidFill>
+              </a:rPr>
+              <a:t>switch</a:t>
+            </a:r>
+            <a:r>
+              <a:rPr lang="en-CA" dirty="0"/>
+              <a:t> </a:t>
+            </a:r>
+            <a:r>
+              <a:rPr lang="en-CA" dirty="0">
+                <a:solidFill>
+                  <a:schemeClr val="accent3"/>
+                </a:solidFill>
+              </a:rPr>
+              <a:t>circuits</a:t>
+            </a:r>
+          </a:p>
+          <a:p>
+            <a:r>
+              <a:rPr lang="en-CA" dirty="0"/>
+              <a:t>Include a </a:t>
+            </a:r>
+            <a:r>
+              <a:rPr lang="en-CA" b="1" dirty="0">
+                <a:solidFill>
+                  <a:schemeClr val="accent2"/>
+                </a:solidFill>
+              </a:rPr>
+              <a:t>destination</a:t>
+            </a:r>
+            <a:r>
+              <a:rPr lang="en-CA" dirty="0"/>
+              <a:t> for </a:t>
+            </a:r>
+            <a:r>
+              <a:rPr lang="en-CA" dirty="0">
+                <a:solidFill>
+                  <a:schemeClr val="accent3"/>
+                </a:solidFill>
+              </a:rPr>
+              <a:t>people</a:t>
+            </a:r>
+          </a:p>
+          <a:p>
+            <a:r>
+              <a:rPr lang="en-CA" dirty="0" err="1"/>
+              <a:t>Etc</a:t>
+            </a:r>
+            <a:r>
+              <a:rPr lang="en-CA" dirty="0"/>
+              <a:t>…</a:t>
+            </a:r>
+            <a:br>
+              <a:rPr lang="en-CA" dirty="0"/>
+            </a:br>
+            <a:r>
+              <a:rPr lang="en-CA" sz="1200" dirty="0"/>
+              <a:t> </a:t>
+            </a:r>
             <a:endParaRPr lang="en-CA" dirty="0"/>
           </a:p>
           <a:p>
@@ -9871,10 +10330,364 @@
   <p:clrMapOvr>
     <a:masterClrMapping/>
   </p:clrMapOvr>
+  <p:timing>
+    <p:tnLst>
+      <p:par>
+        <p:cTn id="1" dur="indefinite" restart="never" nodeType="tmRoot">
+          <p:childTnLst>
+            <p:seq concurrent="1" nextAc="seek">
+              <p:cTn id="2" dur="indefinite" nodeType="mainSeq">
+                <p:childTnLst>
+                  <p:par>
+                    <p:cTn id="3" fill="hold">
+                      <p:stCondLst>
+                        <p:cond delay="indefinite"/>
+                      </p:stCondLst>
+                      <p:childTnLst>
+                        <p:par>
+                          <p:cTn id="4" fill="hold">
+                            <p:stCondLst>
+                              <p:cond delay="0"/>
+                            </p:stCondLst>
+                            <p:childTnLst>
+                              <p:par>
+                                <p:cTn id="5" presetID="10" presetClass="entr" presetSubtype="0" fill="hold" grpId="0" nodeType="clickEffect">
+                                  <p:stCondLst>
+                                    <p:cond delay="0"/>
+                                  </p:stCondLst>
+                                  <p:childTnLst>
+                                    <p:set>
+                                      <p:cBhvr>
+                                        <p:cTn id="6" dur="1" fill="hold">
+                                          <p:stCondLst>
+                                            <p:cond delay="0"/>
+                                          </p:stCondLst>
+                                        </p:cTn>
+                                        <p:tgtEl>
+                                          <p:spTgt spid="5">
+                                            <p:txEl>
+                                              <p:pRg st="1" end="1"/>
+                                            </p:txEl>
+                                          </p:spTgt>
+                                        </p:tgtEl>
+                                        <p:attrNameLst>
+                                          <p:attrName>style.visibility</p:attrName>
+                                        </p:attrNameLst>
+                                      </p:cBhvr>
+                                      <p:to>
+                                        <p:strVal val="visible"/>
+                                      </p:to>
+                                    </p:set>
+                                    <p:animEffect transition="in" filter="fade">
+                                      <p:cBhvr>
+                                        <p:cTn id="7" dur="500"/>
+                                        <p:tgtEl>
+                                          <p:spTgt spid="5">
+                                            <p:txEl>
+                                              <p:pRg st="1" end="1"/>
+                                            </p:txEl>
+                                          </p:spTgt>
+                                        </p:tgtEl>
+                                      </p:cBhvr>
+                                    </p:animEffect>
+                                  </p:childTnLst>
+                                </p:cTn>
+                              </p:par>
+                            </p:childTnLst>
+                          </p:cTn>
+                        </p:par>
+                        <p:par>
+                          <p:cTn id="8" fill="hold">
+                            <p:stCondLst>
+                              <p:cond delay="500"/>
+                            </p:stCondLst>
+                            <p:childTnLst>
+                              <p:par>
+                                <p:cTn id="9" presetID="10" presetClass="entr" presetSubtype="0" fill="hold" grpId="0" nodeType="afterEffect">
+                                  <p:stCondLst>
+                                    <p:cond delay="0"/>
+                                  </p:stCondLst>
+                                  <p:childTnLst>
+                                    <p:set>
+                                      <p:cBhvr>
+                                        <p:cTn id="10" dur="1" fill="hold">
+                                          <p:stCondLst>
+                                            <p:cond delay="0"/>
+                                          </p:stCondLst>
+                                        </p:cTn>
+                                        <p:tgtEl>
+                                          <p:spTgt spid="5">
+                                            <p:txEl>
+                                              <p:pRg st="2" end="2"/>
+                                            </p:txEl>
+                                          </p:spTgt>
+                                        </p:tgtEl>
+                                        <p:attrNameLst>
+                                          <p:attrName>style.visibility</p:attrName>
+                                        </p:attrNameLst>
+                                      </p:cBhvr>
+                                      <p:to>
+                                        <p:strVal val="visible"/>
+                                      </p:to>
+                                    </p:set>
+                                    <p:animEffect transition="in" filter="fade">
+                                      <p:cBhvr>
+                                        <p:cTn id="11" dur="500"/>
+                                        <p:tgtEl>
+                                          <p:spTgt spid="5">
+                                            <p:txEl>
+                                              <p:pRg st="2" end="2"/>
+                                            </p:txEl>
+                                          </p:spTgt>
+                                        </p:tgtEl>
+                                      </p:cBhvr>
+                                    </p:animEffect>
+                                  </p:childTnLst>
+                                </p:cTn>
+                              </p:par>
+                            </p:childTnLst>
+                          </p:cTn>
+                        </p:par>
+                        <p:par>
+                          <p:cTn id="12" fill="hold">
+                            <p:stCondLst>
+                              <p:cond delay="1000"/>
+                            </p:stCondLst>
+                            <p:childTnLst>
+                              <p:par>
+                                <p:cTn id="13" presetID="10" presetClass="entr" presetSubtype="0" fill="hold" grpId="0" nodeType="afterEffect">
+                                  <p:stCondLst>
+                                    <p:cond delay="0"/>
+                                  </p:stCondLst>
+                                  <p:childTnLst>
+                                    <p:set>
+                                      <p:cBhvr>
+                                        <p:cTn id="14" dur="1" fill="hold">
+                                          <p:stCondLst>
+                                            <p:cond delay="0"/>
+                                          </p:stCondLst>
+                                        </p:cTn>
+                                        <p:tgtEl>
+                                          <p:spTgt spid="5">
+                                            <p:txEl>
+                                              <p:pRg st="3" end="3"/>
+                                            </p:txEl>
+                                          </p:spTgt>
+                                        </p:tgtEl>
+                                        <p:attrNameLst>
+                                          <p:attrName>style.visibility</p:attrName>
+                                        </p:attrNameLst>
+                                      </p:cBhvr>
+                                      <p:to>
+                                        <p:strVal val="visible"/>
+                                      </p:to>
+                                    </p:set>
+                                    <p:animEffect transition="in" filter="fade">
+                                      <p:cBhvr>
+                                        <p:cTn id="15" dur="500"/>
+                                        <p:tgtEl>
+                                          <p:spTgt spid="5">
+                                            <p:txEl>
+                                              <p:pRg st="3" end="3"/>
+                                            </p:txEl>
+                                          </p:spTgt>
+                                        </p:tgtEl>
+                                      </p:cBhvr>
+                                    </p:animEffect>
+                                  </p:childTnLst>
+                                </p:cTn>
+                              </p:par>
+                            </p:childTnLst>
+                          </p:cTn>
+                        </p:par>
+                        <p:par>
+                          <p:cTn id="16" fill="hold">
+                            <p:stCondLst>
+                              <p:cond delay="1500"/>
+                            </p:stCondLst>
+                            <p:childTnLst>
+                              <p:par>
+                                <p:cTn id="17" presetID="10" presetClass="entr" presetSubtype="0" fill="hold" grpId="0" nodeType="afterEffect">
+                                  <p:stCondLst>
+                                    <p:cond delay="0"/>
+                                  </p:stCondLst>
+                                  <p:childTnLst>
+                                    <p:set>
+                                      <p:cBhvr>
+                                        <p:cTn id="18" dur="1" fill="hold">
+                                          <p:stCondLst>
+                                            <p:cond delay="0"/>
+                                          </p:stCondLst>
+                                        </p:cTn>
+                                        <p:tgtEl>
+                                          <p:spTgt spid="5">
+                                            <p:txEl>
+                                              <p:pRg st="4" end="4"/>
+                                            </p:txEl>
+                                          </p:spTgt>
+                                        </p:tgtEl>
+                                        <p:attrNameLst>
+                                          <p:attrName>style.visibility</p:attrName>
+                                        </p:attrNameLst>
+                                      </p:cBhvr>
+                                      <p:to>
+                                        <p:strVal val="visible"/>
+                                      </p:to>
+                                    </p:set>
+                                    <p:animEffect transition="in" filter="fade">
+                                      <p:cBhvr>
+                                        <p:cTn id="19" dur="500"/>
+                                        <p:tgtEl>
+                                          <p:spTgt spid="5">
+                                            <p:txEl>
+                                              <p:pRg st="4" end="4"/>
+                                            </p:txEl>
+                                          </p:spTgt>
+                                        </p:tgtEl>
+                                      </p:cBhvr>
+                                    </p:animEffect>
+                                  </p:childTnLst>
+                                </p:cTn>
+                              </p:par>
+                            </p:childTnLst>
+                          </p:cTn>
+                        </p:par>
+                        <p:par>
+                          <p:cTn id="20" fill="hold">
+                            <p:stCondLst>
+                              <p:cond delay="2000"/>
+                            </p:stCondLst>
+                            <p:childTnLst>
+                              <p:par>
+                                <p:cTn id="21" presetID="10" presetClass="entr" presetSubtype="0" fill="hold" grpId="0" nodeType="afterEffect">
+                                  <p:stCondLst>
+                                    <p:cond delay="0"/>
+                                  </p:stCondLst>
+                                  <p:childTnLst>
+                                    <p:set>
+                                      <p:cBhvr>
+                                        <p:cTn id="22" dur="1" fill="hold">
+                                          <p:stCondLst>
+                                            <p:cond delay="0"/>
+                                          </p:stCondLst>
+                                        </p:cTn>
+                                        <p:tgtEl>
+                                          <p:spTgt spid="5">
+                                            <p:txEl>
+                                              <p:pRg st="5" end="5"/>
+                                            </p:txEl>
+                                          </p:spTgt>
+                                        </p:tgtEl>
+                                        <p:attrNameLst>
+                                          <p:attrName>style.visibility</p:attrName>
+                                        </p:attrNameLst>
+                                      </p:cBhvr>
+                                      <p:to>
+                                        <p:strVal val="visible"/>
+                                      </p:to>
+                                    </p:set>
+                                    <p:animEffect transition="in" filter="fade">
+                                      <p:cBhvr>
+                                        <p:cTn id="23" dur="500"/>
+                                        <p:tgtEl>
+                                          <p:spTgt spid="5">
+                                            <p:txEl>
+                                              <p:pRg st="5" end="5"/>
+                                            </p:txEl>
+                                          </p:spTgt>
+                                        </p:tgtEl>
+                                      </p:cBhvr>
+                                    </p:animEffect>
+                                  </p:childTnLst>
+                                </p:cTn>
+                              </p:par>
+                            </p:childTnLst>
+                          </p:cTn>
+                        </p:par>
+                        <p:par>
+                          <p:cTn id="24" fill="hold">
+                            <p:stCondLst>
+                              <p:cond delay="2500"/>
+                            </p:stCondLst>
+                            <p:childTnLst>
+                              <p:par>
+                                <p:cTn id="25" presetID="10" presetClass="entr" presetSubtype="0" fill="hold" grpId="0" nodeType="afterEffect">
+                                  <p:stCondLst>
+                                    <p:cond delay="0"/>
+                                  </p:stCondLst>
+                                  <p:childTnLst>
+                                    <p:set>
+                                      <p:cBhvr>
+                                        <p:cTn id="26" dur="1" fill="hold">
+                                          <p:stCondLst>
+                                            <p:cond delay="0"/>
+                                          </p:stCondLst>
+                                        </p:cTn>
+                                        <p:tgtEl>
+                                          <p:spTgt spid="5">
+                                            <p:txEl>
+                                              <p:pRg st="6" end="6"/>
+                                            </p:txEl>
+                                          </p:spTgt>
+                                        </p:tgtEl>
+                                        <p:attrNameLst>
+                                          <p:attrName>style.visibility</p:attrName>
+                                        </p:attrNameLst>
+                                      </p:cBhvr>
+                                      <p:to>
+                                        <p:strVal val="visible"/>
+                                      </p:to>
+                                    </p:set>
+                                    <p:animEffect transition="in" filter="fade">
+                                      <p:cBhvr>
+                                        <p:cTn id="27" dur="500"/>
+                                        <p:tgtEl>
+                                          <p:spTgt spid="5">
+                                            <p:txEl>
+                                              <p:pRg st="6" end="6"/>
+                                            </p:txEl>
+                                          </p:spTgt>
+                                        </p:tgtEl>
+                                      </p:cBhvr>
+                                    </p:animEffect>
+                                  </p:childTnLst>
+                                </p:cTn>
+                              </p:par>
+                            </p:childTnLst>
+                          </p:cTn>
+                        </p:par>
+                      </p:childTnLst>
+                    </p:cTn>
+                  </p:par>
+                </p:childTnLst>
+              </p:cTn>
+              <p:prevCondLst>
+                <p:cond evt="onPrev" delay="0">
+                  <p:tgtEl>
+                    <p:sldTgt/>
+                  </p:tgtEl>
+                </p:cond>
+              </p:prevCondLst>
+              <p:nextCondLst>
+                <p:cond evt="onNext" delay="0">
+                  <p:tgtEl>
+                    <p:sldTgt/>
+                  </p:tgtEl>
+                </p:cond>
+              </p:nextCondLst>
+            </p:seq>
+          </p:childTnLst>
+        </p:cTn>
+      </p:par>
+    </p:tnLst>
+    <p:bldLst>
+      <p:bldP spid="5" grpId="0" uiExpand="1" build="p"/>
+    </p:bldLst>
+  </p:timing>
 </p:sld>
 </file>
 
-<file path=ppt/slides/slide17.xml><?xml version="1.0" encoding="utf-8"?>
+<file path=ppt/slides/slide18.xml><?xml version="1.0" encoding="utf-8"?>
 <p:sld xmlns:a="http://schemas.openxmlformats.org/drawingml/2006/main" xmlns:r="http://schemas.openxmlformats.org/officeDocument/2006/relationships" xmlns:p="http://schemas.openxmlformats.org/presentationml/2006/main" showMasterSp="0">
   <p:cSld>
     <p:spTree>
@@ -9959,7 +10772,7 @@
 </p:sld>
 </file>
 
-<file path=ppt/slides/slide18.xml><?xml version="1.0" encoding="utf-8"?>
+<file path=ppt/slides/slide19.xml><?xml version="1.0" encoding="utf-8"?>
 <p:sld xmlns:a="http://schemas.openxmlformats.org/drawingml/2006/main" xmlns:r="http://schemas.openxmlformats.org/officeDocument/2006/relationships" xmlns:p="http://schemas.openxmlformats.org/presentationml/2006/main" showMasterSp="0">
   <p:cSld>
     <p:spTree>
@@ -12262,7 +13075,7 @@
           <p:cNvPr id="4" name="Title 3">
             <a:extLst>
               <a:ext uri="{FF2B5EF4-FFF2-40B4-BE49-F238E27FC236}">
-                <a16:creationId xmlns:a16="http://schemas.microsoft.com/office/drawing/2014/main" id="{80EAC0C6-7B8A-1444-CF6E-AFD7613F9128}"/>
+                <a16:creationId xmlns:a16="http://schemas.microsoft.com/office/drawing/2014/main" id="{30B7E21D-5603-5750-AC1E-A363C0F5AA15}"/>
               </a:ext>
             </a:extLst>
           </p:cNvPr>
@@ -12279,9 +13092,10 @@
           <a:lstStyle/>
           <a:p>
             <a:r>
-              <a:rPr lang="en-CA" dirty="0"/>
-              <a:t>1. Go, shuttle, go!</a:t>
-            </a:r>
+              <a:rPr lang="en-US" dirty="0"/>
+              <a:t>Running Tips</a:t>
+            </a:r>
+            <a:endParaRPr lang="en-CA" dirty="0"/>
           </a:p>
         </p:txBody>
       </p:sp>
@@ -12290,7 +13104,7 @@
           <p:cNvPr id="5" name="Content Placeholder 4">
             <a:extLst>
               <a:ext uri="{FF2B5EF4-FFF2-40B4-BE49-F238E27FC236}">
-                <a16:creationId xmlns:a16="http://schemas.microsoft.com/office/drawing/2014/main" id="{916B2140-6178-6477-FAC2-4FC081B9C2C5}"/>
+                <a16:creationId xmlns:a16="http://schemas.microsoft.com/office/drawing/2014/main" id="{DD74ED63-F4F6-B5B8-C18E-87C31016481D}"/>
               </a:ext>
             </a:extLst>
           </p:cNvPr>
@@ -12303,20 +13117,66 @@
         </p:nvSpPr>
         <p:spPr>
           <a:xfrm>
-            <a:off x="838199" y="1825625"/>
-            <a:ext cx="10645877" cy="4351338"/>
+            <a:off x="838200" y="1825624"/>
+            <a:ext cx="10515600" cy="4858955"/>
           </a:xfrm>
         </p:spPr>
         <p:txBody>
-          <a:bodyPr/>
+          <a:bodyPr>
+            <a:normAutofit lnSpcReduction="10000"/>
+          </a:bodyPr>
           <a:lstStyle/>
           <a:p>
-            <a:pPr marL="0" indent="0">
-              <a:buNone/>
-            </a:pPr>
-            <a:r>
+            <a:r>
+              <a:rPr lang="en-US" dirty="0"/>
+              <a:t>Regular run:</a:t>
+            </a:r>
+            <a:br>
               <a:rPr lang="en-CA" dirty="0"/>
-              <a:t>Warm-up: let’s have shuttles drive when their (infinite) circuit is going.</a:t>
+            </a:br>
+            <a:r>
+              <a:rPr lang="en-CA" dirty="0"/>
+              <a:t>	</a:t>
+            </a:r>
+            <a:r>
+              <a:rPr lang="en-CA" dirty="0">
+                <a:solidFill>
+                  <a:schemeClr val="tx2">
+                    <a:lumMod val="75000"/>
+                  </a:schemeClr>
+                </a:solidFill>
+              </a:rPr>
+              <a:t>enhsp-2020 –domain </a:t>
+            </a:r>
+            <a:r>
+              <a:rPr lang="en-CA" dirty="0" err="1">
+                <a:solidFill>
+                  <a:schemeClr val="tx2">
+                    <a:lumMod val="75000"/>
+                  </a:schemeClr>
+                </a:solidFill>
+              </a:rPr>
+              <a:t>d.pddl</a:t>
+            </a:r>
+            <a:r>
+              <a:rPr lang="en-CA" dirty="0">
+                <a:solidFill>
+                  <a:schemeClr val="tx2">
+                    <a:lumMod val="75000"/>
+                  </a:schemeClr>
+                </a:solidFill>
+              </a:rPr>
+              <a:t> –problem </a:t>
+            </a:r>
+            <a:r>
+              <a:rPr lang="en-CA" dirty="0" err="1">
+                <a:solidFill>
+                  <a:schemeClr val="tx2">
+                    <a:lumMod val="75000"/>
+                  </a:schemeClr>
+                </a:solidFill>
+              </a:rPr>
+              <a:t>p.pddl</a:t>
             </a:r>
             <a:br>
               <a:rPr lang="en-CA" dirty="0"/>
@@ -12325,67 +13185,312 @@
           </a:p>
           <a:p>
             <a:r>
-              <a:rPr lang="en-CA" b="1" dirty="0">
+              <a:rPr lang="en-CA" dirty="0"/>
+              <a:t>To see the events:</a:t>
+            </a:r>
+            <a:br>
+              <a:rPr lang="en-US" dirty="0"/>
+            </a:br>
+            <a:r>
+              <a:rPr lang="en-US" dirty="0"/>
+              <a:t>	… </a:t>
+            </a:r>
+            <a:r>
+              <a:rPr lang="en-US" dirty="0">
                 <a:solidFill>
-                  <a:schemeClr val="accent4"/>
-                </a:solidFill>
-              </a:rPr>
-              <a:t>light-change</a:t>
-            </a:r>
-            <a:r>
-              <a:rPr lang="en-CA" dirty="0"/>
-              <a:t>: Action to switch which circuit is going</a:t>
-            </a:r>
-          </a:p>
-          <a:p>
-            <a:r>
-              <a:rPr lang="en-CA" b="1" dirty="0">
-                <a:solidFill>
-                  <a:schemeClr val="accent6">
-                    <a:lumMod val="60000"/>
-                    <a:lumOff val="40000"/>
+                  <a:schemeClr val="tx2">
+                    <a:lumMod val="75000"/>
                   </a:schemeClr>
                 </a:solidFill>
               </a:rPr>
-              <a:t>drive</a:t>
-            </a:r>
-            <a:r>
+              <a:t>-pe</a:t>
+            </a:r>
+            <a:br>
+              <a:rPr lang="en-US" dirty="0"/>
+            </a:br>
+            <a:endParaRPr lang="en-US" dirty="0"/>
+          </a:p>
+          <a:p>
+            <a:r>
+              <a:rPr lang="en-US" dirty="0"/>
+              <a:t>To save the plan:</a:t>
+            </a:r>
+            <a:br>
               <a:rPr lang="en-CA" dirty="0"/>
-              <a:t>: Process to move the “going” shuttles along</a:t>
-            </a:r>
-          </a:p>
-          <a:p>
-            <a:r>
-              <a:rPr lang="en-CA" b="1" dirty="0">
+            </a:br>
+            <a:r>
+              <a:rPr lang="en-CA" dirty="0"/>
+              <a:t>	… </a:t>
+            </a:r>
+            <a:r>
+              <a:rPr lang="en-CA" dirty="0">
                 <a:solidFill>
-                  <a:schemeClr val="accent4"/>
+                  <a:schemeClr val="tx2">
+                    <a:lumMod val="75000"/>
+                  </a:schemeClr>
                 </a:solidFill>
               </a:rPr>
-              <a:t>finish</a:t>
-            </a:r>
-            <a:r>
+              <a:t>-</a:t>
+            </a:r>
+            <a:r>
+              <a:rPr lang="en-CA" dirty="0" err="1">
+                <a:solidFill>
+                  <a:schemeClr val="tx2">
+                    <a:lumMod val="75000"/>
+                  </a:schemeClr>
+                </a:solidFill>
+              </a:rPr>
+              <a:t>sp</a:t>
+            </a:r>
+            <a:r>
+              <a:rPr lang="en-CA" dirty="0">
+                <a:solidFill>
+                  <a:schemeClr val="tx2">
+                    <a:lumMod val="75000"/>
+                  </a:schemeClr>
+                </a:solidFill>
+              </a:rPr>
+              <a:t> </a:t>
+            </a:r>
+            <a:r>
+              <a:rPr lang="en-CA" dirty="0" err="1">
+                <a:solidFill>
+                  <a:schemeClr val="tx2">
+                    <a:lumMod val="75000"/>
+                  </a:schemeClr>
+                </a:solidFill>
+              </a:rPr>
+              <a:t>out.plan</a:t>
+            </a:r>
+            <a:br>
               <a:rPr lang="en-CA" dirty="0"/>
-              <a:t>: Action that captures what we want to have happen</a:t>
-            </a:r>
-          </a:p>
-          <a:p>
+            </a:br>
             <a:endParaRPr lang="en-CA" dirty="0"/>
           </a:p>
           <a:p>
-            <a:pPr marL="0" indent="0" algn="ctr">
-              <a:buNone/>
-            </a:pPr>
             <a:r>
               <a:rPr lang="en-CA" dirty="0"/>
-              <a:t>http://editor.planning.domains/planning-course/hybrid/gogogo</a:t>
-            </a:r>
+              <a:t>To validate:</a:t>
+            </a:r>
+            <a:br>
+              <a:rPr lang="en-CA" dirty="0"/>
+            </a:br>
+            <a:r>
+              <a:rPr lang="en-CA" dirty="0"/>
+              <a:t>	</a:t>
+            </a:r>
+            <a:r>
+              <a:rPr lang="en-CA" dirty="0" err="1">
+                <a:solidFill>
+                  <a:schemeClr val="accent6">
+                    <a:lumMod val="40000"/>
+                    <a:lumOff val="60000"/>
+                  </a:schemeClr>
+                </a:solidFill>
+              </a:rPr>
+              <a:t>val</a:t>
+            </a:r>
+            <a:r>
+              <a:rPr lang="en-CA" dirty="0">
+                <a:solidFill>
+                  <a:schemeClr val="accent6">
+                    <a:lumMod val="40000"/>
+                    <a:lumOff val="60000"/>
+                  </a:schemeClr>
+                </a:solidFill>
+              </a:rPr>
+              <a:t> Validate -v </a:t>
+            </a:r>
+            <a:r>
+              <a:rPr lang="en-CA" dirty="0" err="1">
+                <a:solidFill>
+                  <a:schemeClr val="accent6">
+                    <a:lumMod val="40000"/>
+                    <a:lumOff val="60000"/>
+                  </a:schemeClr>
+                </a:solidFill>
+              </a:rPr>
+              <a:t>d.pddl</a:t>
+            </a:r>
+            <a:r>
+              <a:rPr lang="en-CA" dirty="0">
+                <a:solidFill>
+                  <a:schemeClr val="accent6">
+                    <a:lumMod val="40000"/>
+                    <a:lumOff val="60000"/>
+                  </a:schemeClr>
+                </a:solidFill>
+              </a:rPr>
+              <a:t> </a:t>
+            </a:r>
+            <a:r>
+              <a:rPr lang="en-CA" dirty="0" err="1">
+                <a:solidFill>
+                  <a:schemeClr val="accent6">
+                    <a:lumMod val="40000"/>
+                    <a:lumOff val="60000"/>
+                  </a:schemeClr>
+                </a:solidFill>
+              </a:rPr>
+              <a:t>p.pddl</a:t>
+            </a:r>
+            <a:r>
+              <a:rPr lang="en-CA" dirty="0">
+                <a:solidFill>
+                  <a:schemeClr val="accent6">
+                    <a:lumMod val="40000"/>
+                    <a:lumOff val="60000"/>
+                  </a:schemeClr>
+                </a:solidFill>
+              </a:rPr>
+              <a:t> </a:t>
+            </a:r>
+            <a:r>
+              <a:rPr lang="en-CA" dirty="0" err="1">
+                <a:solidFill>
+                  <a:schemeClr val="accent6">
+                    <a:lumMod val="40000"/>
+                    <a:lumOff val="60000"/>
+                  </a:schemeClr>
+                </a:solidFill>
+              </a:rPr>
+              <a:t>out.plan</a:t>
+            </a:r>
+            <a:br>
+              <a:rPr lang="en-CA" dirty="0">
+                <a:solidFill>
+                  <a:schemeClr val="accent6">
+                    <a:lumMod val="40000"/>
+                    <a:lumOff val="60000"/>
+                  </a:schemeClr>
+                </a:solidFill>
+              </a:rPr>
+            </a:br>
+            <a:r>
+              <a:rPr lang="en-CA" dirty="0">
+                <a:solidFill>
+                  <a:schemeClr val="accent6">
+                    <a:lumMod val="40000"/>
+                    <a:lumOff val="60000"/>
+                  </a:schemeClr>
+                </a:solidFill>
+              </a:rPr>
+              <a:t>	</a:t>
+            </a:r>
+            <a:r>
+              <a:rPr lang="en-CA" dirty="0" err="1">
+                <a:solidFill>
+                  <a:schemeClr val="accent6">
+                    <a:lumMod val="40000"/>
+                    <a:lumOff val="60000"/>
+                  </a:schemeClr>
+                </a:solidFill>
+              </a:rPr>
+              <a:t>val</a:t>
+            </a:r>
+            <a:r>
+              <a:rPr lang="en-CA" dirty="0">
+                <a:solidFill>
+                  <a:schemeClr val="accent6">
+                    <a:lumMod val="40000"/>
+                    <a:lumOff val="60000"/>
+                  </a:schemeClr>
+                </a:solidFill>
+              </a:rPr>
+              <a:t> Validate -l </a:t>
+            </a:r>
+            <a:r>
+              <a:rPr lang="en-CA" dirty="0" err="1">
+                <a:solidFill>
+                  <a:schemeClr val="accent6">
+                    <a:lumMod val="40000"/>
+                    <a:lumOff val="60000"/>
+                  </a:schemeClr>
+                </a:solidFill>
+              </a:rPr>
+              <a:t>d.pddl</a:t>
+            </a:r>
+            <a:r>
+              <a:rPr lang="en-CA" dirty="0">
+                <a:solidFill>
+                  <a:schemeClr val="accent6">
+                    <a:lumMod val="40000"/>
+                    <a:lumOff val="60000"/>
+                  </a:schemeClr>
+                </a:solidFill>
+              </a:rPr>
+              <a:t> </a:t>
+            </a:r>
+            <a:r>
+              <a:rPr lang="en-CA" dirty="0" err="1">
+                <a:solidFill>
+                  <a:schemeClr val="accent6">
+                    <a:lumMod val="40000"/>
+                    <a:lumOff val="60000"/>
+                  </a:schemeClr>
+                </a:solidFill>
+              </a:rPr>
+              <a:t>p.pddl</a:t>
+            </a:r>
+            <a:r>
+              <a:rPr lang="en-CA" dirty="0">
+                <a:solidFill>
+                  <a:schemeClr val="accent6">
+                    <a:lumMod val="40000"/>
+                    <a:lumOff val="60000"/>
+                  </a:schemeClr>
+                </a:solidFill>
+              </a:rPr>
+              <a:t> </a:t>
+            </a:r>
+            <a:r>
+              <a:rPr lang="en-CA" dirty="0" err="1">
+                <a:solidFill>
+                  <a:schemeClr val="accent6">
+                    <a:lumMod val="40000"/>
+                    <a:lumOff val="60000"/>
+                  </a:schemeClr>
+                </a:solidFill>
+              </a:rPr>
+              <a:t>out.plan</a:t>
+            </a:r>
+            <a:r>
+              <a:rPr lang="en-CA" dirty="0">
+                <a:solidFill>
+                  <a:schemeClr val="accent6">
+                    <a:lumMod val="40000"/>
+                    <a:lumOff val="60000"/>
+                  </a:schemeClr>
+                </a:solidFill>
+              </a:rPr>
+              <a:t> &gt; </a:t>
+            </a:r>
+            <a:r>
+              <a:rPr lang="en-CA" dirty="0" err="1">
+                <a:solidFill>
+                  <a:schemeClr val="accent6">
+                    <a:lumMod val="40000"/>
+                    <a:lumOff val="60000"/>
+                  </a:schemeClr>
+                </a:solidFill>
+              </a:rPr>
+              <a:t>out.tex</a:t>
+            </a:r>
+            <a:endParaRPr lang="en-US" dirty="0">
+              <a:solidFill>
+                <a:schemeClr val="accent6">
+                  <a:lumMod val="40000"/>
+                  <a:lumOff val="60000"/>
+                </a:schemeClr>
+              </a:solidFill>
+            </a:endParaRPr>
           </a:p>
         </p:txBody>
       </p:sp>
     </p:spTree>
     <p:extLst>
       <p:ext uri="{BB962C8B-B14F-4D97-AF65-F5344CB8AC3E}">
-        <p14:creationId xmlns:p14="http://schemas.microsoft.com/office/powerpoint/2010/main" val="1315833981"/>
+        <p14:creationId xmlns:p14="http://schemas.microsoft.com/office/powerpoint/2010/main" val="2423189185"/>
       </p:ext>
     </p:extLst>
   </p:cSld>
@@ -12414,6 +13519,34 @@
       </p:grpSpPr>
       <p:sp>
         <p:nvSpPr>
+          <p:cNvPr id="4" name="Title 3">
+            <a:extLst>
+              <a:ext uri="{FF2B5EF4-FFF2-40B4-BE49-F238E27FC236}">
+                <a16:creationId xmlns:a16="http://schemas.microsoft.com/office/drawing/2014/main" id="{80EAC0C6-7B8A-1444-CF6E-AFD7613F9128}"/>
+              </a:ext>
+            </a:extLst>
+          </p:cNvPr>
+          <p:cNvSpPr>
+            <a:spLocks noGrp="1"/>
+          </p:cNvSpPr>
+          <p:nvPr>
+            <p:ph type="title"/>
+          </p:nvPr>
+        </p:nvSpPr>
+        <p:spPr/>
+        <p:txBody>
+          <a:bodyPr/>
+          <a:lstStyle/>
+          <a:p>
+            <a:r>
+              <a:rPr lang="en-CA" dirty="0"/>
+              <a:t>1. Go, shuttle, go!</a:t>
+            </a:r>
+          </a:p>
+        </p:txBody>
+      </p:sp>
+      <p:sp>
+        <p:nvSpPr>
           <p:cNvPr id="5" name="Content Placeholder 4">
             <a:extLst>
               <a:ext uri="{FF2B5EF4-FFF2-40B4-BE49-F238E27FC236}">
@@ -12428,7 +13561,12 @@
             <p:ph idx="1"/>
           </p:nvPr>
         </p:nvSpPr>
-        <p:spPr/>
+        <p:spPr>
+          <a:xfrm>
+            <a:off x="838199" y="1825625"/>
+            <a:ext cx="10645877" cy="4351338"/>
+          </a:xfrm>
+        </p:spPr>
         <p:txBody>
           <a:bodyPr/>
           <a:lstStyle/>
@@ -12436,10 +13574,107 @@
             <a:pPr marL="0" indent="0">
               <a:buNone/>
             </a:pPr>
+            <a:r>
+              <a:rPr lang="en-CA" dirty="0"/>
+              <a:t>Warm-up: let’s have </a:t>
+            </a:r>
+            <a:r>
+              <a:rPr lang="en-CA" dirty="0">
+                <a:solidFill>
+                  <a:schemeClr val="accent3"/>
+                </a:solidFill>
+              </a:rPr>
+              <a:t>shuttles</a:t>
+            </a:r>
+            <a:r>
+              <a:rPr lang="en-CA" dirty="0"/>
+              <a:t> drive when their (infinite) </a:t>
+            </a:r>
+            <a:r>
+              <a:rPr lang="en-CA" dirty="0">
+                <a:solidFill>
+                  <a:schemeClr val="accent3"/>
+                </a:solidFill>
+              </a:rPr>
+              <a:t>circuit</a:t>
+            </a:r>
+            <a:r>
+              <a:rPr lang="en-CA" dirty="0"/>
+              <a:t> is going.</a:t>
+            </a:r>
+            <a:br>
+              <a:rPr lang="en-CA" dirty="0"/>
+            </a:br>
             <a:endParaRPr lang="en-CA" dirty="0"/>
           </a:p>
           <a:p>
-            <a:endParaRPr lang="en-CA" dirty="0"/>
+            <a:r>
+              <a:rPr lang="en-CA" b="1" dirty="0">
+                <a:solidFill>
+                  <a:schemeClr val="accent4"/>
+                </a:solidFill>
+              </a:rPr>
+              <a:t>light-change</a:t>
+            </a:r>
+            <a:r>
+              <a:rPr lang="en-CA" dirty="0"/>
+              <a:t>: Action to switch which </a:t>
+            </a:r>
+            <a:r>
+              <a:rPr lang="en-CA" dirty="0">
+                <a:solidFill>
+                  <a:schemeClr val="accent3"/>
+                </a:solidFill>
+              </a:rPr>
+              <a:t>circuit</a:t>
+            </a:r>
+            <a:r>
+              <a:rPr lang="en-CA" dirty="0"/>
+              <a:t> is going</a:t>
+            </a:r>
+          </a:p>
+          <a:p>
+            <a:r>
+              <a:rPr lang="en-CA" b="1" dirty="0">
+                <a:solidFill>
+                  <a:schemeClr val="accent6">
+                    <a:lumMod val="60000"/>
+                    <a:lumOff val="40000"/>
+                  </a:schemeClr>
+                </a:solidFill>
+              </a:rPr>
+              <a:t>drive</a:t>
+            </a:r>
+            <a:r>
+              <a:rPr lang="en-CA" dirty="0"/>
+              <a:t>: Process to move the “going” </a:t>
+            </a:r>
+            <a:r>
+              <a:rPr lang="en-CA" dirty="0">
+                <a:solidFill>
+                  <a:schemeClr val="accent3"/>
+                </a:solidFill>
+              </a:rPr>
+              <a:t>shuttles</a:t>
+            </a:r>
+            <a:r>
+              <a:rPr lang="en-CA" dirty="0"/>
+              <a:t> along</a:t>
+            </a:r>
+          </a:p>
+          <a:p>
+            <a:r>
+              <a:rPr lang="en-CA" b="1" dirty="0">
+                <a:solidFill>
+                  <a:schemeClr val="accent4"/>
+                </a:solidFill>
+              </a:rPr>
+              <a:t>finish</a:t>
+            </a:r>
+            <a:r>
+              <a:rPr lang="en-CA" dirty="0"/>
+              <a:t>: Action that captures what we want to have happen</a:t>
+            </a:r>
           </a:p>
           <a:p>
             <a:endParaRPr lang="en-CA" dirty="0"/>
@@ -12449,8 +13684,8 @@
               <a:buNone/>
             </a:pPr>
             <a:r>
-              <a:rPr lang="en-CA" sz="2800" dirty="0"/>
-              <a:t>http://editor.planning.domains/planning-course/hybrid/going</a:t>
+              <a:rPr lang="en-CA" dirty="0"/>
+              <a:t>http://editor.planning.domains/planning-course/hybrid/gogogo</a:t>
             </a:r>
           </a:p>
         </p:txBody>
@@ -12458,25 +13693,13 @@
     </p:spTree>
     <p:extLst>
       <p:ext uri="{BB962C8B-B14F-4D97-AF65-F5344CB8AC3E}">
-        <p14:creationId xmlns:p14="http://schemas.microsoft.com/office/powerpoint/2010/main" val="4031490244"/>
+        <p14:creationId xmlns:p14="http://schemas.microsoft.com/office/powerpoint/2010/main" val="1315833981"/>
       </p:ext>
     </p:extLst>
   </p:cSld>
   <p:clrMapOvr>
     <a:masterClrMapping/>
   </p:clrMapOvr>
-  <mc:AlternateContent xmlns:mc="http://schemas.openxmlformats.org/markup-compatibility/2006" xmlns:p14="http://schemas.microsoft.com/office/powerpoint/2010/main">
-    <mc:Choice Requires="p14">
-      <p:transition spd="med" p14:dur="700">
-        <p:fade/>
-      </p:transition>
-    </mc:Choice>
-    <mc:Fallback xmlns="">
-      <p:transition spd="med">
-        <p:fade/>
-      </p:transition>
-    </mc:Fallback>
-  </mc:AlternateContent>
 </p:sld>
 </file>
 

</xml_diff>

<commit_message>
Made starter versions of the hybrid domain.
</commit_message>
<xml_diff>
--- a/exercises/cisc-813/hybrid/slides.pptx
+++ b/exercises/cisc-813/hybrid/slides.pptx
@@ -696,7 +696,7 @@
           <a:p>
             <a:fld id="{D6D0F569-AC90-44EB-9EF4-4E5C2F5D823C}" type="datetime1">
               <a:rPr lang="en-US" smtClean="0"/>
-              <a:t>3/7/2023</a:t>
+              <a:t>3/13/2023</a:t>
             </a:fld>
             <a:endParaRPr lang="en-US" dirty="0"/>
           </a:p>
@@ -1375,7 +1375,7 @@
           <a:p>
             <a:fld id="{46BA7D41-E8B7-4A0B-B861-3EC4AE88917D}" type="datetime1">
               <a:rPr lang="en-US" smtClean="0"/>
-              <a:t>3/7/2023</a:t>
+              <a:t>3/13/2023</a:t>
             </a:fld>
             <a:endParaRPr lang="en-US" dirty="0"/>
           </a:p>
@@ -2064,7 +2064,7 @@
           <a:p>
             <a:fld id="{A7C34823-0B19-4B4E-A643-7A3B0A3D24D6}" type="datetime1">
               <a:rPr lang="en-US" smtClean="0"/>
-              <a:t>3/7/2023</a:t>
+              <a:t>3/13/2023</a:t>
             </a:fld>
             <a:endParaRPr lang="en-US" dirty="0"/>
           </a:p>
@@ -3187,7 +3187,7 @@
           <a:p>
             <a:fld id="{8C2D79EF-17C8-45D8-9866-DAF5723FC604}" type="datetime1">
               <a:rPr lang="en-US" smtClean="0"/>
-              <a:t>3/7/2023</a:t>
+              <a:t>3/13/2023</a:t>
             </a:fld>
             <a:endParaRPr lang="en-US" dirty="0"/>
           </a:p>
@@ -3942,7 +3942,7 @@
           <a:p>
             <a:fld id="{DFFC2ADC-3680-4013-A757-E4663495DB98}" type="datetime1">
               <a:rPr lang="en-US" smtClean="0"/>
-              <a:t>3/7/2023</a:t>
+              <a:t>3/13/2023</a:t>
             </a:fld>
             <a:endParaRPr lang="en-US" dirty="0"/>
           </a:p>
@@ -4689,7 +4689,7 @@
           <a:p>
             <a:fld id="{4751BA94-5DCA-4F19-960F-0FB2BD5EE85A}" type="datetime1">
               <a:rPr lang="en-US" smtClean="0"/>
-              <a:t>3/7/2023</a:t>
+              <a:t>3/13/2023</a:t>
             </a:fld>
             <a:endParaRPr lang="en-US" dirty="0"/>
           </a:p>
@@ -5583,7 +5583,7 @@
           <a:p>
             <a:fld id="{01BED947-38D9-44AC-8B89-E79758333B77}" type="datetime1">
               <a:rPr lang="en-US" smtClean="0"/>
-              <a:t>3/7/2023</a:t>
+              <a:t>3/13/2023</a:t>
             </a:fld>
             <a:endParaRPr lang="en-US" dirty="0"/>
           </a:p>
@@ -6204,7 +6204,7 @@
           <a:p>
             <a:fld id="{3781E23F-BD3C-4F23-B116-2B758120C8AC}" type="datetime1">
               <a:rPr lang="en-US" smtClean="0"/>
-              <a:t>3/7/2023</a:t>
+              <a:t>3/13/2023</a:t>
             </a:fld>
             <a:endParaRPr lang="en-US" dirty="0"/>
           </a:p>
@@ -6796,7 +6796,7 @@
           <a:p>
             <a:fld id="{473CFAA9-6D59-4D98-869E-ACBDB83B2CA4}" type="datetime1">
               <a:rPr lang="en-US" smtClean="0"/>
-              <a:t>3/7/2023</a:t>
+              <a:t>3/13/2023</a:t>
             </a:fld>
             <a:endParaRPr lang="en-US"/>
           </a:p>
@@ -7588,7 +7588,7 @@
           <a:p>
             <a:fld id="{DC410804-27E3-430A-BB42-B831260DE39A}" type="datetime1">
               <a:rPr lang="en-US" smtClean="0"/>
-              <a:t>3/7/2023</a:t>
+              <a:t>3/13/2023</a:t>
             </a:fld>
             <a:endParaRPr lang="en-US" dirty="0"/>
           </a:p>
@@ -8359,7 +8359,7 @@
           <a:p>
             <a:fld id="{60E22DE3-3D1A-4D53-B9A6-6C7463B8C992}" type="datetime1">
               <a:rPr lang="en-US" smtClean="0"/>
-              <a:t>3/7/2023</a:t>
+              <a:t>3/13/2023</a:t>
             </a:fld>
             <a:endParaRPr lang="en-US" dirty="0"/>
           </a:p>
@@ -8670,7 +8670,7 @@
             <a:fld id="{5ECD8B30-1B71-45A1-8314-D59C86F581E1}" type="datetime1">
               <a:rPr lang="en-US" smtClean="0"/>
               <a:pPr/>
-              <a:t>3/7/2023</a:t>
+              <a:t>3/13/2023</a:t>
             </a:fld>
             <a:endParaRPr lang="en-US" b="1" dirty="0"/>
           </a:p>
@@ -10299,24 +10299,6 @@
               <a:rPr lang="en-CA" dirty="0"/>
               <a:t>…</a:t>
             </a:r>
-            <a:br>
-              <a:rPr lang="en-CA" dirty="0"/>
-            </a:br>
-            <a:r>
-              <a:rPr lang="en-CA" sz="1200" dirty="0"/>
-              <a:t> </a:t>
-            </a:r>
-            <a:endParaRPr lang="en-CA" dirty="0"/>
-          </a:p>
-          <a:p>
-            <a:pPr marL="0" indent="0" algn="ctr">
-              <a:buNone/>
-            </a:pPr>
-            <a:r>
-              <a:rPr lang="en-CA" sz="2800" dirty="0"/>
-              <a:t>http://editor.planning.domains/planning-course/hybrid/peeps</a:t>
-            </a:r>
-            <a:endParaRPr lang="en-CA" dirty="0"/>
           </a:p>
         </p:txBody>
       </p:sp>
@@ -10604,58 +10586,6 @@
                             </p:childTnLst>
                           </p:cTn>
                         </p:par>
-                        <p:par>
-                          <p:cTn id="24" fill="hold">
-                            <p:stCondLst>
-                              <p:cond delay="2500"/>
-                            </p:stCondLst>
-                            <p:childTnLst>
-                              <p:par>
-                                <p:cTn id="25" presetID="10" presetClass="entr" presetSubtype="0" fill="hold" grpId="0" nodeType="afterEffect">
-                                  <p:stCondLst>
-                                    <p:cond delay="0"/>
-                                  </p:stCondLst>
-                                  <p:childTnLst>
-                                    <p:set>
-                                      <p:cBhvr>
-                                        <p:cTn id="26" dur="1" fill="hold">
-                                          <p:stCondLst>
-                                            <p:cond delay="0"/>
-                                          </p:stCondLst>
-                                        </p:cTn>
-                                        <p:tgtEl>
-                                          <p:spTgt spid="5">
-                                            <p:txEl>
-                                              <p:pRg st="6" end="6"/>
-                                            </p:txEl>
-                                          </p:spTgt>
-                                        </p:tgtEl>
-                                        <p:attrNameLst>
-                                          <p:attrName>style.visibility</p:attrName>
-                                        </p:attrNameLst>
-                                      </p:cBhvr>
-                                      <p:to>
-                                        <p:strVal val="visible"/>
-                                      </p:to>
-                                    </p:set>
-                                    <p:animEffect transition="in" filter="fade">
-                                      <p:cBhvr>
-                                        <p:cTn id="27" dur="500"/>
-                                        <p:tgtEl>
-                                          <p:spTgt spid="5">
-                                            <p:txEl>
-                                              <p:pRg st="6" end="6"/>
-                                            </p:txEl>
-                                          </p:spTgt>
-                                        </p:tgtEl>
-                                      </p:cBhvr>
-                                    </p:animEffect>
-                                  </p:childTnLst>
-                                </p:cTn>
-                              </p:par>
-                            </p:childTnLst>
-                          </p:cTn>
-                        </p:par>
                       </p:childTnLst>
                     </p:cTn>
                   </p:par>
@@ -12917,13 +12847,13 @@
   <p:clrMapOvr>
     <a:masterClrMapping/>
   </p:clrMapOvr>
-  <mc:AlternateContent xmlns:mc="http://schemas.openxmlformats.org/markup-compatibility/2006">
-    <mc:Choice xmlns:p159="http://schemas.microsoft.com/office/powerpoint/2015/09/main" Requires="p159">
+  <mc:AlternateContent xmlns:mc="http://schemas.openxmlformats.org/markup-compatibility/2006" xmlns:p159="http://schemas.microsoft.com/office/powerpoint/2015/09/main">
+    <mc:Choice Requires="p159">
       <p:transition xmlns:p14="http://schemas.microsoft.com/office/powerpoint/2010/main" spd="slow" p14:dur="2000">
         <p159:morph option="byObject"/>
       </p:transition>
     </mc:Choice>
-    <mc:Fallback>
+    <mc:Fallback xmlns="">
       <p:transition spd="slow">
         <p:fade/>
       </p:transition>

</xml_diff>

<commit_message>
Wrapped up the hybrid pddl.
</commit_message>
<xml_diff>
--- a/exercises/cisc-813/hybrid/slides.pptx
+++ b/exercises/cisc-813/hybrid/slides.pptx
@@ -696,7 +696,7 @@
           <a:p>
             <a:fld id="{D6D0F569-AC90-44EB-9EF4-4E5C2F5D823C}" type="datetime1">
               <a:rPr lang="en-US" smtClean="0"/>
-              <a:t>3/13/2023</a:t>
+              <a:t>3/14/2023</a:t>
             </a:fld>
             <a:endParaRPr lang="en-US" dirty="0"/>
           </a:p>
@@ -1375,7 +1375,7 @@
           <a:p>
             <a:fld id="{46BA7D41-E8B7-4A0B-B861-3EC4AE88917D}" type="datetime1">
               <a:rPr lang="en-US" smtClean="0"/>
-              <a:t>3/13/2023</a:t>
+              <a:t>3/14/2023</a:t>
             </a:fld>
             <a:endParaRPr lang="en-US" dirty="0"/>
           </a:p>
@@ -2064,7 +2064,7 @@
           <a:p>
             <a:fld id="{A7C34823-0B19-4B4E-A643-7A3B0A3D24D6}" type="datetime1">
               <a:rPr lang="en-US" smtClean="0"/>
-              <a:t>3/13/2023</a:t>
+              <a:t>3/14/2023</a:t>
             </a:fld>
             <a:endParaRPr lang="en-US" dirty="0"/>
           </a:p>
@@ -3187,7 +3187,7 @@
           <a:p>
             <a:fld id="{8C2D79EF-17C8-45D8-9866-DAF5723FC604}" type="datetime1">
               <a:rPr lang="en-US" smtClean="0"/>
-              <a:t>3/13/2023</a:t>
+              <a:t>3/14/2023</a:t>
             </a:fld>
             <a:endParaRPr lang="en-US" dirty="0"/>
           </a:p>
@@ -3942,7 +3942,7 @@
           <a:p>
             <a:fld id="{DFFC2ADC-3680-4013-A757-E4663495DB98}" type="datetime1">
               <a:rPr lang="en-US" smtClean="0"/>
-              <a:t>3/13/2023</a:t>
+              <a:t>3/14/2023</a:t>
             </a:fld>
             <a:endParaRPr lang="en-US" dirty="0"/>
           </a:p>
@@ -4689,7 +4689,7 @@
           <a:p>
             <a:fld id="{4751BA94-5DCA-4F19-960F-0FB2BD5EE85A}" type="datetime1">
               <a:rPr lang="en-US" smtClean="0"/>
-              <a:t>3/13/2023</a:t>
+              <a:t>3/14/2023</a:t>
             </a:fld>
             <a:endParaRPr lang="en-US" dirty="0"/>
           </a:p>
@@ -5583,7 +5583,7 @@
           <a:p>
             <a:fld id="{01BED947-38D9-44AC-8B89-E79758333B77}" type="datetime1">
               <a:rPr lang="en-US" smtClean="0"/>
-              <a:t>3/13/2023</a:t>
+              <a:t>3/14/2023</a:t>
             </a:fld>
             <a:endParaRPr lang="en-US" dirty="0"/>
           </a:p>
@@ -6204,7 +6204,7 @@
           <a:p>
             <a:fld id="{3781E23F-BD3C-4F23-B116-2B758120C8AC}" type="datetime1">
               <a:rPr lang="en-US" smtClean="0"/>
-              <a:t>3/13/2023</a:t>
+              <a:t>3/14/2023</a:t>
             </a:fld>
             <a:endParaRPr lang="en-US" dirty="0"/>
           </a:p>
@@ -6796,7 +6796,7 @@
           <a:p>
             <a:fld id="{473CFAA9-6D59-4D98-869E-ACBDB83B2CA4}" type="datetime1">
               <a:rPr lang="en-US" smtClean="0"/>
-              <a:t>3/13/2023</a:t>
+              <a:t>3/14/2023</a:t>
             </a:fld>
             <a:endParaRPr lang="en-US"/>
           </a:p>
@@ -7588,7 +7588,7 @@
           <a:p>
             <a:fld id="{DC410804-27E3-430A-BB42-B831260DE39A}" type="datetime1">
               <a:rPr lang="en-US" smtClean="0"/>
-              <a:t>3/13/2023</a:t>
+              <a:t>3/14/2023</a:t>
             </a:fld>
             <a:endParaRPr lang="en-US" dirty="0"/>
           </a:p>
@@ -8359,7 +8359,7 @@
           <a:p>
             <a:fld id="{60E22DE3-3D1A-4D53-B9A6-6C7463B8C992}" type="datetime1">
               <a:rPr lang="en-US" smtClean="0"/>
-              <a:t>3/13/2023</a:t>
+              <a:t>3/14/2023</a:t>
             </a:fld>
             <a:endParaRPr lang="en-US" dirty="0"/>
           </a:p>
@@ -8670,7 +8670,7 @@
             <a:fld id="{5ECD8B30-1B71-45A1-8314-D59C86F581E1}" type="datetime1">
               <a:rPr lang="en-US" smtClean="0"/>
               <a:pPr/>
-              <a:t>3/13/2023</a:t>
+              <a:t>3/14/2023</a:t>
             </a:fld>
             <a:endParaRPr lang="en-US" b="1" dirty="0"/>
           </a:p>
@@ -10655,24 +10655,91 @@
           <a:bodyPr/>
           <a:lstStyle/>
           <a:p>
-            <a:pPr marL="0" indent="0">
+            <a:endParaRPr lang="en-CA" dirty="0"/>
+          </a:p>
+          <a:p>
+            <a:endParaRPr lang="en-CA" dirty="0"/>
+          </a:p>
+          <a:p>
+            <a:pPr marL="0" indent="0" algn="ctr">
+              <a:buNone/>
+            </a:pPr>
+            <a:r>
+              <a:rPr lang="en-CA" sz="2800" dirty="0"/>
+              <a:t>http://editor.planning.domains/planning-course/hybrid/dirbyh</a:t>
+            </a:r>
+          </a:p>
+          <a:p>
+            <a:pPr marL="0" indent="0" algn="ctr">
               <a:buNone/>
             </a:pPr>
             <a:endParaRPr lang="en-CA" dirty="0"/>
           </a:p>
           <a:p>
-            <a:endParaRPr lang="en-CA" dirty="0"/>
-          </a:p>
-          <a:p>
-            <a:endParaRPr lang="en-CA" dirty="0"/>
-          </a:p>
-          <a:p>
             <a:pPr marL="0" indent="0" algn="ctr">
               <a:buNone/>
             </a:pPr>
             <a:r>
               <a:rPr lang="en-CA" sz="2800" dirty="0"/>
-              <a:t>http://editor.planning.domains/planning-course/hybrid/dirbyh</a:t>
+              <a:t>enhsp-2020 --domain domain.5.pddl --problem problem.5.pddl</a:t>
+            </a:r>
+            <a:br>
+              <a:rPr lang="en-CA" sz="2800" dirty="0"/>
+            </a:br>
+            <a:r>
+              <a:rPr lang="en-CA" sz="2800" b="1" dirty="0">
+                <a:solidFill>
+                  <a:schemeClr val="accent2">
+                    <a:lumMod val="40000"/>
+                    <a:lumOff val="60000"/>
+                  </a:schemeClr>
+                </a:solidFill>
+              </a:rPr>
+              <a:t>-ha true    -h </a:t>
+            </a:r>
+            <a:r>
+              <a:rPr lang="en-CA" sz="2800" b="1" dirty="0" err="1">
+                <a:solidFill>
+                  <a:schemeClr val="accent2">
+                    <a:lumMod val="40000"/>
+                    <a:lumOff val="60000"/>
+                  </a:schemeClr>
+                </a:solidFill>
+              </a:rPr>
+              <a:t>hmrp</a:t>
+            </a:r>
+            <a:r>
+              <a:rPr lang="en-CA" sz="2800" b="1" dirty="0">
+                <a:solidFill>
+                  <a:schemeClr val="accent2">
+                    <a:lumMod val="40000"/>
+                    <a:lumOff val="60000"/>
+                  </a:schemeClr>
+                </a:solidFill>
+              </a:rPr>
+              <a:t>    -</a:t>
+            </a:r>
+            <a:r>
+              <a:rPr lang="en-CA" sz="2800" b="1" dirty="0" err="1">
+                <a:solidFill>
+                  <a:schemeClr val="accent2">
+                    <a:lumMod val="40000"/>
+                    <a:lumOff val="60000"/>
+                  </a:schemeClr>
+                </a:solidFill>
+              </a:rPr>
+              <a:t>wh</a:t>
+            </a:r>
+            <a:r>
+              <a:rPr lang="en-CA" sz="2800" b="1" dirty="0">
+                <a:solidFill>
+                  <a:schemeClr val="accent2">
+                    <a:lumMod val="40000"/>
+                    <a:lumOff val="60000"/>
+                  </a:schemeClr>
+                </a:solidFill>
+              </a:rPr>
+              <a:t> 4</a:t>
             </a:r>
           </a:p>
         </p:txBody>

</xml_diff>

<commit_message>
Final (unformatted) epistemic problem, and hybrid slides fix.
</commit_message>
<xml_diff>
--- a/exercises/cisc-813/hybrid/slides.pptx
+++ b/exercises/cisc-813/hybrid/slides.pptx
@@ -696,7 +696,7 @@
           <a:p>
             <a:fld id="{D6D0F569-AC90-44EB-9EF4-4E5C2F5D823C}" type="datetime1">
               <a:rPr lang="en-US" smtClean="0"/>
-              <a:t>3/14/2023</a:t>
+              <a:t>3/16/2023</a:t>
             </a:fld>
             <a:endParaRPr lang="en-US" dirty="0"/>
           </a:p>
@@ -1375,7 +1375,7 @@
           <a:p>
             <a:fld id="{46BA7D41-E8B7-4A0B-B861-3EC4AE88917D}" type="datetime1">
               <a:rPr lang="en-US" smtClean="0"/>
-              <a:t>3/14/2023</a:t>
+              <a:t>3/16/2023</a:t>
             </a:fld>
             <a:endParaRPr lang="en-US" dirty="0"/>
           </a:p>
@@ -2064,7 +2064,7 @@
           <a:p>
             <a:fld id="{A7C34823-0B19-4B4E-A643-7A3B0A3D24D6}" type="datetime1">
               <a:rPr lang="en-US" smtClean="0"/>
-              <a:t>3/14/2023</a:t>
+              <a:t>3/16/2023</a:t>
             </a:fld>
             <a:endParaRPr lang="en-US" dirty="0"/>
           </a:p>
@@ -3187,7 +3187,7 @@
           <a:p>
             <a:fld id="{8C2D79EF-17C8-45D8-9866-DAF5723FC604}" type="datetime1">
               <a:rPr lang="en-US" smtClean="0"/>
-              <a:t>3/14/2023</a:t>
+              <a:t>3/16/2023</a:t>
             </a:fld>
             <a:endParaRPr lang="en-US" dirty="0"/>
           </a:p>
@@ -3942,7 +3942,7 @@
           <a:p>
             <a:fld id="{DFFC2ADC-3680-4013-A757-E4663495DB98}" type="datetime1">
               <a:rPr lang="en-US" smtClean="0"/>
-              <a:t>3/14/2023</a:t>
+              <a:t>3/16/2023</a:t>
             </a:fld>
             <a:endParaRPr lang="en-US" dirty="0"/>
           </a:p>
@@ -4689,7 +4689,7 @@
           <a:p>
             <a:fld id="{4751BA94-5DCA-4F19-960F-0FB2BD5EE85A}" type="datetime1">
               <a:rPr lang="en-US" smtClean="0"/>
-              <a:t>3/14/2023</a:t>
+              <a:t>3/16/2023</a:t>
             </a:fld>
             <a:endParaRPr lang="en-US" dirty="0"/>
           </a:p>
@@ -5583,7 +5583,7 @@
           <a:p>
             <a:fld id="{01BED947-38D9-44AC-8B89-E79758333B77}" type="datetime1">
               <a:rPr lang="en-US" smtClean="0"/>
-              <a:t>3/14/2023</a:t>
+              <a:t>3/16/2023</a:t>
             </a:fld>
             <a:endParaRPr lang="en-US" dirty="0"/>
           </a:p>
@@ -6204,7 +6204,7 @@
           <a:p>
             <a:fld id="{3781E23F-BD3C-4F23-B116-2B758120C8AC}" type="datetime1">
               <a:rPr lang="en-US" smtClean="0"/>
-              <a:t>3/14/2023</a:t>
+              <a:t>3/16/2023</a:t>
             </a:fld>
             <a:endParaRPr lang="en-US" dirty="0"/>
           </a:p>
@@ -6796,7 +6796,7 @@
           <a:p>
             <a:fld id="{473CFAA9-6D59-4D98-869E-ACBDB83B2CA4}" type="datetime1">
               <a:rPr lang="en-US" smtClean="0"/>
-              <a:t>3/14/2023</a:t>
+              <a:t>3/16/2023</a:t>
             </a:fld>
             <a:endParaRPr lang="en-US"/>
           </a:p>
@@ -7588,7 +7588,7 @@
           <a:p>
             <a:fld id="{DC410804-27E3-430A-BB42-B831260DE39A}" type="datetime1">
               <a:rPr lang="en-US" smtClean="0"/>
-              <a:t>3/14/2023</a:t>
+              <a:t>3/16/2023</a:t>
             </a:fld>
             <a:endParaRPr lang="en-US" dirty="0"/>
           </a:p>
@@ -8359,7 +8359,7 @@
           <a:p>
             <a:fld id="{60E22DE3-3D1A-4D53-B9A6-6C7463B8C992}" type="datetime1">
               <a:rPr lang="en-US" smtClean="0"/>
-              <a:t>3/14/2023</a:t>
+              <a:t>3/16/2023</a:t>
             </a:fld>
             <a:endParaRPr lang="en-US" dirty="0"/>
           </a:p>
@@ -8670,7 +8670,7 @@
             <a:fld id="{5ECD8B30-1B71-45A1-8314-D59C86F581E1}" type="datetime1">
               <a:rPr lang="en-US" smtClean="0"/>
               <a:pPr/>
-              <a:t>3/14/2023</a:t>
+              <a:t>3/16/2023</a:t>
             </a:fld>
             <a:endParaRPr lang="en-US" b="1" dirty="0"/>
           </a:p>
@@ -13143,7 +13143,7 @@
                   </a:schemeClr>
                 </a:solidFill>
               </a:rPr>
-              <a:t>enhsp-2020 –domain </a:t>
+              <a:t>enhsp-2020 --domain </a:t>
             </a:r>
             <a:r>
               <a:rPr lang="en-CA" dirty="0" err="1">
@@ -13163,7 +13163,7 @@
                   </a:schemeClr>
                 </a:solidFill>
               </a:rPr>
-              <a:t> –problem </a:t>
+              <a:t> --problem </a:t>
             </a:r>
             <a:r>
               <a:rPr lang="en-CA" dirty="0" err="1">

</xml_diff>